<commit_message>
Edição do slide de apresentação do projeto
</commit_message>
<xml_diff>
--- a/Apresentação-blindmarket.pptx
+++ b/Apresentação-blindmarket.pptx
@@ -1,18 +1,25 @@
 
 <file path=ppt/presentation.xml><?xml version="1.0" encoding="utf-8"?>
-<p:presentation xmlns:a="http://schemas.openxmlformats.org/drawingml/2006/main" xmlns:r="http://schemas.openxmlformats.org/officeDocument/2006/relationships" xmlns:p="http://schemas.openxmlformats.org/presentationml/2006/main" saveSubsetFonts="1">
+<p:presentation xmlns:a="http://schemas.openxmlformats.org/drawingml/2006/main" xmlns:r="http://schemas.openxmlformats.org/officeDocument/2006/relationships" xmlns:p="http://schemas.openxmlformats.org/presentationml/2006/main">
   <p:sldMasterIdLst>
-    <p:sldMasterId id="2147483720" r:id="rId1"/>
+    <p:sldMasterId id="2147483648" r:id="rId1"/>
   </p:sldMasterIdLst>
   <p:sldIdLst>
-    <p:sldId id="256" r:id="rId2"/>
-    <p:sldId id="257" r:id="rId3"/>
-    <p:sldId id="258" r:id="rId4"/>
-    <p:sldId id="259" r:id="rId5"/>
-    <p:sldId id="260" r:id="rId6"/>
-    <p:sldId id="261" r:id="rId7"/>
-    <p:sldId id="262" r:id="rId8"/>
-    <p:sldId id="263" r:id="rId9"/>
+    <p:sldId id="256" r:id="rId3"/>
+    <p:sldId id="257" r:id="rId4"/>
+    <p:sldId id="258" r:id="rId5"/>
+    <p:sldId id="259" r:id="rId6"/>
+    <p:sldId id="260" r:id="rId7"/>
+    <p:sldId id="261" r:id="rId8"/>
+    <p:sldId id="262" r:id="rId9"/>
+    <p:sldId id="264" r:id="rId10"/>
+    <p:sldId id="265" r:id="rId11"/>
+    <p:sldId id="266" r:id="rId12"/>
+    <p:sldId id="267" r:id="rId13"/>
+    <p:sldId id="268" r:id="rId14"/>
+    <p:sldId id="269" r:id="rId15"/>
+    <p:sldId id="270" r:id="rId16"/>
+    <p:sldId id="271" r:id="rId17"/>
   </p:sldIdLst>
   <p:sldSz cx="12192000" cy="6858000"/>
   <p:notesSz cx="6858000" cy="9144000"/>
@@ -111,11 +118,6 @@
       </a:defRPr>
     </a:lvl9pPr>
   </p:defaultTextStyle>
-  <p:extLst>
-    <p:ext uri="{EFAFB233-063F-42B5-8137-9DF3F51BA10A}">
-      <p15:sldGuideLst xmlns:p15="http://schemas.microsoft.com/office/powerpoint/2012/main"/>
-    </p:ext>
-  </p:extLst>
 </p:presentation>
 </file>
 
@@ -143,7 +145,7 @@
             <a:spLocks noGrp="1"/>
           </p:cNvSpPr>
           <p:nvPr>
-            <p:ph type="ctrTitle"/>
+            <p:ph type="ctrTitle" hasCustomPrompt="1"/>
           </p:nvPr>
         </p:nvSpPr>
         <p:spPr>
@@ -250,7 +252,6 @@
           <a:p>
             <a:fld id="{1FF31CB7-1021-4988-AE75-57CA8D34CD8E}" type="datetimeFigureOut">
               <a:rPr lang="pt-BR" smtClean="0"/>
-              <a:t>01/12/2019</a:t>
             </a:fld>
             <a:endParaRPr lang="pt-BR"/>
           </a:p>
@@ -292,18 +293,12 @@
           <a:p>
             <a:fld id="{3D9505F6-A9D3-41A1-B047-59C2F828AC87}" type="slidenum">
               <a:rPr lang="pt-BR" smtClean="0"/>
-              <a:t>‹nº›</a:t>
             </a:fld>
             <a:endParaRPr lang="pt-BR"/>
           </a:p>
         </p:txBody>
       </p:sp>
     </p:spTree>
-    <p:extLst>
-      <p:ext uri="{BB962C8B-B14F-4D97-AF65-F5344CB8AC3E}">
-        <p14:creationId xmlns:p14="http://schemas.microsoft.com/office/powerpoint/2010/main" val="616790784"/>
-      </p:ext>
-    </p:extLst>
   </p:cSld>
   <p:clrMapOvr>
     <a:masterClrMapping/>
@@ -335,7 +330,7 @@
             <a:spLocks noGrp="1"/>
           </p:cNvSpPr>
           <p:nvPr>
-            <p:ph type="title"/>
+            <p:ph type="title" hasCustomPrompt="1"/>
           </p:nvPr>
         </p:nvSpPr>
         <p:spPr/>
@@ -358,7 +353,7 @@
             <a:spLocks noGrp="1"/>
           </p:cNvSpPr>
           <p:nvPr>
-            <p:ph type="body" orient="vert" idx="1"/>
+            <p:ph type="body" orient="vert" idx="1" hasCustomPrompt="1"/>
           </p:nvPr>
         </p:nvSpPr>
         <p:spPr/>
@@ -371,6 +366,7 @@
               <a:rPr lang="pt-BR"/>
               <a:t>Clique para editar os estilos de texto Mestres</a:t>
             </a:r>
+            <a:endParaRPr lang="pt-BR"/>
           </a:p>
           <a:p>
             <a:pPr lvl="1"/>
@@ -378,6 +374,7 @@
               <a:rPr lang="pt-BR"/>
               <a:t>Segundo nível</a:t>
             </a:r>
+            <a:endParaRPr lang="pt-BR"/>
           </a:p>
           <a:p>
             <a:pPr lvl="2"/>
@@ -385,6 +382,7 @@
               <a:rPr lang="pt-BR"/>
               <a:t>Terceiro nível</a:t>
             </a:r>
+            <a:endParaRPr lang="pt-BR"/>
           </a:p>
           <a:p>
             <a:pPr lvl="3"/>
@@ -392,6 +390,7 @@
               <a:rPr lang="pt-BR"/>
               <a:t>Quarto nível</a:t>
             </a:r>
+            <a:endParaRPr lang="pt-BR"/>
           </a:p>
           <a:p>
             <a:pPr lvl="4"/>
@@ -420,7 +419,6 @@
           <a:p>
             <a:fld id="{1FF31CB7-1021-4988-AE75-57CA8D34CD8E}" type="datetimeFigureOut">
               <a:rPr lang="pt-BR" smtClean="0"/>
-              <a:t>01/12/2019</a:t>
             </a:fld>
             <a:endParaRPr lang="pt-BR"/>
           </a:p>
@@ -462,18 +460,12 @@
           <a:p>
             <a:fld id="{3D9505F6-A9D3-41A1-B047-59C2F828AC87}" type="slidenum">
               <a:rPr lang="pt-BR" smtClean="0"/>
-              <a:t>‹nº›</a:t>
             </a:fld>
             <a:endParaRPr lang="pt-BR"/>
           </a:p>
         </p:txBody>
       </p:sp>
     </p:spTree>
-    <p:extLst>
-      <p:ext uri="{BB962C8B-B14F-4D97-AF65-F5344CB8AC3E}">
-        <p14:creationId xmlns:p14="http://schemas.microsoft.com/office/powerpoint/2010/main" val="2032880077"/>
-      </p:ext>
-    </p:extLst>
   </p:cSld>
   <p:clrMapOvr>
     <a:masterClrMapping/>
@@ -505,7 +497,7 @@
             <a:spLocks noGrp="1"/>
           </p:cNvSpPr>
           <p:nvPr>
-            <p:ph type="title" orient="vert"/>
+            <p:ph type="title" orient="vert" hasCustomPrompt="1"/>
           </p:nvPr>
         </p:nvSpPr>
         <p:spPr>
@@ -533,7 +525,7 @@
             <a:spLocks noGrp="1"/>
           </p:cNvSpPr>
           <p:nvPr>
-            <p:ph type="body" orient="vert" idx="1"/>
+            <p:ph type="body" orient="vert" idx="1" hasCustomPrompt="1"/>
           </p:nvPr>
         </p:nvSpPr>
         <p:spPr>
@@ -551,6 +543,7 @@
               <a:rPr lang="pt-BR"/>
               <a:t>Clique para editar os estilos de texto Mestres</a:t>
             </a:r>
+            <a:endParaRPr lang="pt-BR"/>
           </a:p>
           <a:p>
             <a:pPr lvl="1"/>
@@ -558,6 +551,7 @@
               <a:rPr lang="pt-BR"/>
               <a:t>Segundo nível</a:t>
             </a:r>
+            <a:endParaRPr lang="pt-BR"/>
           </a:p>
           <a:p>
             <a:pPr lvl="2"/>
@@ -565,6 +559,7 @@
               <a:rPr lang="pt-BR"/>
               <a:t>Terceiro nível</a:t>
             </a:r>
+            <a:endParaRPr lang="pt-BR"/>
           </a:p>
           <a:p>
             <a:pPr lvl="3"/>
@@ -572,6 +567,7 @@
               <a:rPr lang="pt-BR"/>
               <a:t>Quarto nível</a:t>
             </a:r>
+            <a:endParaRPr lang="pt-BR"/>
           </a:p>
           <a:p>
             <a:pPr lvl="4"/>
@@ -600,7 +596,6 @@
           <a:p>
             <a:fld id="{1FF31CB7-1021-4988-AE75-57CA8D34CD8E}" type="datetimeFigureOut">
               <a:rPr lang="pt-BR" smtClean="0"/>
-              <a:t>01/12/2019</a:t>
             </a:fld>
             <a:endParaRPr lang="pt-BR"/>
           </a:p>
@@ -642,18 +637,12 @@
           <a:p>
             <a:fld id="{3D9505F6-A9D3-41A1-B047-59C2F828AC87}" type="slidenum">
               <a:rPr lang="pt-BR" smtClean="0"/>
-              <a:t>‹nº›</a:t>
             </a:fld>
             <a:endParaRPr lang="pt-BR"/>
           </a:p>
         </p:txBody>
       </p:sp>
     </p:spTree>
-    <p:extLst>
-      <p:ext uri="{BB962C8B-B14F-4D97-AF65-F5344CB8AC3E}">
-        <p14:creationId xmlns:p14="http://schemas.microsoft.com/office/powerpoint/2010/main" val="2867155221"/>
-      </p:ext>
-    </p:extLst>
   </p:cSld>
   <p:clrMapOvr>
     <a:masterClrMapping/>
@@ -685,7 +674,7 @@
             <a:spLocks noGrp="1"/>
           </p:cNvSpPr>
           <p:nvPr>
-            <p:ph type="title"/>
+            <p:ph type="title" hasCustomPrompt="1"/>
           </p:nvPr>
         </p:nvSpPr>
         <p:spPr/>
@@ -708,7 +697,7 @@
             <a:spLocks noGrp="1"/>
           </p:cNvSpPr>
           <p:nvPr>
-            <p:ph idx="1"/>
+            <p:ph idx="1" hasCustomPrompt="1"/>
           </p:nvPr>
         </p:nvSpPr>
         <p:spPr/>
@@ -721,6 +710,7 @@
               <a:rPr lang="pt-BR"/>
               <a:t>Clique para editar os estilos de texto Mestres</a:t>
             </a:r>
+            <a:endParaRPr lang="pt-BR"/>
           </a:p>
           <a:p>
             <a:pPr lvl="1"/>
@@ -728,6 +718,7 @@
               <a:rPr lang="pt-BR"/>
               <a:t>Segundo nível</a:t>
             </a:r>
+            <a:endParaRPr lang="pt-BR"/>
           </a:p>
           <a:p>
             <a:pPr lvl="2"/>
@@ -735,6 +726,7 @@
               <a:rPr lang="pt-BR"/>
               <a:t>Terceiro nível</a:t>
             </a:r>
+            <a:endParaRPr lang="pt-BR"/>
           </a:p>
           <a:p>
             <a:pPr lvl="3"/>
@@ -742,6 +734,7 @@
               <a:rPr lang="pt-BR"/>
               <a:t>Quarto nível</a:t>
             </a:r>
+            <a:endParaRPr lang="pt-BR"/>
           </a:p>
           <a:p>
             <a:pPr lvl="4"/>
@@ -770,7 +763,6 @@
           <a:p>
             <a:fld id="{1FF31CB7-1021-4988-AE75-57CA8D34CD8E}" type="datetimeFigureOut">
               <a:rPr lang="pt-BR" smtClean="0"/>
-              <a:t>01/12/2019</a:t>
             </a:fld>
             <a:endParaRPr lang="pt-BR"/>
           </a:p>
@@ -812,18 +804,12 @@
           <a:p>
             <a:fld id="{3D9505F6-A9D3-41A1-B047-59C2F828AC87}" type="slidenum">
               <a:rPr lang="pt-BR" smtClean="0"/>
-              <a:t>‹nº›</a:t>
             </a:fld>
             <a:endParaRPr lang="pt-BR"/>
           </a:p>
         </p:txBody>
       </p:sp>
     </p:spTree>
-    <p:extLst>
-      <p:ext uri="{BB962C8B-B14F-4D97-AF65-F5344CB8AC3E}">
-        <p14:creationId xmlns:p14="http://schemas.microsoft.com/office/powerpoint/2010/main" val="557561035"/>
-      </p:ext>
-    </p:extLst>
   </p:cSld>
   <p:clrMapOvr>
     <a:masterClrMapping/>
@@ -855,7 +841,7 @@
             <a:spLocks noGrp="1"/>
           </p:cNvSpPr>
           <p:nvPr>
-            <p:ph type="title"/>
+            <p:ph type="title" hasCustomPrompt="1"/>
           </p:nvPr>
         </p:nvSpPr>
         <p:spPr>
@@ -887,7 +873,7 @@
             <a:spLocks noGrp="1"/>
           </p:cNvSpPr>
           <p:nvPr>
-            <p:ph type="body" idx="1"/>
+            <p:ph type="body" idx="1" hasCustomPrompt="1"/>
           </p:nvPr>
         </p:nvSpPr>
         <p:spPr>
@@ -996,6 +982,7 @@
               <a:rPr lang="pt-BR"/>
               <a:t>Clique para editar os estilos de texto Mestres</a:t>
             </a:r>
+            <a:endParaRPr lang="pt-BR"/>
           </a:p>
         </p:txBody>
       </p:sp>
@@ -1016,7 +1003,6 @@
           <a:p>
             <a:fld id="{1FF31CB7-1021-4988-AE75-57CA8D34CD8E}" type="datetimeFigureOut">
               <a:rPr lang="pt-BR" smtClean="0"/>
-              <a:t>01/12/2019</a:t>
             </a:fld>
             <a:endParaRPr lang="pt-BR"/>
           </a:p>
@@ -1058,18 +1044,12 @@
           <a:p>
             <a:fld id="{3D9505F6-A9D3-41A1-B047-59C2F828AC87}" type="slidenum">
               <a:rPr lang="pt-BR" smtClean="0"/>
-              <a:t>‹nº›</a:t>
             </a:fld>
             <a:endParaRPr lang="pt-BR"/>
           </a:p>
         </p:txBody>
       </p:sp>
     </p:spTree>
-    <p:extLst>
-      <p:ext uri="{BB962C8B-B14F-4D97-AF65-F5344CB8AC3E}">
-        <p14:creationId xmlns:p14="http://schemas.microsoft.com/office/powerpoint/2010/main" val="1542133242"/>
-      </p:ext>
-    </p:extLst>
   </p:cSld>
   <p:clrMapOvr>
     <a:masterClrMapping/>
@@ -1101,7 +1081,7 @@
             <a:spLocks noGrp="1"/>
           </p:cNvSpPr>
           <p:nvPr>
-            <p:ph type="title"/>
+            <p:ph type="title" hasCustomPrompt="1"/>
           </p:nvPr>
         </p:nvSpPr>
         <p:spPr/>
@@ -1124,7 +1104,7 @@
             <a:spLocks noGrp="1"/>
           </p:cNvSpPr>
           <p:nvPr>
-            <p:ph sz="half" idx="1"/>
+            <p:ph sz="half" idx="1" hasCustomPrompt="1"/>
           </p:nvPr>
         </p:nvSpPr>
         <p:spPr>
@@ -1142,6 +1122,7 @@
               <a:rPr lang="pt-BR"/>
               <a:t>Clique para editar os estilos de texto Mestres</a:t>
             </a:r>
+            <a:endParaRPr lang="pt-BR"/>
           </a:p>
           <a:p>
             <a:pPr lvl="1"/>
@@ -1149,6 +1130,7 @@
               <a:rPr lang="pt-BR"/>
               <a:t>Segundo nível</a:t>
             </a:r>
+            <a:endParaRPr lang="pt-BR"/>
           </a:p>
           <a:p>
             <a:pPr lvl="2"/>
@@ -1156,6 +1138,7 @@
               <a:rPr lang="pt-BR"/>
               <a:t>Terceiro nível</a:t>
             </a:r>
+            <a:endParaRPr lang="pt-BR"/>
           </a:p>
           <a:p>
             <a:pPr lvl="3"/>
@@ -1163,6 +1146,7 @@
               <a:rPr lang="pt-BR"/>
               <a:t>Quarto nível</a:t>
             </a:r>
+            <a:endParaRPr lang="pt-BR"/>
           </a:p>
           <a:p>
             <a:pPr lvl="4"/>
@@ -1181,7 +1165,7 @@
             <a:spLocks noGrp="1"/>
           </p:cNvSpPr>
           <p:nvPr>
-            <p:ph sz="half" idx="2"/>
+            <p:ph sz="half" idx="2" hasCustomPrompt="1"/>
           </p:nvPr>
         </p:nvSpPr>
         <p:spPr>
@@ -1199,6 +1183,7 @@
               <a:rPr lang="pt-BR"/>
               <a:t>Clique para editar os estilos de texto Mestres</a:t>
             </a:r>
+            <a:endParaRPr lang="pt-BR"/>
           </a:p>
           <a:p>
             <a:pPr lvl="1"/>
@@ -1206,6 +1191,7 @@
               <a:rPr lang="pt-BR"/>
               <a:t>Segundo nível</a:t>
             </a:r>
+            <a:endParaRPr lang="pt-BR"/>
           </a:p>
           <a:p>
             <a:pPr lvl="2"/>
@@ -1213,6 +1199,7 @@
               <a:rPr lang="pt-BR"/>
               <a:t>Terceiro nível</a:t>
             </a:r>
+            <a:endParaRPr lang="pt-BR"/>
           </a:p>
           <a:p>
             <a:pPr lvl="3"/>
@@ -1220,6 +1207,7 @@
               <a:rPr lang="pt-BR"/>
               <a:t>Quarto nível</a:t>
             </a:r>
+            <a:endParaRPr lang="pt-BR"/>
           </a:p>
           <a:p>
             <a:pPr lvl="4"/>
@@ -1248,7 +1236,6 @@
           <a:p>
             <a:fld id="{1FF31CB7-1021-4988-AE75-57CA8D34CD8E}" type="datetimeFigureOut">
               <a:rPr lang="pt-BR" smtClean="0"/>
-              <a:t>01/12/2019</a:t>
             </a:fld>
             <a:endParaRPr lang="pt-BR"/>
           </a:p>
@@ -1290,18 +1277,12 @@
           <a:p>
             <a:fld id="{3D9505F6-A9D3-41A1-B047-59C2F828AC87}" type="slidenum">
               <a:rPr lang="pt-BR" smtClean="0"/>
-              <a:t>‹nº›</a:t>
             </a:fld>
             <a:endParaRPr lang="pt-BR"/>
           </a:p>
         </p:txBody>
       </p:sp>
     </p:spTree>
-    <p:extLst>
-      <p:ext uri="{BB962C8B-B14F-4D97-AF65-F5344CB8AC3E}">
-        <p14:creationId xmlns:p14="http://schemas.microsoft.com/office/powerpoint/2010/main" val="291016842"/>
-      </p:ext>
-    </p:extLst>
   </p:cSld>
   <p:clrMapOvr>
     <a:masterClrMapping/>
@@ -1333,7 +1314,7 @@
             <a:spLocks noGrp="1"/>
           </p:cNvSpPr>
           <p:nvPr>
-            <p:ph type="title"/>
+            <p:ph type="title" hasCustomPrompt="1"/>
           </p:nvPr>
         </p:nvSpPr>
         <p:spPr>
@@ -1361,7 +1342,7 @@
             <a:spLocks noGrp="1"/>
           </p:cNvSpPr>
           <p:nvPr>
-            <p:ph type="body" idx="1"/>
+            <p:ph type="body" idx="1" hasCustomPrompt="1"/>
           </p:nvPr>
         </p:nvSpPr>
         <p:spPr>
@@ -1416,6 +1397,7 @@
               <a:rPr lang="pt-BR"/>
               <a:t>Clique para editar os estilos de texto Mestres</a:t>
             </a:r>
+            <a:endParaRPr lang="pt-BR"/>
           </a:p>
         </p:txBody>
       </p:sp>
@@ -1426,7 +1408,7 @@
             <a:spLocks noGrp="1"/>
           </p:cNvSpPr>
           <p:nvPr>
-            <p:ph sz="half" idx="2"/>
+            <p:ph sz="half" idx="2" hasCustomPrompt="1"/>
           </p:nvPr>
         </p:nvSpPr>
         <p:spPr>
@@ -1444,6 +1426,7 @@
               <a:rPr lang="pt-BR"/>
               <a:t>Clique para editar os estilos de texto Mestres</a:t>
             </a:r>
+            <a:endParaRPr lang="pt-BR"/>
           </a:p>
           <a:p>
             <a:pPr lvl="1"/>
@@ -1451,6 +1434,7 @@
               <a:rPr lang="pt-BR"/>
               <a:t>Segundo nível</a:t>
             </a:r>
+            <a:endParaRPr lang="pt-BR"/>
           </a:p>
           <a:p>
             <a:pPr lvl="2"/>
@@ -1458,6 +1442,7 @@
               <a:rPr lang="pt-BR"/>
               <a:t>Terceiro nível</a:t>
             </a:r>
+            <a:endParaRPr lang="pt-BR"/>
           </a:p>
           <a:p>
             <a:pPr lvl="3"/>
@@ -1465,6 +1450,7 @@
               <a:rPr lang="pt-BR"/>
               <a:t>Quarto nível</a:t>
             </a:r>
+            <a:endParaRPr lang="pt-BR"/>
           </a:p>
           <a:p>
             <a:pPr lvl="4"/>
@@ -1483,7 +1469,7 @@
             <a:spLocks noGrp="1"/>
           </p:cNvSpPr>
           <p:nvPr>
-            <p:ph type="body" sz="quarter" idx="3"/>
+            <p:ph type="body" sz="quarter" idx="3" hasCustomPrompt="1"/>
           </p:nvPr>
         </p:nvSpPr>
         <p:spPr>
@@ -1538,6 +1524,7 @@
               <a:rPr lang="pt-BR"/>
               <a:t>Clique para editar os estilos de texto Mestres</a:t>
             </a:r>
+            <a:endParaRPr lang="pt-BR"/>
           </a:p>
         </p:txBody>
       </p:sp>
@@ -1548,7 +1535,7 @@
             <a:spLocks noGrp="1"/>
           </p:cNvSpPr>
           <p:nvPr>
-            <p:ph sz="quarter" idx="4"/>
+            <p:ph sz="quarter" idx="4" hasCustomPrompt="1"/>
           </p:nvPr>
         </p:nvSpPr>
         <p:spPr>
@@ -1566,6 +1553,7 @@
               <a:rPr lang="pt-BR"/>
               <a:t>Clique para editar os estilos de texto Mestres</a:t>
             </a:r>
+            <a:endParaRPr lang="pt-BR"/>
           </a:p>
           <a:p>
             <a:pPr lvl="1"/>
@@ -1573,6 +1561,7 @@
               <a:rPr lang="pt-BR"/>
               <a:t>Segundo nível</a:t>
             </a:r>
+            <a:endParaRPr lang="pt-BR"/>
           </a:p>
           <a:p>
             <a:pPr lvl="2"/>
@@ -1580,6 +1569,7 @@
               <a:rPr lang="pt-BR"/>
               <a:t>Terceiro nível</a:t>
             </a:r>
+            <a:endParaRPr lang="pt-BR"/>
           </a:p>
           <a:p>
             <a:pPr lvl="3"/>
@@ -1587,6 +1577,7 @@
               <a:rPr lang="pt-BR"/>
               <a:t>Quarto nível</a:t>
             </a:r>
+            <a:endParaRPr lang="pt-BR"/>
           </a:p>
           <a:p>
             <a:pPr lvl="4"/>
@@ -1615,7 +1606,6 @@
           <a:p>
             <a:fld id="{1FF31CB7-1021-4988-AE75-57CA8D34CD8E}" type="datetimeFigureOut">
               <a:rPr lang="pt-BR" smtClean="0"/>
-              <a:t>01/12/2019</a:t>
             </a:fld>
             <a:endParaRPr lang="pt-BR"/>
           </a:p>
@@ -1657,18 +1647,12 @@
           <a:p>
             <a:fld id="{3D9505F6-A9D3-41A1-B047-59C2F828AC87}" type="slidenum">
               <a:rPr lang="pt-BR" smtClean="0"/>
-              <a:t>‹nº›</a:t>
             </a:fld>
             <a:endParaRPr lang="pt-BR"/>
           </a:p>
         </p:txBody>
       </p:sp>
     </p:spTree>
-    <p:extLst>
-      <p:ext uri="{BB962C8B-B14F-4D97-AF65-F5344CB8AC3E}">
-        <p14:creationId xmlns:p14="http://schemas.microsoft.com/office/powerpoint/2010/main" val="3532770367"/>
-      </p:ext>
-    </p:extLst>
   </p:cSld>
   <p:clrMapOvr>
     <a:masterClrMapping/>
@@ -1700,7 +1684,7 @@
             <a:spLocks noGrp="1"/>
           </p:cNvSpPr>
           <p:nvPr>
-            <p:ph type="title"/>
+            <p:ph type="title" hasCustomPrompt="1"/>
           </p:nvPr>
         </p:nvSpPr>
         <p:spPr/>
@@ -1733,7 +1717,6 @@
           <a:p>
             <a:fld id="{1FF31CB7-1021-4988-AE75-57CA8D34CD8E}" type="datetimeFigureOut">
               <a:rPr lang="pt-BR" smtClean="0"/>
-              <a:t>01/12/2019</a:t>
             </a:fld>
             <a:endParaRPr lang="pt-BR"/>
           </a:p>
@@ -1775,18 +1758,12 @@
           <a:p>
             <a:fld id="{3D9505F6-A9D3-41A1-B047-59C2F828AC87}" type="slidenum">
               <a:rPr lang="pt-BR" smtClean="0"/>
-              <a:t>‹nº›</a:t>
             </a:fld>
             <a:endParaRPr lang="pt-BR"/>
           </a:p>
         </p:txBody>
       </p:sp>
     </p:spTree>
-    <p:extLst>
-      <p:ext uri="{BB962C8B-B14F-4D97-AF65-F5344CB8AC3E}">
-        <p14:creationId xmlns:p14="http://schemas.microsoft.com/office/powerpoint/2010/main" val="656264940"/>
-      </p:ext>
-    </p:extLst>
   </p:cSld>
   <p:clrMapOvr>
     <a:masterClrMapping/>
@@ -1828,7 +1805,6 @@
           <a:p>
             <a:fld id="{1FF31CB7-1021-4988-AE75-57CA8D34CD8E}" type="datetimeFigureOut">
               <a:rPr lang="pt-BR" smtClean="0"/>
-              <a:t>01/12/2019</a:t>
             </a:fld>
             <a:endParaRPr lang="pt-BR"/>
           </a:p>
@@ -1870,18 +1846,12 @@
           <a:p>
             <a:fld id="{3D9505F6-A9D3-41A1-B047-59C2F828AC87}" type="slidenum">
               <a:rPr lang="pt-BR" smtClean="0"/>
-              <a:t>‹nº›</a:t>
             </a:fld>
             <a:endParaRPr lang="pt-BR"/>
           </a:p>
         </p:txBody>
       </p:sp>
     </p:spTree>
-    <p:extLst>
-      <p:ext uri="{BB962C8B-B14F-4D97-AF65-F5344CB8AC3E}">
-        <p14:creationId xmlns:p14="http://schemas.microsoft.com/office/powerpoint/2010/main" val="686273272"/>
-      </p:ext>
-    </p:extLst>
   </p:cSld>
   <p:clrMapOvr>
     <a:masterClrMapping/>
@@ -1913,7 +1883,7 @@
             <a:spLocks noGrp="1"/>
           </p:cNvSpPr>
           <p:nvPr>
-            <p:ph type="title"/>
+            <p:ph type="title" hasCustomPrompt="1"/>
           </p:nvPr>
         </p:nvSpPr>
         <p:spPr>
@@ -1945,7 +1915,7 @@
             <a:spLocks noGrp="1"/>
           </p:cNvSpPr>
           <p:nvPr>
-            <p:ph idx="1"/>
+            <p:ph idx="1" hasCustomPrompt="1"/>
           </p:nvPr>
         </p:nvSpPr>
         <p:spPr>
@@ -1991,6 +1961,7 @@
               <a:rPr lang="pt-BR"/>
               <a:t>Clique para editar os estilos de texto Mestres</a:t>
             </a:r>
+            <a:endParaRPr lang="pt-BR"/>
           </a:p>
           <a:p>
             <a:pPr lvl="1"/>
@@ -1998,6 +1969,7 @@
               <a:rPr lang="pt-BR"/>
               <a:t>Segundo nível</a:t>
             </a:r>
+            <a:endParaRPr lang="pt-BR"/>
           </a:p>
           <a:p>
             <a:pPr lvl="2"/>
@@ -2005,6 +1977,7 @@
               <a:rPr lang="pt-BR"/>
               <a:t>Terceiro nível</a:t>
             </a:r>
+            <a:endParaRPr lang="pt-BR"/>
           </a:p>
           <a:p>
             <a:pPr lvl="3"/>
@@ -2012,6 +1985,7 @@
               <a:rPr lang="pt-BR"/>
               <a:t>Quarto nível</a:t>
             </a:r>
+            <a:endParaRPr lang="pt-BR"/>
           </a:p>
           <a:p>
             <a:pPr lvl="4"/>
@@ -2030,7 +2004,7 @@
             <a:spLocks noGrp="1"/>
           </p:cNvSpPr>
           <p:nvPr>
-            <p:ph type="body" sz="half" idx="2"/>
+            <p:ph type="body" sz="half" idx="2" hasCustomPrompt="1"/>
           </p:nvPr>
         </p:nvSpPr>
         <p:spPr>
@@ -2085,6 +2059,7 @@
               <a:rPr lang="pt-BR"/>
               <a:t>Clique para editar os estilos de texto Mestres</a:t>
             </a:r>
+            <a:endParaRPr lang="pt-BR"/>
           </a:p>
         </p:txBody>
       </p:sp>
@@ -2105,7 +2080,6 @@
           <a:p>
             <a:fld id="{1FF31CB7-1021-4988-AE75-57CA8D34CD8E}" type="datetimeFigureOut">
               <a:rPr lang="pt-BR" smtClean="0"/>
-              <a:t>01/12/2019</a:t>
             </a:fld>
             <a:endParaRPr lang="pt-BR"/>
           </a:p>
@@ -2147,18 +2121,12 @@
           <a:p>
             <a:fld id="{3D9505F6-A9D3-41A1-B047-59C2F828AC87}" type="slidenum">
               <a:rPr lang="pt-BR" smtClean="0"/>
-              <a:t>‹nº›</a:t>
             </a:fld>
             <a:endParaRPr lang="pt-BR"/>
           </a:p>
         </p:txBody>
       </p:sp>
     </p:spTree>
-    <p:extLst>
-      <p:ext uri="{BB962C8B-B14F-4D97-AF65-F5344CB8AC3E}">
-        <p14:creationId xmlns:p14="http://schemas.microsoft.com/office/powerpoint/2010/main" val="376088360"/>
-      </p:ext>
-    </p:extLst>
   </p:cSld>
   <p:clrMapOvr>
     <a:masterClrMapping/>
@@ -2190,7 +2158,7 @@
             <a:spLocks noGrp="1"/>
           </p:cNvSpPr>
           <p:nvPr>
-            <p:ph type="title"/>
+            <p:ph type="title" hasCustomPrompt="1"/>
           </p:nvPr>
         </p:nvSpPr>
         <p:spPr>
@@ -2287,7 +2255,7 @@
             <a:spLocks noGrp="1"/>
           </p:cNvSpPr>
           <p:nvPr>
-            <p:ph type="body" sz="half" idx="2"/>
+            <p:ph type="body" sz="half" idx="2" hasCustomPrompt="1"/>
           </p:nvPr>
         </p:nvSpPr>
         <p:spPr>
@@ -2342,6 +2310,7 @@
               <a:rPr lang="pt-BR"/>
               <a:t>Clique para editar os estilos de texto Mestres</a:t>
             </a:r>
+            <a:endParaRPr lang="pt-BR"/>
           </a:p>
         </p:txBody>
       </p:sp>
@@ -2362,7 +2331,6 @@
           <a:p>
             <a:fld id="{1FF31CB7-1021-4988-AE75-57CA8D34CD8E}" type="datetimeFigureOut">
               <a:rPr lang="pt-BR" smtClean="0"/>
-              <a:t>01/12/2019</a:t>
             </a:fld>
             <a:endParaRPr lang="pt-BR"/>
           </a:p>
@@ -2404,18 +2372,12 @@
           <a:p>
             <a:fld id="{3D9505F6-A9D3-41A1-B047-59C2F828AC87}" type="slidenum">
               <a:rPr lang="pt-BR" smtClean="0"/>
-              <a:t>‹nº›</a:t>
             </a:fld>
             <a:endParaRPr lang="pt-BR"/>
           </a:p>
         </p:txBody>
       </p:sp>
     </p:spTree>
-    <p:extLst>
-      <p:ext uri="{BB962C8B-B14F-4D97-AF65-F5344CB8AC3E}">
-        <p14:creationId xmlns:p14="http://schemas.microsoft.com/office/powerpoint/2010/main" val="2189990894"/>
-      </p:ext>
-    </p:extLst>
   </p:cSld>
   <p:clrMapOvr>
     <a:masterClrMapping/>
@@ -2508,6 +2470,7 @@
               <a:rPr lang="pt-BR"/>
               <a:t>Clique para editar os estilos de texto Mestres</a:t>
             </a:r>
+            <a:endParaRPr lang="pt-BR"/>
           </a:p>
           <a:p>
             <a:pPr lvl="1"/>
@@ -2515,6 +2478,7 @@
               <a:rPr lang="pt-BR"/>
               <a:t>Segundo nível</a:t>
             </a:r>
+            <a:endParaRPr lang="pt-BR"/>
           </a:p>
           <a:p>
             <a:pPr lvl="2"/>
@@ -2522,6 +2486,7 @@
               <a:rPr lang="pt-BR"/>
               <a:t>Terceiro nível</a:t>
             </a:r>
+            <a:endParaRPr lang="pt-BR"/>
           </a:p>
           <a:p>
             <a:pPr lvl="3"/>
@@ -2529,6 +2494,7 @@
               <a:rPr lang="pt-BR"/>
               <a:t>Quarto nível</a:t>
             </a:r>
+            <a:endParaRPr lang="pt-BR"/>
           </a:p>
           <a:p>
             <a:pPr lvl="4"/>
@@ -2575,7 +2541,6 @@
           <a:p>
             <a:fld id="{1FF31CB7-1021-4988-AE75-57CA8D34CD8E}" type="datetimeFigureOut">
               <a:rPr lang="pt-BR" smtClean="0"/>
-              <a:t>01/12/2019</a:t>
             </a:fld>
             <a:endParaRPr lang="pt-BR"/>
           </a:p>
@@ -2653,32 +2618,26 @@
           <a:p>
             <a:fld id="{3D9505F6-A9D3-41A1-B047-59C2F828AC87}" type="slidenum">
               <a:rPr lang="pt-BR" smtClean="0"/>
-              <a:t>‹nº›</a:t>
             </a:fld>
             <a:endParaRPr lang="pt-BR"/>
           </a:p>
         </p:txBody>
       </p:sp>
     </p:spTree>
-    <p:extLst>
-      <p:ext uri="{BB962C8B-B14F-4D97-AF65-F5344CB8AC3E}">
-        <p14:creationId xmlns:p14="http://schemas.microsoft.com/office/powerpoint/2010/main" val="1302214046"/>
-      </p:ext>
-    </p:extLst>
   </p:cSld>
   <p:clrMap bg1="dk1" tx1="lt1" bg2="dk2" tx2="lt2" accent1="accent1" accent2="accent2" accent3="accent3" accent4="accent4" accent5="accent5" accent6="accent6" hlink="hlink" folHlink="folHlink"/>
   <p:sldLayoutIdLst>
-    <p:sldLayoutId id="2147483721" r:id="rId1"/>
-    <p:sldLayoutId id="2147483722" r:id="rId2"/>
-    <p:sldLayoutId id="2147483723" r:id="rId3"/>
-    <p:sldLayoutId id="2147483724" r:id="rId4"/>
-    <p:sldLayoutId id="2147483725" r:id="rId5"/>
-    <p:sldLayoutId id="2147483726" r:id="rId6"/>
-    <p:sldLayoutId id="2147483727" r:id="rId7"/>
-    <p:sldLayoutId id="2147483728" r:id="rId8"/>
-    <p:sldLayoutId id="2147483729" r:id="rId9"/>
-    <p:sldLayoutId id="2147483730" r:id="rId10"/>
-    <p:sldLayoutId id="2147483731" r:id="rId11"/>
+    <p:sldLayoutId id="2147483649" r:id="rId1"/>
+    <p:sldLayoutId id="2147483650" r:id="rId2"/>
+    <p:sldLayoutId id="2147483651" r:id="rId3"/>
+    <p:sldLayoutId id="2147483652" r:id="rId4"/>
+    <p:sldLayoutId id="2147483653" r:id="rId5"/>
+    <p:sldLayoutId id="2147483654" r:id="rId6"/>
+    <p:sldLayoutId id="2147483655" r:id="rId7"/>
+    <p:sldLayoutId id="2147483656" r:id="rId8"/>
+    <p:sldLayoutId id="2147483657" r:id="rId9"/>
+    <p:sldLayoutId id="2147483658" r:id="rId10"/>
+    <p:sldLayoutId id="2147483659" r:id="rId11"/>
   </p:sldLayoutIdLst>
   <p:txStyles>
     <p:titleStyle>
@@ -2990,13 +2949,142 @@
       </p:grpSpPr>
       <p:pic>
         <p:nvPicPr>
-          <p:cNvPr id="6" name="Imagem 5">
+          <p:cNvPr id="6" name="Imagem 5"/>
+          <p:cNvPicPr>
+            <a:picLocks noChangeAspect="1"/>
+          </p:cNvPicPr>
+          <p:nvPr/>
+        </p:nvPicPr>
+        <p:blipFill>
+          <a:blip r:embed="rId1">
             <a:extLst>
-              <a:ext uri="{FF2B5EF4-FFF2-40B4-BE49-F238E27FC236}">
-                <a16:creationId xmlns:a16="http://schemas.microsoft.com/office/drawing/2014/main" id="{5B2E4C1F-5B18-4ABD-B528-44B762301A7A}"/>
+              <a:ext uri="{28A0092B-C50C-407E-A947-70E740481C1C}">
+                <a14:useLocalDpi xmlns:a14="http://schemas.microsoft.com/office/drawing/2010/main" val="0"/>
               </a:ext>
             </a:extLst>
-          </p:cNvPr>
+          </a:blip>
+          <a:stretch>
+            <a:fillRect/>
+          </a:stretch>
+        </p:blipFill>
+        <p:spPr>
+          <a:xfrm>
+            <a:off x="2170042" y="1516825"/>
+            <a:ext cx="7851915" cy="3277321"/>
+          </a:xfrm>
+          <a:prstGeom prst="rect">
+            <a:avLst/>
+          </a:prstGeom>
+        </p:spPr>
+      </p:pic>
+    </p:spTree>
+  </p:cSld>
+  <p:clrMapOvr>
+    <a:masterClrMapping/>
+  </p:clrMapOvr>
+</p:sld>
+</file>
+
+<file path=ppt/slides/slide10.xml><?xml version="1.0" encoding="utf-8"?>
+<p:sld xmlns:a="http://schemas.openxmlformats.org/drawingml/2006/main" xmlns:r="http://schemas.openxmlformats.org/officeDocument/2006/relationships" xmlns:p="http://schemas.openxmlformats.org/presentationml/2006/main">
+  <p:cSld>
+    <p:spTree>
+      <p:nvGrpSpPr>
+        <p:cNvPr id="1" name=""/>
+        <p:cNvGrpSpPr/>
+        <p:nvPr/>
+      </p:nvGrpSpPr>
+      <p:grpSpPr>
+        <a:xfrm>
+          <a:off x="0" y="0"/>
+          <a:ext cx="0" cy="0"/>
+          <a:chOff x="0" y="0"/>
+          <a:chExt cx="0" cy="0"/>
+        </a:xfrm>
+      </p:grpSpPr>
+      <p:sp>
+        <p:nvSpPr>
+          <p:cNvPr id="9" name="Retângulo 8"/>
+          <p:cNvSpPr/>
+          <p:nvPr/>
+        </p:nvSpPr>
+        <p:spPr>
+          <a:xfrm>
+            <a:off x="3310597" y="168452"/>
+            <a:ext cx="5570806" cy="1322363"/>
+          </a:xfrm>
+          <a:prstGeom prst="rect">
+            <a:avLst/>
+          </a:prstGeom>
+          <a:solidFill>
+            <a:schemeClr val="bg1"/>
+          </a:solidFill>
+          <a:ln>
+            <a:solidFill>
+              <a:srgbClr val="E50D3B"/>
+            </a:solidFill>
+          </a:ln>
+        </p:spPr>
+        <p:style>
+          <a:lnRef idx="2">
+            <a:schemeClr val="accent1">
+              <a:shade val="50000"/>
+            </a:schemeClr>
+          </a:lnRef>
+          <a:fillRef idx="1">
+            <a:schemeClr val="accent1"/>
+          </a:fillRef>
+          <a:effectRef idx="0">
+            <a:schemeClr val="accent1"/>
+          </a:effectRef>
+          <a:fontRef idx="minor">
+            <a:schemeClr val="lt1"/>
+          </a:fontRef>
+        </p:style>
+        <p:txBody>
+          <a:bodyPr rtlCol="0" anchor="ctr"/>
+          <a:lstStyle/>
+          <a:p>
+            <a:pPr algn="ctr"/>
+            <a:r>
+              <a:rPr lang="en-US" altLang="pt-BR" sz="3200" dirty="0">
+                <a:latin typeface="+mj-lt"/>
+              </a:rPr>
+              <a:t>PROCESSO DE ATENDIMENTO E SUPORTE</a:t>
+            </a:r>
+            <a:endParaRPr lang="en-US" altLang="pt-BR" sz="3200" dirty="0">
+              <a:latin typeface="+mj-lt"/>
+            </a:endParaRPr>
+          </a:p>
+        </p:txBody>
+      </p:sp>
+      <p:pic>
+        <p:nvPicPr>
+          <p:cNvPr id="2" name="Imagem 1" descr="Fluxograma"/>
+          <p:cNvPicPr>
+            <a:picLocks noChangeAspect="1"/>
+          </p:cNvPicPr>
+          <p:nvPr/>
+        </p:nvPicPr>
+        <p:blipFill>
+          <a:blip r:embed="rId1"/>
+          <a:stretch>
+            <a:fillRect/>
+          </a:stretch>
+        </p:blipFill>
+        <p:spPr>
+          <a:xfrm>
+            <a:off x="2264410" y="1558925"/>
+            <a:ext cx="7508875" cy="5076190"/>
+          </a:xfrm>
+          <a:prstGeom prst="rect">
+            <a:avLst/>
+          </a:prstGeom>
+        </p:spPr>
+      </p:pic>
+      <p:pic>
+        <p:nvPicPr>
+          <p:cNvPr id="3" name="Imagem 2"/>
           <p:cNvPicPr>
             <a:picLocks noChangeAspect="1"/>
           </p:cNvPicPr>
@@ -3016,8 +3104,8 @@
         </p:blipFill>
         <p:spPr>
           <a:xfrm>
-            <a:off x="2170042" y="1516825"/>
-            <a:ext cx="7851915" cy="3277321"/>
+            <a:off x="10717883" y="105229"/>
+            <a:ext cx="1438302" cy="600335"/>
           </a:xfrm>
           <a:prstGeom prst="rect">
             <a:avLst/>
@@ -3025,15 +3113,1338 @@
         </p:spPr>
       </p:pic>
     </p:spTree>
-    <p:extLst>
-      <p:ext uri="{BB962C8B-B14F-4D97-AF65-F5344CB8AC3E}">
-        <p14:creationId xmlns:p14="http://schemas.microsoft.com/office/powerpoint/2010/main" val="1671903527"/>
-      </p:ext>
-    </p:extLst>
   </p:cSld>
   <p:clrMapOvr>
     <a:masterClrMapping/>
   </p:clrMapOvr>
+  <p:transition spd="slow">
+    <p:push dir="u"/>
+  </p:transition>
+</p:sld>
+</file>
+
+<file path=ppt/slides/slide11.xml><?xml version="1.0" encoding="utf-8"?>
+<p:sld xmlns:a="http://schemas.openxmlformats.org/drawingml/2006/main" xmlns:r="http://schemas.openxmlformats.org/officeDocument/2006/relationships" xmlns:p="http://schemas.openxmlformats.org/presentationml/2006/main">
+  <p:cSld>
+    <p:spTree>
+      <p:nvGrpSpPr>
+        <p:cNvPr id="1" name=""/>
+        <p:cNvGrpSpPr/>
+        <p:nvPr/>
+      </p:nvGrpSpPr>
+      <p:grpSpPr>
+        <a:xfrm>
+          <a:off x="0" y="0"/>
+          <a:ext cx="0" cy="0"/>
+          <a:chOff x="0" y="0"/>
+          <a:chExt cx="0" cy="0"/>
+        </a:xfrm>
+      </p:grpSpPr>
+      <p:sp>
+        <p:nvSpPr>
+          <p:cNvPr id="9" name="Retângulo 8"/>
+          <p:cNvSpPr/>
+          <p:nvPr/>
+        </p:nvSpPr>
+        <p:spPr>
+          <a:xfrm>
+            <a:off x="3310597" y="168452"/>
+            <a:ext cx="5570806" cy="1322363"/>
+          </a:xfrm>
+          <a:prstGeom prst="rect">
+            <a:avLst/>
+          </a:prstGeom>
+          <a:solidFill>
+            <a:schemeClr val="bg1"/>
+          </a:solidFill>
+          <a:ln>
+            <a:solidFill>
+              <a:srgbClr val="E50D3B"/>
+            </a:solidFill>
+          </a:ln>
+        </p:spPr>
+        <p:style>
+          <a:lnRef idx="2">
+            <a:schemeClr val="accent1">
+              <a:shade val="50000"/>
+            </a:schemeClr>
+          </a:lnRef>
+          <a:fillRef idx="1">
+            <a:schemeClr val="accent1"/>
+          </a:fillRef>
+          <a:effectRef idx="0">
+            <a:schemeClr val="accent1"/>
+          </a:effectRef>
+          <a:fontRef idx="minor">
+            <a:schemeClr val="lt1"/>
+          </a:fontRef>
+        </p:style>
+        <p:txBody>
+          <a:bodyPr rtlCol="0" anchor="ctr"/>
+          <a:lstStyle/>
+          <a:p>
+            <a:pPr algn="ctr"/>
+            <a:r>
+              <a:rPr lang="en-US" altLang="pt-BR" sz="3200" dirty="0">
+                <a:latin typeface="+mj-lt"/>
+              </a:rPr>
+              <a:t>FERRAMENTA DE HELPDESK</a:t>
+            </a:r>
+            <a:endParaRPr lang="en-US" altLang="pt-BR" sz="3200" dirty="0">
+              <a:latin typeface="+mj-lt"/>
+            </a:endParaRPr>
+          </a:p>
+        </p:txBody>
+      </p:sp>
+      <p:pic>
+        <p:nvPicPr>
+          <p:cNvPr id="3" name="Imagem 2"/>
+          <p:cNvPicPr>
+            <a:picLocks noChangeAspect="1"/>
+          </p:cNvPicPr>
+          <p:nvPr/>
+        </p:nvPicPr>
+        <p:blipFill>
+          <a:blip r:embed="rId1">
+            <a:extLst>
+              <a:ext uri="{28A0092B-C50C-407E-A947-70E740481C1C}">
+                <a14:useLocalDpi xmlns:a14="http://schemas.microsoft.com/office/drawing/2010/main" val="0"/>
+              </a:ext>
+            </a:extLst>
+          </a:blip>
+          <a:stretch>
+            <a:fillRect/>
+          </a:stretch>
+        </p:blipFill>
+        <p:spPr>
+          <a:xfrm>
+            <a:off x="10717883" y="105229"/>
+            <a:ext cx="1438302" cy="600335"/>
+          </a:xfrm>
+          <a:prstGeom prst="rect">
+            <a:avLst/>
+          </a:prstGeom>
+        </p:spPr>
+      </p:pic>
+      <p:pic>
+        <p:nvPicPr>
+          <p:cNvPr id="4" name="Imagem 3" descr="0_sPOY9cKDb_0FOzJf"/>
+          <p:cNvPicPr>
+            <a:picLocks noChangeAspect="1"/>
+          </p:cNvPicPr>
+          <p:nvPr/>
+        </p:nvPicPr>
+        <p:blipFill>
+          <a:blip r:embed="rId2"/>
+          <a:stretch>
+            <a:fillRect/>
+          </a:stretch>
+        </p:blipFill>
+        <p:spPr>
+          <a:xfrm>
+            <a:off x="629285" y="1726565"/>
+            <a:ext cx="3940175" cy="1346200"/>
+          </a:xfrm>
+          <a:prstGeom prst="rect">
+            <a:avLst/>
+          </a:prstGeom>
+        </p:spPr>
+      </p:pic>
+      <p:sp>
+        <p:nvSpPr>
+          <p:cNvPr id="5" name="Caixa de Texto 4"/>
+          <p:cNvSpPr txBox="1"/>
+          <p:nvPr/>
+        </p:nvSpPr>
+        <p:spPr>
+          <a:xfrm>
+            <a:off x="4985385" y="2242820"/>
+            <a:ext cx="5278120" cy="829945"/>
+          </a:xfrm>
+          <a:prstGeom prst="rect">
+            <a:avLst/>
+          </a:prstGeom>
+          <a:noFill/>
+        </p:spPr>
+        <p:txBody>
+          <a:bodyPr wrap="square" rtlCol="0">
+            <a:spAutoFit/>
+          </a:bodyPr>
+          <a:p>
+            <a:r>
+              <a:rPr lang="en-US" altLang="pt-BR" sz="2400">
+                <a:latin typeface="Arial" panose="020B0604020202020204" pitchFamily="34" charset="0"/>
+                <a:cs typeface="Arial" panose="020B0604020202020204" pitchFamily="34" charset="0"/>
+              </a:rPr>
+              <a:t>Ferramenta simples de ser usada e muito completa para nosso projeto</a:t>
+            </a:r>
+            <a:endParaRPr lang="en-US" altLang="pt-BR" sz="2400">
+              <a:latin typeface="Arial" panose="020B0604020202020204" pitchFamily="34" charset="0"/>
+              <a:cs typeface="Arial" panose="020B0604020202020204" pitchFamily="34" charset="0"/>
+            </a:endParaRPr>
+          </a:p>
+        </p:txBody>
+      </p:sp>
+      <p:grpSp>
+        <p:nvGrpSpPr>
+          <p:cNvPr id="10" name="Grupo 9"/>
+          <p:cNvGrpSpPr/>
+          <p:nvPr/>
+        </p:nvGrpSpPr>
+        <p:grpSpPr>
+          <a:xfrm>
+            <a:off x="7599045" y="4011295"/>
+            <a:ext cx="2694940" cy="1511300"/>
+            <a:chOff x="12118" y="7157"/>
+            <a:chExt cx="4244" cy="2380"/>
+          </a:xfrm>
+        </p:grpSpPr>
+        <p:sp>
+          <p:nvSpPr>
+            <p:cNvPr id="7" name="Texto explicativo retangular com cantos arredondados 6"/>
+            <p:cNvSpPr/>
+            <p:nvPr/>
+          </p:nvSpPr>
+          <p:spPr>
+            <a:xfrm>
+              <a:off x="12166" y="7157"/>
+              <a:ext cx="4196" cy="2297"/>
+            </a:xfrm>
+            <a:prstGeom prst="wedgeRoundRectCallout">
+              <a:avLst/>
+            </a:prstGeom>
+            <a:solidFill>
+              <a:schemeClr val="tx1">
+                <a:lumMod val="50000"/>
+              </a:schemeClr>
+            </a:solidFill>
+            <a:ln>
+              <a:noFill/>
+            </a:ln>
+          </p:spPr>
+          <p:style>
+            <a:lnRef idx="2">
+              <a:schemeClr val="dk1">
+                <a:shade val="50000"/>
+              </a:schemeClr>
+            </a:lnRef>
+            <a:fillRef idx="1">
+              <a:schemeClr val="dk1"/>
+            </a:fillRef>
+            <a:effectRef idx="0">
+              <a:schemeClr val="dk1"/>
+            </a:effectRef>
+            <a:fontRef idx="minor">
+              <a:schemeClr val="lt1"/>
+            </a:fontRef>
+          </p:style>
+          <p:txBody>
+            <a:bodyPr rtlCol="0" anchor="ctr"/>
+            <a:p>
+              <a:pPr algn="ctr"/>
+              <a:endParaRPr lang="pt-BR" altLang="en-US"/>
+            </a:p>
+          </p:txBody>
+        </p:sp>
+        <p:sp>
+          <p:nvSpPr>
+            <p:cNvPr id="8" name="Texto explicativo retangular com cantos arredondados 7"/>
+            <p:cNvSpPr/>
+            <p:nvPr/>
+          </p:nvSpPr>
+          <p:spPr>
+            <a:xfrm>
+              <a:off x="12118" y="7241"/>
+              <a:ext cx="4196" cy="2297"/>
+            </a:xfrm>
+            <a:prstGeom prst="wedgeRoundRectCallout">
+              <a:avLst/>
+            </a:prstGeom>
+            <a:solidFill>
+              <a:schemeClr val="tx1"/>
+            </a:solidFill>
+            <a:ln>
+              <a:solidFill>
+                <a:schemeClr val="bg1">
+                  <a:lumMod val="50000"/>
+                  <a:lumOff val="50000"/>
+                </a:schemeClr>
+              </a:solidFill>
+            </a:ln>
+          </p:spPr>
+          <p:style>
+            <a:lnRef idx="2">
+              <a:schemeClr val="dk1"/>
+            </a:lnRef>
+            <a:fillRef idx="1">
+              <a:schemeClr val="lt1"/>
+            </a:fillRef>
+            <a:effectRef idx="0">
+              <a:schemeClr val="dk1"/>
+            </a:effectRef>
+            <a:fontRef idx="minor">
+              <a:schemeClr val="dk1"/>
+            </a:fontRef>
+          </p:style>
+          <p:txBody>
+            <a:bodyPr rtlCol="0" anchor="ctr"/>
+            <a:p>
+              <a:pPr algn="ctr"/>
+              <a:endParaRPr lang="pt-BR" altLang="en-US"/>
+            </a:p>
+          </p:txBody>
+        </p:sp>
+      </p:grpSp>
+      <p:sp>
+        <p:nvSpPr>
+          <p:cNvPr id="11" name="Caixa de Texto 10"/>
+          <p:cNvSpPr txBox="1"/>
+          <p:nvPr/>
+        </p:nvSpPr>
+        <p:spPr>
+          <a:xfrm>
+            <a:off x="1429385" y="4378960"/>
+            <a:ext cx="5278120" cy="829945"/>
+          </a:xfrm>
+          <a:prstGeom prst="rect">
+            <a:avLst/>
+          </a:prstGeom>
+          <a:noFill/>
+        </p:spPr>
+        <p:txBody>
+          <a:bodyPr wrap="square" rtlCol="0">
+            <a:spAutoFit/>
+          </a:bodyPr>
+          <a:p>
+            <a:pPr algn="r"/>
+            <a:r>
+              <a:rPr lang="en-US" altLang="pt-BR" sz="2400">
+                <a:latin typeface="Arial" panose="020B0604020202020204" pitchFamily="34" charset="0"/>
+                <a:cs typeface="Arial" panose="020B0604020202020204" pitchFamily="34" charset="0"/>
+              </a:rPr>
+              <a:t>Implementação de Atendimento online direto no site</a:t>
+            </a:r>
+            <a:endParaRPr lang="en-US" altLang="pt-BR" sz="2400">
+              <a:latin typeface="Arial" panose="020B0604020202020204" pitchFamily="34" charset="0"/>
+              <a:cs typeface="Arial" panose="020B0604020202020204" pitchFamily="34" charset="0"/>
+            </a:endParaRPr>
+          </a:p>
+        </p:txBody>
+      </p:sp>
+    </p:spTree>
+  </p:cSld>
+  <p:clrMapOvr>
+    <a:masterClrMapping/>
+  </p:clrMapOvr>
+  <p:transition spd="slow">
+    <p:push dir="u"/>
+  </p:transition>
+</p:sld>
+</file>
+
+<file path=ppt/slides/slide12.xml><?xml version="1.0" encoding="utf-8"?>
+<p:sld xmlns:a="http://schemas.openxmlformats.org/drawingml/2006/main" xmlns:r="http://schemas.openxmlformats.org/officeDocument/2006/relationships" xmlns:p="http://schemas.openxmlformats.org/presentationml/2006/main">
+  <p:cSld>
+    <p:spTree>
+      <p:nvGrpSpPr>
+        <p:cNvPr id="1" name=""/>
+        <p:cNvGrpSpPr/>
+        <p:nvPr/>
+      </p:nvGrpSpPr>
+      <p:grpSpPr>
+        <a:xfrm>
+          <a:off x="0" y="0"/>
+          <a:ext cx="0" cy="0"/>
+          <a:chOff x="0" y="0"/>
+          <a:chExt cx="0" cy="0"/>
+        </a:xfrm>
+      </p:grpSpPr>
+      <p:sp>
+        <p:nvSpPr>
+          <p:cNvPr id="9" name="Retângulo 8"/>
+          <p:cNvSpPr/>
+          <p:nvPr/>
+        </p:nvSpPr>
+        <p:spPr>
+          <a:xfrm>
+            <a:off x="3310597" y="168452"/>
+            <a:ext cx="5570806" cy="1322363"/>
+          </a:xfrm>
+          <a:prstGeom prst="rect">
+            <a:avLst/>
+          </a:prstGeom>
+          <a:solidFill>
+            <a:schemeClr val="bg1"/>
+          </a:solidFill>
+          <a:ln>
+            <a:solidFill>
+              <a:srgbClr val="E50D3B"/>
+            </a:solidFill>
+          </a:ln>
+        </p:spPr>
+        <p:style>
+          <a:lnRef idx="2">
+            <a:schemeClr val="accent1">
+              <a:shade val="50000"/>
+            </a:schemeClr>
+          </a:lnRef>
+          <a:fillRef idx="1">
+            <a:schemeClr val="accent1"/>
+          </a:fillRef>
+          <a:effectRef idx="0">
+            <a:schemeClr val="accent1"/>
+          </a:effectRef>
+          <a:fontRef idx="minor">
+            <a:schemeClr val="lt1"/>
+          </a:fontRef>
+        </p:style>
+        <p:txBody>
+          <a:bodyPr rtlCol="0" anchor="ctr"/>
+          <a:lstStyle/>
+          <a:p>
+            <a:pPr algn="ctr"/>
+            <a:r>
+              <a:rPr lang="en-US" altLang="pt-BR" sz="3200" dirty="0">
+                <a:latin typeface="+mj-lt"/>
+              </a:rPr>
+              <a:t>RESULTADOS</a:t>
+            </a:r>
+            <a:endParaRPr lang="en-US" altLang="pt-BR" sz="3200" dirty="0">
+              <a:latin typeface="+mj-lt"/>
+            </a:endParaRPr>
+          </a:p>
+        </p:txBody>
+      </p:sp>
+      <p:pic>
+        <p:nvPicPr>
+          <p:cNvPr id="3" name="Imagem 2"/>
+          <p:cNvPicPr>
+            <a:picLocks noChangeAspect="1"/>
+          </p:cNvPicPr>
+          <p:nvPr/>
+        </p:nvPicPr>
+        <p:blipFill>
+          <a:blip r:embed="rId1">
+            <a:extLst>
+              <a:ext uri="{28A0092B-C50C-407E-A947-70E740481C1C}">
+                <a14:useLocalDpi xmlns:a14="http://schemas.microsoft.com/office/drawing/2010/main" val="0"/>
+              </a:ext>
+            </a:extLst>
+          </a:blip>
+          <a:stretch>
+            <a:fillRect/>
+          </a:stretch>
+        </p:blipFill>
+        <p:spPr>
+          <a:xfrm>
+            <a:off x="10717883" y="105229"/>
+            <a:ext cx="1438302" cy="600335"/>
+          </a:xfrm>
+          <a:prstGeom prst="rect">
+            <a:avLst/>
+          </a:prstGeom>
+        </p:spPr>
+      </p:pic>
+      <p:sp>
+        <p:nvSpPr>
+          <p:cNvPr id="5" name="Caixa de Texto 4"/>
+          <p:cNvSpPr txBox="1"/>
+          <p:nvPr/>
+        </p:nvSpPr>
+        <p:spPr>
+          <a:xfrm>
+            <a:off x="4324985" y="2242820"/>
+            <a:ext cx="6271260" cy="1198880"/>
+          </a:xfrm>
+          <a:prstGeom prst="rect">
+            <a:avLst/>
+          </a:prstGeom>
+          <a:noFill/>
+        </p:spPr>
+        <p:txBody>
+          <a:bodyPr wrap="square" rtlCol="0">
+            <a:spAutoFit/>
+          </a:bodyPr>
+          <a:p>
+            <a:pPr algn="ctr"/>
+            <a:r>
+              <a:rPr lang="en-US" altLang="pt-BR" sz="2400">
+                <a:latin typeface="Arial" panose="020B0604020202020204" pitchFamily="34" charset="0"/>
+                <a:cs typeface="Arial" panose="020B0604020202020204" pitchFamily="34" charset="0"/>
+              </a:rPr>
+              <a:t>A equipe teve um excelente entrosamento. Não só cumprimos os objetivos, como fizemos de forma rápida e com excelência</a:t>
+            </a:r>
+            <a:endParaRPr lang="en-US" altLang="pt-BR" sz="2400">
+              <a:latin typeface="Arial" panose="020B0604020202020204" pitchFamily="34" charset="0"/>
+              <a:cs typeface="Arial" panose="020B0604020202020204" pitchFamily="34" charset="0"/>
+            </a:endParaRPr>
+          </a:p>
+        </p:txBody>
+      </p:sp>
+      <p:sp>
+        <p:nvSpPr>
+          <p:cNvPr id="11" name="Caixa de Texto 10"/>
+          <p:cNvSpPr txBox="1"/>
+          <p:nvPr/>
+        </p:nvSpPr>
+        <p:spPr>
+          <a:xfrm>
+            <a:off x="1595120" y="4366260"/>
+            <a:ext cx="9001125" cy="829945"/>
+          </a:xfrm>
+          <a:prstGeom prst="rect">
+            <a:avLst/>
+          </a:prstGeom>
+          <a:noFill/>
+        </p:spPr>
+        <p:txBody>
+          <a:bodyPr wrap="square" rtlCol="0">
+            <a:spAutoFit/>
+          </a:bodyPr>
+          <a:p>
+            <a:pPr algn="ctr"/>
+            <a:r>
+              <a:rPr lang="en-US" altLang="pt-BR" sz="2400">
+                <a:latin typeface="Arial" panose="020B0604020202020204" pitchFamily="34" charset="0"/>
+                <a:cs typeface="Arial" panose="020B0604020202020204" pitchFamily="34" charset="0"/>
+                <a:sym typeface="+mn-ea"/>
+              </a:rPr>
+              <a:t>O crescimento individual de todos foi muito constante durante o projeto</a:t>
+            </a:r>
+            <a:endParaRPr lang="en-US" altLang="pt-BR" sz="2400">
+              <a:latin typeface="Arial" panose="020B0604020202020204" pitchFamily="34" charset="0"/>
+              <a:cs typeface="Arial" panose="020B0604020202020204" pitchFamily="34" charset="0"/>
+            </a:endParaRPr>
+          </a:p>
+        </p:txBody>
+      </p:sp>
+      <p:pic>
+        <p:nvPicPr>
+          <p:cNvPr id="2" name="Imagem 1" descr="like"/>
+          <p:cNvPicPr>
+            <a:picLocks noChangeAspect="1"/>
+          </p:cNvPicPr>
+          <p:nvPr/>
+        </p:nvPicPr>
+        <p:blipFill>
+          <a:blip r:embed="rId2"/>
+          <a:stretch>
+            <a:fillRect/>
+          </a:stretch>
+        </p:blipFill>
+        <p:spPr>
+          <a:xfrm>
+            <a:off x="1263650" y="1490345"/>
+            <a:ext cx="2438400" cy="2438400"/>
+          </a:xfrm>
+          <a:prstGeom prst="rect">
+            <a:avLst/>
+          </a:prstGeom>
+          <a:noFill/>
+        </p:spPr>
+      </p:pic>
+    </p:spTree>
+  </p:cSld>
+  <p:clrMapOvr>
+    <a:masterClrMapping/>
+  </p:clrMapOvr>
+  <p:transition spd="slow">
+    <p:push dir="u"/>
+  </p:transition>
+</p:sld>
+</file>
+
+<file path=ppt/slides/slide13.xml><?xml version="1.0" encoding="utf-8"?>
+<p:sld xmlns:a="http://schemas.openxmlformats.org/drawingml/2006/main" xmlns:r="http://schemas.openxmlformats.org/officeDocument/2006/relationships" xmlns:p="http://schemas.openxmlformats.org/presentationml/2006/main">
+  <p:cSld>
+    <p:spTree>
+      <p:nvGrpSpPr>
+        <p:cNvPr id="1" name=""/>
+        <p:cNvGrpSpPr/>
+        <p:nvPr/>
+      </p:nvGrpSpPr>
+      <p:grpSpPr>
+        <a:xfrm>
+          <a:off x="0" y="0"/>
+          <a:ext cx="0" cy="0"/>
+          <a:chOff x="0" y="0"/>
+          <a:chExt cx="0" cy="0"/>
+        </a:xfrm>
+      </p:grpSpPr>
+      <p:sp>
+        <p:nvSpPr>
+          <p:cNvPr id="9" name="Retângulo 8"/>
+          <p:cNvSpPr/>
+          <p:nvPr/>
+        </p:nvSpPr>
+        <p:spPr>
+          <a:xfrm>
+            <a:off x="3310890" y="168275"/>
+            <a:ext cx="5570855" cy="1132840"/>
+          </a:xfrm>
+          <a:prstGeom prst="rect">
+            <a:avLst/>
+          </a:prstGeom>
+          <a:solidFill>
+            <a:schemeClr val="bg1"/>
+          </a:solidFill>
+          <a:ln>
+            <a:solidFill>
+              <a:srgbClr val="E50D3B"/>
+            </a:solidFill>
+          </a:ln>
+        </p:spPr>
+        <p:style>
+          <a:lnRef idx="2">
+            <a:schemeClr val="accent1">
+              <a:shade val="50000"/>
+            </a:schemeClr>
+          </a:lnRef>
+          <a:fillRef idx="1">
+            <a:schemeClr val="accent1"/>
+          </a:fillRef>
+          <a:effectRef idx="0">
+            <a:schemeClr val="accent1"/>
+          </a:effectRef>
+          <a:fontRef idx="minor">
+            <a:schemeClr val="lt1"/>
+          </a:fontRef>
+        </p:style>
+        <p:txBody>
+          <a:bodyPr rtlCol="0" anchor="ctr"/>
+          <a:lstStyle/>
+          <a:p>
+            <a:pPr algn="ctr"/>
+            <a:r>
+              <a:rPr lang="en-US" altLang="pt-BR" sz="3200" dirty="0">
+                <a:latin typeface="+mj-lt"/>
+              </a:rPr>
+              <a:t>PROCESSO DE APRENDIZAGEM</a:t>
+            </a:r>
+            <a:endParaRPr lang="en-US" altLang="pt-BR" sz="3200" dirty="0">
+              <a:latin typeface="+mj-lt"/>
+            </a:endParaRPr>
+          </a:p>
+        </p:txBody>
+      </p:sp>
+      <p:pic>
+        <p:nvPicPr>
+          <p:cNvPr id="3" name="Imagem 2"/>
+          <p:cNvPicPr>
+            <a:picLocks noChangeAspect="1"/>
+          </p:cNvPicPr>
+          <p:nvPr/>
+        </p:nvPicPr>
+        <p:blipFill>
+          <a:blip r:embed="rId1">
+            <a:extLst>
+              <a:ext uri="{28A0092B-C50C-407E-A947-70E740481C1C}">
+                <a14:useLocalDpi xmlns:a14="http://schemas.microsoft.com/office/drawing/2010/main" val="0"/>
+              </a:ext>
+            </a:extLst>
+          </a:blip>
+          <a:stretch>
+            <a:fillRect/>
+          </a:stretch>
+        </p:blipFill>
+        <p:spPr>
+          <a:xfrm>
+            <a:off x="10717883" y="105229"/>
+            <a:ext cx="1438302" cy="600335"/>
+          </a:xfrm>
+          <a:prstGeom prst="rect">
+            <a:avLst/>
+          </a:prstGeom>
+        </p:spPr>
+      </p:pic>
+      <p:sp>
+        <p:nvSpPr>
+          <p:cNvPr id="11" name="Caixa de Texto 10"/>
+          <p:cNvSpPr txBox="1"/>
+          <p:nvPr/>
+        </p:nvSpPr>
+        <p:spPr>
+          <a:xfrm>
+            <a:off x="363220" y="1301115"/>
+            <a:ext cx="11096625" cy="5815965"/>
+          </a:xfrm>
+          <a:prstGeom prst="rect">
+            <a:avLst/>
+          </a:prstGeom>
+          <a:noFill/>
+        </p:spPr>
+        <p:txBody>
+          <a:bodyPr wrap="square" rtlCol="0">
+            <a:spAutoFit/>
+          </a:bodyPr>
+          <a:p>
+            <a:pPr algn="l"/>
+            <a:r>
+              <a:rPr lang="en-US" altLang="pt-BR" sz="2000">
+                <a:solidFill>
+                  <a:schemeClr val="accent5"/>
+                </a:solidFill>
+                <a:latin typeface="Arial" panose="020B0604020202020204" pitchFamily="34" charset="0"/>
+                <a:cs typeface="Arial" panose="020B0604020202020204" pitchFamily="34" charset="0"/>
+                <a:sym typeface="+mn-ea"/>
+              </a:rPr>
+              <a:t>Arthur</a:t>
+            </a:r>
+            <a:endParaRPr lang="en-US" altLang="pt-BR" sz="2000">
+              <a:solidFill>
+                <a:schemeClr val="accent5"/>
+              </a:solidFill>
+              <a:latin typeface="Arial" panose="020B0604020202020204" pitchFamily="34" charset="0"/>
+              <a:cs typeface="Arial" panose="020B0604020202020204" pitchFamily="34" charset="0"/>
+              <a:sym typeface="+mn-ea"/>
+            </a:endParaRPr>
+          </a:p>
+          <a:p>
+            <a:pPr algn="l"/>
+            <a:r>
+              <a:rPr lang="en-US" altLang="pt-BR" sz="1400">
+                <a:solidFill>
+                  <a:schemeClr val="accent5"/>
+                </a:solidFill>
+                <a:latin typeface="Arial" panose="020B0604020202020204" pitchFamily="34" charset="0"/>
+                <a:cs typeface="Arial" panose="020B0604020202020204" pitchFamily="34" charset="0"/>
+              </a:rPr>
+              <a:t>Product Owner</a:t>
+            </a:r>
+            <a:endParaRPr lang="en-US" altLang="pt-BR" sz="1400">
+              <a:latin typeface="Arial" panose="020B0604020202020204" pitchFamily="34" charset="0"/>
+              <a:cs typeface="Arial" panose="020B0604020202020204" pitchFamily="34" charset="0"/>
+            </a:endParaRPr>
+          </a:p>
+          <a:p>
+            <a:pPr algn="l"/>
+            <a:r>
+              <a:rPr lang="en-US" altLang="pt-BR">
+                <a:latin typeface="Arial" panose="020B0604020202020204" pitchFamily="34" charset="0"/>
+                <a:cs typeface="Arial" panose="020B0604020202020204" pitchFamily="34" charset="0"/>
+              </a:rPr>
+              <a:t>“Aprendi muito tecnicamente durante todo o processo do projeto. Mas o que mais aprendi foi a ter uma melhor liderança, impulsionar todos juntos para frente rumo ao Objetivo.”</a:t>
+            </a:r>
+            <a:endParaRPr lang="en-US" altLang="pt-BR">
+              <a:latin typeface="Arial" panose="020B0604020202020204" pitchFamily="34" charset="0"/>
+              <a:cs typeface="Arial" panose="020B0604020202020204" pitchFamily="34" charset="0"/>
+            </a:endParaRPr>
+          </a:p>
+          <a:p>
+            <a:pPr algn="l"/>
+            <a:r>
+              <a:rPr lang="en-US" altLang="pt-BR" sz="2000">
+                <a:solidFill>
+                  <a:schemeClr val="accent5">
+                    <a:lumMod val="40000"/>
+                    <a:lumOff val="60000"/>
+                  </a:schemeClr>
+                </a:solidFill>
+                <a:latin typeface="Arial" panose="020B0604020202020204" pitchFamily="34" charset="0"/>
+                <a:cs typeface="Arial" panose="020B0604020202020204" pitchFamily="34" charset="0"/>
+                <a:sym typeface="+mn-ea"/>
+              </a:rPr>
+              <a:t>João</a:t>
+            </a:r>
+            <a:endParaRPr lang="en-US" altLang="pt-BR" sz="2000">
+              <a:solidFill>
+                <a:schemeClr val="accent5">
+                  <a:lumMod val="40000"/>
+                  <a:lumOff val="60000"/>
+                </a:schemeClr>
+              </a:solidFill>
+              <a:latin typeface="Arial" panose="020B0604020202020204" pitchFamily="34" charset="0"/>
+              <a:cs typeface="Arial" panose="020B0604020202020204" pitchFamily="34" charset="0"/>
+              <a:sym typeface="+mn-ea"/>
+            </a:endParaRPr>
+          </a:p>
+          <a:p>
+            <a:pPr algn="l"/>
+            <a:r>
+              <a:rPr lang="en-US" altLang="pt-BR" sz="1400">
+                <a:solidFill>
+                  <a:schemeClr val="accent5">
+                    <a:lumMod val="40000"/>
+                    <a:lumOff val="60000"/>
+                  </a:schemeClr>
+                </a:solidFill>
+                <a:latin typeface="Arial" panose="020B0604020202020204" pitchFamily="34" charset="0"/>
+                <a:cs typeface="Arial" panose="020B0604020202020204" pitchFamily="34" charset="0"/>
+              </a:rPr>
+              <a:t>DEV</a:t>
+            </a:r>
+            <a:endParaRPr lang="en-US" altLang="pt-BR">
+              <a:latin typeface="Arial" panose="020B0604020202020204" pitchFamily="34" charset="0"/>
+              <a:cs typeface="Arial" panose="020B0604020202020204" pitchFamily="34" charset="0"/>
+            </a:endParaRPr>
+          </a:p>
+          <a:p>
+            <a:pPr algn="l"/>
+            <a:r>
+              <a:rPr lang="en-US" altLang="pt-BR">
+                <a:latin typeface="Arial" panose="020B0604020202020204" pitchFamily="34" charset="0"/>
+                <a:cs typeface="Arial" panose="020B0604020202020204" pitchFamily="34" charset="0"/>
+                <a:sym typeface="+mn-ea"/>
+              </a:rPr>
+              <a:t>“Foi um aprendizado muito interessante, a mudança de grupo foi desafiadora, trabalhar com pessoas novas das quais o contato não era grande, pórem que me auziliaram e muito em minhas atividades tecnicas no projeto, fico muito feliz onde chegamos apesar de todas as barreiras”</a:t>
+            </a:r>
+            <a:endParaRPr lang="en-US" altLang="pt-BR">
+              <a:latin typeface="Arial" panose="020B0604020202020204" pitchFamily="34" charset="0"/>
+              <a:cs typeface="Arial" panose="020B0604020202020204" pitchFamily="34" charset="0"/>
+            </a:endParaRPr>
+          </a:p>
+          <a:p>
+            <a:pPr algn="l"/>
+            <a:r>
+              <a:rPr lang="en-US" altLang="pt-BR" sz="2000">
+                <a:solidFill>
+                  <a:srgbClr val="7030A0"/>
+                </a:solidFill>
+                <a:latin typeface="Arial" panose="020B0604020202020204" pitchFamily="34" charset="0"/>
+                <a:cs typeface="Arial" panose="020B0604020202020204" pitchFamily="34" charset="0"/>
+                <a:sym typeface="+mn-ea"/>
+              </a:rPr>
+              <a:t>Manoel</a:t>
+            </a:r>
+            <a:endParaRPr lang="en-US" altLang="pt-BR" sz="2000">
+              <a:solidFill>
+                <a:srgbClr val="7030A0"/>
+              </a:solidFill>
+              <a:latin typeface="Arial" panose="020B0604020202020204" pitchFamily="34" charset="0"/>
+              <a:cs typeface="Arial" panose="020B0604020202020204" pitchFamily="34" charset="0"/>
+              <a:sym typeface="+mn-ea"/>
+            </a:endParaRPr>
+          </a:p>
+          <a:p>
+            <a:pPr algn="l"/>
+            <a:r>
+              <a:rPr lang="en-US" altLang="pt-BR" sz="1400">
+                <a:solidFill>
+                  <a:srgbClr val="7030A0"/>
+                </a:solidFill>
+                <a:latin typeface="Arial" panose="020B0604020202020204" pitchFamily="34" charset="0"/>
+                <a:cs typeface="Arial" panose="020B0604020202020204" pitchFamily="34" charset="0"/>
+                <a:sym typeface="+mn-ea"/>
+              </a:rPr>
+              <a:t>Scrum Master</a:t>
+            </a:r>
+            <a:endParaRPr lang="en-US" altLang="pt-BR" sz="2000">
+              <a:latin typeface="Arial" panose="020B0604020202020204" pitchFamily="34" charset="0"/>
+              <a:cs typeface="Arial" panose="020B0604020202020204" pitchFamily="34" charset="0"/>
+            </a:endParaRPr>
+          </a:p>
+          <a:p>
+            <a:pPr algn="l"/>
+            <a:r>
+              <a:rPr lang="en-US" altLang="pt-BR">
+                <a:latin typeface="Arial" panose="020B0604020202020204" pitchFamily="34" charset="0"/>
+                <a:cs typeface="Arial" panose="020B0604020202020204" pitchFamily="34" charset="0"/>
+                <a:sym typeface="+mn-ea"/>
+              </a:rPr>
+              <a:t>“Foi uma experiência muito marcante, aprender a me relacionar com pessoas novas e lidar com tecnologias que eu não conhecia foi muito desafiador, mas no final fiquei bem satisfeito com o resultado do projeto e com o que descobri ser capaz de desenvolver”</a:t>
+            </a:r>
+            <a:endParaRPr lang="en-US" altLang="pt-BR">
+              <a:latin typeface="Arial" panose="020B0604020202020204" pitchFamily="34" charset="0"/>
+              <a:cs typeface="Arial" panose="020B0604020202020204" pitchFamily="34" charset="0"/>
+              <a:sym typeface="+mn-ea"/>
+            </a:endParaRPr>
+          </a:p>
+          <a:p>
+            <a:pPr algn="l"/>
+            <a:r>
+              <a:rPr lang="en-US" altLang="pt-BR" sz="2000">
+                <a:solidFill>
+                  <a:schemeClr val="accent3"/>
+                </a:solidFill>
+                <a:latin typeface="Arial" panose="020B0604020202020204" pitchFamily="34" charset="0"/>
+                <a:cs typeface="Arial" panose="020B0604020202020204" pitchFamily="34" charset="0"/>
+                <a:sym typeface="+mn-ea"/>
+              </a:rPr>
+              <a:t>Pedro</a:t>
+            </a:r>
+            <a:endParaRPr lang="en-US" altLang="pt-BR">
+              <a:solidFill>
+                <a:schemeClr val="accent3"/>
+              </a:solidFill>
+              <a:latin typeface="Arial" panose="020B0604020202020204" pitchFamily="34" charset="0"/>
+              <a:cs typeface="Arial" panose="020B0604020202020204" pitchFamily="34" charset="0"/>
+              <a:sym typeface="+mn-ea"/>
+            </a:endParaRPr>
+          </a:p>
+          <a:p>
+            <a:pPr algn="l"/>
+            <a:r>
+              <a:rPr lang="en-US" altLang="pt-BR" sz="1400">
+                <a:solidFill>
+                  <a:schemeClr val="accent3"/>
+                </a:solidFill>
+                <a:latin typeface="Arial" panose="020B0604020202020204" pitchFamily="34" charset="0"/>
+                <a:cs typeface="Arial" panose="020B0604020202020204" pitchFamily="34" charset="0"/>
+                <a:sym typeface="+mn-ea"/>
+              </a:rPr>
+              <a:t>DEV</a:t>
+            </a:r>
+            <a:endParaRPr lang="en-US" altLang="pt-BR">
+              <a:latin typeface="Arial" panose="020B0604020202020204" pitchFamily="34" charset="0"/>
+              <a:cs typeface="Arial" panose="020B0604020202020204" pitchFamily="34" charset="0"/>
+              <a:sym typeface="+mn-ea"/>
+            </a:endParaRPr>
+          </a:p>
+          <a:p>
+            <a:pPr algn="l"/>
+            <a:r>
+              <a:rPr lang="en-US" altLang="pt-BR">
+                <a:latin typeface="Arial" panose="020B0604020202020204" pitchFamily="34" charset="0"/>
+                <a:cs typeface="Arial" panose="020B0604020202020204" pitchFamily="34" charset="0"/>
+                <a:sym typeface="+mn-ea"/>
+              </a:rPr>
+              <a:t>“Agradeço pela oportunidade de aprender durante todo esse processo. Tenho muito ao que aprender ainda, mas esse tempo foi um desafio,pois lidar com quem você não conhece, e ainda mais, trabalhar com elas é difícil, mas aqui chegamos. Esse projeto me fez enxergar que sou capaz ainda mais de desenvolver meu aprendizado. Fico feliz por ter dado tudo certo””</a:t>
+            </a:r>
+            <a:endParaRPr lang="en-US" altLang="pt-BR" sz="2000">
+              <a:latin typeface="Arial" panose="020B0604020202020204" pitchFamily="34" charset="0"/>
+              <a:cs typeface="Arial" panose="020B0604020202020204" pitchFamily="34" charset="0"/>
+            </a:endParaRPr>
+          </a:p>
+          <a:p>
+            <a:pPr algn="l"/>
+            <a:endParaRPr lang="en-US" altLang="pt-BR" sz="2000">
+              <a:latin typeface="Arial" panose="020B0604020202020204" pitchFamily="34" charset="0"/>
+              <a:cs typeface="Arial" panose="020B0604020202020204" pitchFamily="34" charset="0"/>
+            </a:endParaRPr>
+          </a:p>
+        </p:txBody>
+      </p:sp>
+    </p:spTree>
+  </p:cSld>
+  <p:clrMapOvr>
+    <a:masterClrMapping/>
+  </p:clrMapOvr>
+  <p:transition spd="slow">
+    <p:push dir="u"/>
+  </p:transition>
+</p:sld>
+</file>
+
+<file path=ppt/slides/slide14.xml><?xml version="1.0" encoding="utf-8"?>
+<p:sld xmlns:a="http://schemas.openxmlformats.org/drawingml/2006/main" xmlns:r="http://schemas.openxmlformats.org/officeDocument/2006/relationships" xmlns:p="http://schemas.openxmlformats.org/presentationml/2006/main">
+  <p:cSld>
+    <p:spTree>
+      <p:nvGrpSpPr>
+        <p:cNvPr id="1" name=""/>
+        <p:cNvGrpSpPr/>
+        <p:nvPr/>
+      </p:nvGrpSpPr>
+      <p:grpSpPr>
+        <a:xfrm>
+          <a:off x="0" y="0"/>
+          <a:ext cx="0" cy="0"/>
+          <a:chOff x="0" y="0"/>
+          <a:chExt cx="0" cy="0"/>
+        </a:xfrm>
+      </p:grpSpPr>
+      <p:sp>
+        <p:nvSpPr>
+          <p:cNvPr id="9" name="Retângulo 8"/>
+          <p:cNvSpPr/>
+          <p:nvPr/>
+        </p:nvSpPr>
+        <p:spPr>
+          <a:xfrm>
+            <a:off x="3310597" y="168452"/>
+            <a:ext cx="5570806" cy="1322363"/>
+          </a:xfrm>
+          <a:prstGeom prst="rect">
+            <a:avLst/>
+          </a:prstGeom>
+          <a:solidFill>
+            <a:schemeClr val="bg1"/>
+          </a:solidFill>
+          <a:ln>
+            <a:solidFill>
+              <a:srgbClr val="E50D3B"/>
+            </a:solidFill>
+          </a:ln>
+        </p:spPr>
+        <p:style>
+          <a:lnRef idx="2">
+            <a:schemeClr val="accent1">
+              <a:shade val="50000"/>
+            </a:schemeClr>
+          </a:lnRef>
+          <a:fillRef idx="1">
+            <a:schemeClr val="accent1"/>
+          </a:fillRef>
+          <a:effectRef idx="0">
+            <a:schemeClr val="accent1"/>
+          </a:effectRef>
+          <a:fontRef idx="minor">
+            <a:schemeClr val="lt1"/>
+          </a:fontRef>
+        </p:style>
+        <p:txBody>
+          <a:bodyPr rtlCol="0" anchor="ctr"/>
+          <a:lstStyle/>
+          <a:p>
+            <a:pPr algn="ctr"/>
+            <a:r>
+              <a:rPr lang="en-US" altLang="pt-BR" sz="3200" dirty="0">
+                <a:latin typeface="+mj-lt"/>
+              </a:rPr>
+              <a:t>FUTURO</a:t>
+            </a:r>
+            <a:endParaRPr lang="en-US" altLang="pt-BR" sz="3200" dirty="0">
+              <a:latin typeface="+mj-lt"/>
+            </a:endParaRPr>
+          </a:p>
+        </p:txBody>
+      </p:sp>
+      <p:pic>
+        <p:nvPicPr>
+          <p:cNvPr id="3" name="Imagem 2"/>
+          <p:cNvPicPr>
+            <a:picLocks noChangeAspect="1"/>
+          </p:cNvPicPr>
+          <p:nvPr/>
+        </p:nvPicPr>
+        <p:blipFill>
+          <a:blip r:embed="rId1">
+            <a:extLst>
+              <a:ext uri="{28A0092B-C50C-407E-A947-70E740481C1C}">
+                <a14:useLocalDpi xmlns:a14="http://schemas.microsoft.com/office/drawing/2010/main" val="0"/>
+              </a:ext>
+            </a:extLst>
+          </a:blip>
+          <a:stretch>
+            <a:fillRect/>
+          </a:stretch>
+        </p:blipFill>
+        <p:spPr>
+          <a:xfrm>
+            <a:off x="10717883" y="105229"/>
+            <a:ext cx="1438302" cy="600335"/>
+          </a:xfrm>
+          <a:prstGeom prst="rect">
+            <a:avLst/>
+          </a:prstGeom>
+        </p:spPr>
+      </p:pic>
+      <p:sp>
+        <p:nvSpPr>
+          <p:cNvPr id="5" name="Caixa de Texto 4"/>
+          <p:cNvSpPr txBox="1"/>
+          <p:nvPr/>
+        </p:nvSpPr>
+        <p:spPr>
+          <a:xfrm>
+            <a:off x="4324985" y="2242820"/>
+            <a:ext cx="6271260" cy="1198880"/>
+          </a:xfrm>
+          <a:prstGeom prst="rect">
+            <a:avLst/>
+          </a:prstGeom>
+          <a:noFill/>
+        </p:spPr>
+        <p:txBody>
+          <a:bodyPr wrap="square" rtlCol="0">
+            <a:spAutoFit/>
+          </a:bodyPr>
+          <a:p>
+            <a:pPr algn="ctr"/>
+            <a:r>
+              <a:rPr lang="en-US" altLang="pt-BR" sz="2400">
+                <a:latin typeface="Arial" panose="020B0604020202020204" pitchFamily="34" charset="0"/>
+                <a:cs typeface="Arial" panose="020B0604020202020204" pitchFamily="34" charset="0"/>
+              </a:rPr>
+              <a:t>Sensores pelos corredores, indicando o que cada corredor contém. Utilização parecida com a “placa de corredor”</a:t>
+            </a:r>
+            <a:endParaRPr lang="en-US" altLang="pt-BR" sz="2400">
+              <a:latin typeface="Arial" panose="020B0604020202020204" pitchFamily="34" charset="0"/>
+              <a:cs typeface="Arial" panose="020B0604020202020204" pitchFamily="34" charset="0"/>
+            </a:endParaRPr>
+          </a:p>
+        </p:txBody>
+      </p:sp>
+      <p:sp>
+        <p:nvSpPr>
+          <p:cNvPr id="11" name="Caixa de Texto 10"/>
+          <p:cNvSpPr txBox="1"/>
+          <p:nvPr/>
+        </p:nvSpPr>
+        <p:spPr>
+          <a:xfrm>
+            <a:off x="1595120" y="4366260"/>
+            <a:ext cx="9001125" cy="460375"/>
+          </a:xfrm>
+          <a:prstGeom prst="rect">
+            <a:avLst/>
+          </a:prstGeom>
+          <a:noFill/>
+        </p:spPr>
+        <p:txBody>
+          <a:bodyPr wrap="square" rtlCol="0">
+            <a:spAutoFit/>
+          </a:bodyPr>
+          <a:p>
+            <a:pPr algn="ctr"/>
+            <a:r>
+              <a:rPr lang="en-US" altLang="pt-BR" sz="2400">
+                <a:latin typeface="Arial" panose="020B0604020202020204" pitchFamily="34" charset="0"/>
+                <a:cs typeface="Arial" panose="020B0604020202020204" pitchFamily="34" charset="0"/>
+                <a:sym typeface="+mn-ea"/>
+              </a:rPr>
+              <a:t>Facilitando a localização e dispensando a ajuda de funcionários</a:t>
+            </a:r>
+            <a:endParaRPr lang="en-US" altLang="pt-BR" sz="2400">
+              <a:latin typeface="Arial" panose="020B0604020202020204" pitchFamily="34" charset="0"/>
+              <a:cs typeface="Arial" panose="020B0604020202020204" pitchFamily="34" charset="0"/>
+            </a:endParaRPr>
+          </a:p>
+        </p:txBody>
+      </p:sp>
+      <p:pic>
+        <p:nvPicPr>
+          <p:cNvPr id="2" name="Imagem 1" descr="like"/>
+          <p:cNvPicPr>
+            <a:picLocks noChangeAspect="1"/>
+          </p:cNvPicPr>
+          <p:nvPr/>
+        </p:nvPicPr>
+        <p:blipFill>
+          <a:blip r:embed="rId2"/>
+          <a:stretch>
+            <a:fillRect/>
+          </a:stretch>
+        </p:blipFill>
+        <p:spPr>
+          <a:xfrm>
+            <a:off x="1263650" y="1490345"/>
+            <a:ext cx="2438400" cy="2438400"/>
+          </a:xfrm>
+          <a:prstGeom prst="rect">
+            <a:avLst/>
+          </a:prstGeom>
+          <a:noFill/>
+        </p:spPr>
+      </p:pic>
+    </p:spTree>
+  </p:cSld>
+  <p:clrMapOvr>
+    <a:masterClrMapping/>
+  </p:clrMapOvr>
+  <p:transition spd="slow">
+    <p:push dir="u"/>
+  </p:transition>
+</p:sld>
+</file>
+
+<file path=ppt/slides/slide15.xml><?xml version="1.0" encoding="utf-8"?>
+<p:sld xmlns:a="http://schemas.openxmlformats.org/drawingml/2006/main" xmlns:r="http://schemas.openxmlformats.org/officeDocument/2006/relationships" xmlns:p="http://schemas.openxmlformats.org/presentationml/2006/main">
+  <p:cSld>
+    <p:spTree>
+      <p:nvGrpSpPr>
+        <p:cNvPr id="1" name=""/>
+        <p:cNvGrpSpPr/>
+        <p:nvPr/>
+      </p:nvGrpSpPr>
+      <p:grpSpPr>
+        <a:xfrm>
+          <a:off x="0" y="0"/>
+          <a:ext cx="0" cy="0"/>
+          <a:chOff x="0" y="0"/>
+          <a:chExt cx="0" cy="0"/>
+        </a:xfrm>
+      </p:grpSpPr>
+      <p:sp>
+        <p:nvSpPr>
+          <p:cNvPr id="9" name="Retângulo 8"/>
+          <p:cNvSpPr/>
+          <p:nvPr/>
+        </p:nvSpPr>
+        <p:spPr>
+          <a:xfrm>
+            <a:off x="3310597" y="168452"/>
+            <a:ext cx="5570806" cy="1322363"/>
+          </a:xfrm>
+          <a:prstGeom prst="rect">
+            <a:avLst/>
+          </a:prstGeom>
+          <a:solidFill>
+            <a:schemeClr val="bg1"/>
+          </a:solidFill>
+          <a:ln>
+            <a:solidFill>
+              <a:srgbClr val="E50D3B"/>
+            </a:solidFill>
+          </a:ln>
+        </p:spPr>
+        <p:style>
+          <a:lnRef idx="2">
+            <a:schemeClr val="accent1">
+              <a:shade val="50000"/>
+            </a:schemeClr>
+          </a:lnRef>
+          <a:fillRef idx="1">
+            <a:schemeClr val="accent1"/>
+          </a:fillRef>
+          <a:effectRef idx="0">
+            <a:schemeClr val="accent1"/>
+          </a:effectRef>
+          <a:fontRef idx="minor">
+            <a:schemeClr val="lt1"/>
+          </a:fontRef>
+        </p:style>
+        <p:txBody>
+          <a:bodyPr rtlCol="0" anchor="ctr"/>
+          <a:lstStyle/>
+          <a:p>
+            <a:pPr algn="ctr"/>
+            <a:r>
+              <a:rPr lang="en-US" altLang="pt-BR" sz="3200" dirty="0">
+                <a:latin typeface="+mj-lt"/>
+              </a:rPr>
+              <a:t>OUTRAS IMPLEMENTAÇÕES</a:t>
+            </a:r>
+            <a:endParaRPr lang="en-US" altLang="pt-BR" sz="3200" dirty="0">
+              <a:latin typeface="+mj-lt"/>
+            </a:endParaRPr>
+          </a:p>
+        </p:txBody>
+      </p:sp>
+      <p:pic>
+        <p:nvPicPr>
+          <p:cNvPr id="3" name="Imagem 2"/>
+          <p:cNvPicPr>
+            <a:picLocks noChangeAspect="1"/>
+          </p:cNvPicPr>
+          <p:nvPr/>
+        </p:nvPicPr>
+        <p:blipFill>
+          <a:blip r:embed="rId1">
+            <a:extLst>
+              <a:ext uri="{28A0092B-C50C-407E-A947-70E740481C1C}">
+                <a14:useLocalDpi xmlns:a14="http://schemas.microsoft.com/office/drawing/2010/main" val="0"/>
+              </a:ext>
+            </a:extLst>
+          </a:blip>
+          <a:stretch>
+            <a:fillRect/>
+          </a:stretch>
+        </p:blipFill>
+        <p:spPr>
+          <a:xfrm>
+            <a:off x="10717883" y="105229"/>
+            <a:ext cx="1438302" cy="600335"/>
+          </a:xfrm>
+          <a:prstGeom prst="rect">
+            <a:avLst/>
+          </a:prstGeom>
+        </p:spPr>
+      </p:pic>
+      <p:sp>
+        <p:nvSpPr>
+          <p:cNvPr id="5" name="Caixa de Texto 4"/>
+          <p:cNvSpPr txBox="1"/>
+          <p:nvPr/>
+        </p:nvSpPr>
+        <p:spPr>
+          <a:xfrm>
+            <a:off x="4324985" y="2242820"/>
+            <a:ext cx="6271260" cy="829945"/>
+          </a:xfrm>
+          <a:prstGeom prst="rect">
+            <a:avLst/>
+          </a:prstGeom>
+          <a:noFill/>
+        </p:spPr>
+        <p:txBody>
+          <a:bodyPr wrap="square" rtlCol="0">
+            <a:spAutoFit/>
+          </a:bodyPr>
+          <a:p>
+            <a:pPr algn="ctr"/>
+            <a:r>
+              <a:rPr lang="en-US" altLang="pt-BR" sz="2400">
+                <a:latin typeface="Arial" panose="020B0604020202020204" pitchFamily="34" charset="0"/>
+                <a:cs typeface="Arial" panose="020B0604020202020204" pitchFamily="34" charset="0"/>
+              </a:rPr>
+              <a:t>Fazer o áudio ser emitido via wireless, através de um fone de ouvido</a:t>
+            </a:r>
+            <a:endParaRPr lang="en-US" altLang="pt-BR" sz="2400">
+              <a:latin typeface="Arial" panose="020B0604020202020204" pitchFamily="34" charset="0"/>
+              <a:cs typeface="Arial" panose="020B0604020202020204" pitchFamily="34" charset="0"/>
+            </a:endParaRPr>
+          </a:p>
+        </p:txBody>
+      </p:sp>
+      <p:sp>
+        <p:nvSpPr>
+          <p:cNvPr id="11" name="Caixa de Texto 10"/>
+          <p:cNvSpPr txBox="1"/>
+          <p:nvPr/>
+        </p:nvSpPr>
+        <p:spPr>
+          <a:xfrm>
+            <a:off x="1595120" y="4366260"/>
+            <a:ext cx="9001125" cy="829945"/>
+          </a:xfrm>
+          <a:prstGeom prst="rect">
+            <a:avLst/>
+          </a:prstGeom>
+          <a:noFill/>
+        </p:spPr>
+        <p:txBody>
+          <a:bodyPr wrap="square" rtlCol="0">
+            <a:spAutoFit/>
+          </a:bodyPr>
+          <a:p>
+            <a:pPr algn="ctr"/>
+            <a:r>
+              <a:rPr lang="en-US" altLang="pt-BR" sz="2400">
+                <a:latin typeface="Arial" panose="020B0604020202020204" pitchFamily="34" charset="0"/>
+                <a:cs typeface="Arial" panose="020B0604020202020204" pitchFamily="34" charset="0"/>
+                <a:sym typeface="+mn-ea"/>
+              </a:rPr>
+              <a:t>O usuário ao entrar no mercado receberia um fone e devolveria na saída</a:t>
+            </a:r>
+            <a:endParaRPr lang="en-US" altLang="pt-BR" sz="2400">
+              <a:latin typeface="Arial" panose="020B0604020202020204" pitchFamily="34" charset="0"/>
+              <a:cs typeface="Arial" panose="020B0604020202020204" pitchFamily="34" charset="0"/>
+            </a:endParaRPr>
+          </a:p>
+        </p:txBody>
+      </p:sp>
+      <p:pic>
+        <p:nvPicPr>
+          <p:cNvPr id="4" name="Imagem 3" descr="headphone"/>
+          <p:cNvPicPr>
+            <a:picLocks noChangeAspect="1"/>
+          </p:cNvPicPr>
+          <p:nvPr/>
+        </p:nvPicPr>
+        <p:blipFill>
+          <a:blip r:embed="rId2"/>
+          <a:stretch>
+            <a:fillRect/>
+          </a:stretch>
+        </p:blipFill>
+        <p:spPr>
+          <a:xfrm>
+            <a:off x="1835150" y="1749425"/>
+            <a:ext cx="2226310" cy="2616835"/>
+          </a:xfrm>
+          <a:prstGeom prst="rect">
+            <a:avLst/>
+          </a:prstGeom>
+        </p:spPr>
+      </p:pic>
+    </p:spTree>
+  </p:cSld>
+  <p:clrMapOvr>
+    <a:masterClrMapping/>
+  </p:clrMapOvr>
+  <p:transition spd="slow">
+    <p:push dir="u"/>
+  </p:transition>
 </p:sld>
 </file>
 
@@ -3056,13 +4467,7 @@
       </p:grpSpPr>
       <p:sp>
         <p:nvSpPr>
-          <p:cNvPr id="9" name="Retângulo 8">
-            <a:extLst>
-              <a:ext uri="{FF2B5EF4-FFF2-40B4-BE49-F238E27FC236}">
-                <a16:creationId xmlns:a16="http://schemas.microsoft.com/office/drawing/2014/main" id="{1DDCA1BC-3415-4787-BCD7-A7F5676B557F}"/>
-              </a:ext>
-            </a:extLst>
-          </p:cNvPr>
+          <p:cNvPr id="9" name="Retângulo 8"/>
           <p:cNvSpPr/>
           <p:nvPr/>
         </p:nvSpPr>
@@ -3110,15 +4515,13 @@
               </a:rPr>
               <a:t>QUANTOS DEFICIENTES VISUAIS TEM NO BRASIL HOJE? </a:t>
             </a:r>
+            <a:endParaRPr lang="pt-BR" sz="3200" dirty="0">
+              <a:latin typeface="+mj-lt"/>
+            </a:endParaRPr>
           </a:p>
         </p:txBody>
       </p:sp>
     </p:spTree>
-    <p:extLst>
-      <p:ext uri="{BB962C8B-B14F-4D97-AF65-F5344CB8AC3E}">
-        <p14:creationId xmlns:p14="http://schemas.microsoft.com/office/powerpoint/2010/main" val="3942892347"/>
-      </p:ext>
-    </p:extLst>
   </p:cSld>
   <p:clrMapOvr>
     <a:masterClrMapping/>
@@ -3148,13 +4551,7 @@
       </p:grpSpPr>
       <p:pic>
         <p:nvPicPr>
-          <p:cNvPr id="5" name="Espaço Reservado para Conteúdo 4">
-            <a:extLst>
-              <a:ext uri="{FF2B5EF4-FFF2-40B4-BE49-F238E27FC236}">
-                <a16:creationId xmlns:a16="http://schemas.microsoft.com/office/drawing/2014/main" id="{311833A9-4BA5-4609-80FE-C8E50519E7BB}"/>
-              </a:ext>
-            </a:extLst>
-          </p:cNvPr>
+          <p:cNvPr id="5" name="Espaço Reservado para Conteúdo 4"/>
           <p:cNvPicPr>
             <a:picLocks noGrp="1" noChangeAspect="1"/>
           </p:cNvPicPr>
@@ -3163,7 +4560,7 @@
           </p:nvPr>
         </p:nvPicPr>
         <p:blipFill>
-          <a:blip r:embed="rId2">
+          <a:blip r:embed="rId1">
             <a:extLst>
               <a:ext uri="{28A0092B-C50C-407E-A947-70E740481C1C}">
                 <a14:useLocalDpi xmlns:a14="http://schemas.microsoft.com/office/drawing/2010/main" val="0"/>
@@ -3183,13 +4580,7 @@
       </p:pic>
       <p:sp>
         <p:nvSpPr>
-          <p:cNvPr id="9" name="Retângulo 8">
-            <a:extLst>
-              <a:ext uri="{FF2B5EF4-FFF2-40B4-BE49-F238E27FC236}">
-                <a16:creationId xmlns:a16="http://schemas.microsoft.com/office/drawing/2014/main" id="{1DDCA1BC-3415-4787-BCD7-A7F5676B557F}"/>
-              </a:ext>
-            </a:extLst>
-          </p:cNvPr>
+          <p:cNvPr id="9" name="Retângulo 8"/>
           <p:cNvSpPr/>
           <p:nvPr/>
         </p:nvSpPr>
@@ -3237,18 +4628,15 @@
               </a:rPr>
               <a:t>QUANTOS DEFICIENTES VISUAIS TEM NO BRASIL HOJE? </a:t>
             </a:r>
-          </a:p>
-        </p:txBody>
-      </p:sp>
-      <p:sp>
-        <p:nvSpPr>
-          <p:cNvPr id="10" name="CaixaDeTexto 9">
-            <a:extLst>
-              <a:ext uri="{FF2B5EF4-FFF2-40B4-BE49-F238E27FC236}">
-                <a16:creationId xmlns:a16="http://schemas.microsoft.com/office/drawing/2014/main" id="{6CEA58DF-D20A-4318-AA38-1E454B547A84}"/>
-              </a:ext>
-            </a:extLst>
-          </p:cNvPr>
+            <a:endParaRPr lang="pt-BR" sz="3200" dirty="0">
+              <a:latin typeface="+mj-lt"/>
+            </a:endParaRPr>
+          </a:p>
+        </p:txBody>
+      </p:sp>
+      <p:sp>
+        <p:nvSpPr>
+          <p:cNvPr id="10" name="CaixaDeTexto 9"/>
           <p:cNvSpPr txBox="1"/>
           <p:nvPr/>
         </p:nvSpPr>
@@ -3289,18 +4677,15 @@
               </a:rPr>
               <a:t> pessoas cegas no país.</a:t>
             </a:r>
-          </a:p>
-        </p:txBody>
-      </p:sp>
-      <p:sp>
-        <p:nvSpPr>
-          <p:cNvPr id="11" name="Retângulo 10">
-            <a:extLst>
-              <a:ext uri="{FF2B5EF4-FFF2-40B4-BE49-F238E27FC236}">
-                <a16:creationId xmlns:a16="http://schemas.microsoft.com/office/drawing/2014/main" id="{6B0F16F5-0CCB-4043-A625-941CACC877EC}"/>
-              </a:ext>
-            </a:extLst>
-          </p:cNvPr>
+            <a:endParaRPr lang="pt-BR" sz="2400" dirty="0">
+              <a:latin typeface="+mj-lt"/>
+            </a:endParaRPr>
+          </a:p>
+        </p:txBody>
+      </p:sp>
+      <p:sp>
+        <p:nvSpPr>
+          <p:cNvPr id="11" name="Retângulo 10"/>
           <p:cNvSpPr/>
           <p:nvPr/>
         </p:nvSpPr>
@@ -3325,25 +4710,22 @@
               </a:rPr>
               <a:t>Sendo um público "difícil" de se lidar, a maioria dos empreendimentos não estão prontos para atender esse público.</a:t>
             </a:r>
+            <a:endParaRPr lang="pt-BR" sz="2400" dirty="0">
+              <a:latin typeface="+mj-lt"/>
+            </a:endParaRPr>
           </a:p>
         </p:txBody>
       </p:sp>
       <p:pic>
         <p:nvPicPr>
-          <p:cNvPr id="13" name="Imagem 12">
-            <a:extLst>
-              <a:ext uri="{FF2B5EF4-FFF2-40B4-BE49-F238E27FC236}">
-                <a16:creationId xmlns:a16="http://schemas.microsoft.com/office/drawing/2014/main" id="{051D74C8-9D4E-40FB-AA18-72A8B6F0E189}"/>
-              </a:ext>
-            </a:extLst>
-          </p:cNvPr>
+          <p:cNvPr id="13" name="Imagem 12"/>
           <p:cNvPicPr>
             <a:picLocks noChangeAspect="1"/>
           </p:cNvPicPr>
           <p:nvPr/>
         </p:nvPicPr>
         <p:blipFill>
-          <a:blip r:embed="rId3">
+          <a:blip r:embed="rId2">
             <a:extLst>
               <a:ext uri="{28A0092B-C50C-407E-A947-70E740481C1C}">
                 <a14:useLocalDpi xmlns:a14="http://schemas.microsoft.com/office/drawing/2010/main" val="0"/>
@@ -3366,13 +4748,7 @@
       </p:pic>
       <p:sp>
         <p:nvSpPr>
-          <p:cNvPr id="15" name="Sinal de Multiplicação 14">
-            <a:extLst>
-              <a:ext uri="{FF2B5EF4-FFF2-40B4-BE49-F238E27FC236}">
-                <a16:creationId xmlns:a16="http://schemas.microsoft.com/office/drawing/2014/main" id="{B62A4809-6F6C-4462-940A-C7DAFA4443F8}"/>
-              </a:ext>
-            </a:extLst>
-          </p:cNvPr>
+          <p:cNvPr id="15" name="Sinal de Multiplicação 14"/>
           <p:cNvSpPr/>
           <p:nvPr/>
         </p:nvSpPr>
@@ -3415,20 +4791,14 @@
       </p:sp>
       <p:pic>
         <p:nvPicPr>
-          <p:cNvPr id="8" name="Imagem 7">
-            <a:extLst>
-              <a:ext uri="{FF2B5EF4-FFF2-40B4-BE49-F238E27FC236}">
-                <a16:creationId xmlns:a16="http://schemas.microsoft.com/office/drawing/2014/main" id="{2C486AFC-1354-4AE8-A2C1-31C461880C5D}"/>
-              </a:ext>
-            </a:extLst>
-          </p:cNvPr>
+          <p:cNvPr id="8" name="Imagem 7"/>
           <p:cNvPicPr>
             <a:picLocks noChangeAspect="1"/>
           </p:cNvPicPr>
           <p:nvPr/>
         </p:nvPicPr>
         <p:blipFill>
-          <a:blip r:embed="rId4">
+          <a:blip r:embed="rId3">
             <a:extLst>
               <a:ext uri="{28A0092B-C50C-407E-A947-70E740481C1C}">
                 <a14:useLocalDpi xmlns:a14="http://schemas.microsoft.com/office/drawing/2010/main" val="0"/>
@@ -3450,11 +4820,6 @@
         </p:spPr>
       </p:pic>
     </p:spTree>
-    <p:extLst>
-      <p:ext uri="{BB962C8B-B14F-4D97-AF65-F5344CB8AC3E}">
-        <p14:creationId xmlns:p14="http://schemas.microsoft.com/office/powerpoint/2010/main" val="4054495654"/>
-      </p:ext>
-    </p:extLst>
   </p:cSld>
   <p:clrMapOvr>
     <a:masterClrMapping/>
@@ -3481,13 +4846,7 @@
       </p:grpSpPr>
       <p:sp>
         <p:nvSpPr>
-          <p:cNvPr id="4" name="Retângulo 3">
-            <a:extLst>
-              <a:ext uri="{FF2B5EF4-FFF2-40B4-BE49-F238E27FC236}">
-                <a16:creationId xmlns:a16="http://schemas.microsoft.com/office/drawing/2014/main" id="{58F402AC-9927-4CF4-B94E-8C8CFD456321}"/>
-              </a:ext>
-            </a:extLst>
-          </p:cNvPr>
+          <p:cNvPr id="4" name="Retângulo 3"/>
           <p:cNvSpPr/>
           <p:nvPr/>
         </p:nvSpPr>
@@ -3535,18 +4894,15 @@
               </a:rPr>
               <a:t>MISSÃO</a:t>
             </a:r>
-          </a:p>
-        </p:txBody>
-      </p:sp>
-      <p:sp>
-        <p:nvSpPr>
-          <p:cNvPr id="5" name="CaixaDeTexto 4">
-            <a:extLst>
-              <a:ext uri="{FF2B5EF4-FFF2-40B4-BE49-F238E27FC236}">
-                <a16:creationId xmlns:a16="http://schemas.microsoft.com/office/drawing/2014/main" id="{0A073DB0-E79F-4924-B445-42A88F5E1930}"/>
-              </a:ext>
-            </a:extLst>
-          </p:cNvPr>
+            <a:endParaRPr lang="pt-BR" sz="3200" dirty="0">
+              <a:latin typeface="+mj-lt"/>
+            </a:endParaRPr>
+          </a:p>
+        </p:txBody>
+      </p:sp>
+      <p:sp>
+        <p:nvSpPr>
+          <p:cNvPr id="5" name="CaixaDeTexto 4"/>
           <p:cNvSpPr txBox="1"/>
           <p:nvPr/>
         </p:nvSpPr>
@@ -3575,18 +4931,43 @@
               <a:rPr lang="pt-BR" dirty="0"/>
               <a:t>.</a:t>
             </a:r>
+            <a:endParaRPr lang="pt-BR" dirty="0"/>
           </a:p>
         </p:txBody>
       </p:sp>
       <p:pic>
         <p:nvPicPr>
-          <p:cNvPr id="7" name="Imagem 6">
+          <p:cNvPr id="7" name="Imagem 6"/>
+          <p:cNvPicPr>
+            <a:picLocks noChangeAspect="1"/>
+          </p:cNvPicPr>
+          <p:nvPr/>
+        </p:nvPicPr>
+        <p:blipFill>
+          <a:blip r:embed="rId1">
             <a:extLst>
-              <a:ext uri="{FF2B5EF4-FFF2-40B4-BE49-F238E27FC236}">
-                <a16:creationId xmlns:a16="http://schemas.microsoft.com/office/drawing/2014/main" id="{1A49D366-B199-4815-B90B-72FC1D33E72F}"/>
+              <a:ext uri="{28A0092B-C50C-407E-A947-70E740481C1C}">
+                <a14:useLocalDpi xmlns:a14="http://schemas.microsoft.com/office/drawing/2010/main" val="0"/>
               </a:ext>
             </a:extLst>
-          </p:cNvPr>
+          </a:blip>
+          <a:stretch>
+            <a:fillRect/>
+          </a:stretch>
+        </p:blipFill>
+        <p:spPr>
+          <a:xfrm>
+            <a:off x="8497089" y="2193878"/>
+            <a:ext cx="1932371" cy="1932371"/>
+          </a:xfrm>
+          <a:prstGeom prst="rect">
+            <a:avLst/>
+          </a:prstGeom>
+        </p:spPr>
+      </p:pic>
+      <p:pic>
+        <p:nvPicPr>
+          <p:cNvPr id="9" name="Imagem 8"/>
           <p:cNvPicPr>
             <a:picLocks noChangeAspect="1"/>
           </p:cNvPicPr>
@@ -3606,7 +4987,7 @@
         </p:blipFill>
         <p:spPr>
           <a:xfrm>
-            <a:off x="8497089" y="2193878"/>
+            <a:off x="1526446" y="4379435"/>
             <a:ext cx="1932371" cy="1932371"/>
           </a:xfrm>
           <a:prstGeom prst="rect">
@@ -3614,15 +4995,40 @@
           </a:prstGeom>
         </p:spPr>
       </p:pic>
+      <p:sp>
+        <p:nvSpPr>
+          <p:cNvPr id="10" name="CaixaDeTexto 9"/>
+          <p:cNvSpPr txBox="1"/>
+          <p:nvPr/>
+        </p:nvSpPr>
+        <p:spPr>
+          <a:xfrm>
+            <a:off x="3975651" y="4686804"/>
+            <a:ext cx="6453809" cy="1200329"/>
+          </a:xfrm>
+          <a:prstGeom prst="rect">
+            <a:avLst/>
+          </a:prstGeom>
+          <a:noFill/>
+        </p:spPr>
+        <p:txBody>
+          <a:bodyPr wrap="square" rtlCol="0">
+            <a:spAutoFit/>
+          </a:bodyPr>
+          <a:lstStyle/>
+          <a:p>
+            <a:pPr algn="just"/>
+            <a:r>
+              <a:rPr lang="pt-BR" sz="2400" dirty="0"/>
+              <a:t>Nossa missão é dar autonomia para essas pessoas fazerem suas compras, além de dar clientes para os supermercados.</a:t>
+            </a:r>
+            <a:endParaRPr lang="pt-BR" dirty="0"/>
+          </a:p>
+        </p:txBody>
+      </p:sp>
       <p:pic>
         <p:nvPicPr>
-          <p:cNvPr id="9" name="Imagem 8">
-            <a:extLst>
-              <a:ext uri="{FF2B5EF4-FFF2-40B4-BE49-F238E27FC236}">
-                <a16:creationId xmlns:a16="http://schemas.microsoft.com/office/drawing/2014/main" id="{865ACEBF-9ADD-4211-A436-B133C03E7435}"/>
-              </a:ext>
-            </a:extLst>
-          </p:cNvPr>
+          <p:cNvPr id="11" name="Imagem 10"/>
           <p:cNvPicPr>
             <a:picLocks noChangeAspect="1"/>
           </p:cNvPicPr>
@@ -3642,79 +5048,6 @@
         </p:blipFill>
         <p:spPr>
           <a:xfrm>
-            <a:off x="1526446" y="4379435"/>
-            <a:ext cx="1932371" cy="1932371"/>
-          </a:xfrm>
-          <a:prstGeom prst="rect">
-            <a:avLst/>
-          </a:prstGeom>
-        </p:spPr>
-      </p:pic>
-      <p:sp>
-        <p:nvSpPr>
-          <p:cNvPr id="10" name="CaixaDeTexto 9">
-            <a:extLst>
-              <a:ext uri="{FF2B5EF4-FFF2-40B4-BE49-F238E27FC236}">
-                <a16:creationId xmlns:a16="http://schemas.microsoft.com/office/drawing/2014/main" id="{3127439A-F7FF-4E48-ACB4-E72B63851B15}"/>
-              </a:ext>
-            </a:extLst>
-          </p:cNvPr>
-          <p:cNvSpPr txBox="1"/>
-          <p:nvPr/>
-        </p:nvSpPr>
-        <p:spPr>
-          <a:xfrm>
-            <a:off x="3975651" y="4686804"/>
-            <a:ext cx="6453809" cy="1200329"/>
-          </a:xfrm>
-          <a:prstGeom prst="rect">
-            <a:avLst/>
-          </a:prstGeom>
-          <a:noFill/>
-        </p:spPr>
-        <p:txBody>
-          <a:bodyPr wrap="square" rtlCol="0">
-            <a:spAutoFit/>
-          </a:bodyPr>
-          <a:lstStyle/>
-          <a:p>
-            <a:pPr algn="just"/>
-            <a:r>
-              <a:rPr lang="pt-BR" sz="2400" dirty="0"/>
-              <a:t>Nossa missão é dar autonomia para essas pessoas fazerem suas compras, além de dar clientes para os supermercados.</a:t>
-            </a:r>
-            <a:endParaRPr lang="pt-BR" dirty="0"/>
-          </a:p>
-        </p:txBody>
-      </p:sp>
-      <p:pic>
-        <p:nvPicPr>
-          <p:cNvPr id="11" name="Imagem 10">
-            <a:extLst>
-              <a:ext uri="{FF2B5EF4-FFF2-40B4-BE49-F238E27FC236}">
-                <a16:creationId xmlns:a16="http://schemas.microsoft.com/office/drawing/2014/main" id="{040F5EE3-1C5B-4989-8BE4-632EF743895B}"/>
-              </a:ext>
-            </a:extLst>
-          </p:cNvPr>
-          <p:cNvPicPr>
-            <a:picLocks noChangeAspect="1"/>
-          </p:cNvPicPr>
-          <p:nvPr/>
-        </p:nvPicPr>
-        <p:blipFill>
-          <a:blip r:embed="rId4">
-            <a:extLst>
-              <a:ext uri="{28A0092B-C50C-407E-A947-70E740481C1C}">
-                <a14:useLocalDpi xmlns:a14="http://schemas.microsoft.com/office/drawing/2010/main" val="0"/>
-              </a:ext>
-            </a:extLst>
-          </a:blip>
-          <a:stretch>
-            <a:fillRect/>
-          </a:stretch>
-        </p:blipFill>
-        <p:spPr>
-          <a:xfrm>
             <a:off x="10717883" y="105229"/>
             <a:ext cx="1438302" cy="600335"/>
           </a:xfrm>
@@ -3724,11 +5057,6 @@
         </p:spPr>
       </p:pic>
     </p:spTree>
-    <p:extLst>
-      <p:ext uri="{BB962C8B-B14F-4D97-AF65-F5344CB8AC3E}">
-        <p14:creationId xmlns:p14="http://schemas.microsoft.com/office/powerpoint/2010/main" val="298015003"/>
-      </p:ext>
-    </p:extLst>
   </p:cSld>
   <p:clrMapOvr>
     <a:masterClrMapping/>
@@ -3758,13 +5086,7 @@
       </p:grpSpPr>
       <p:sp>
         <p:nvSpPr>
-          <p:cNvPr id="4" name="Retângulo 3">
-            <a:extLst>
-              <a:ext uri="{FF2B5EF4-FFF2-40B4-BE49-F238E27FC236}">
-                <a16:creationId xmlns:a16="http://schemas.microsoft.com/office/drawing/2014/main" id="{58F402AC-9927-4CF4-B94E-8C8CFD456321}"/>
-              </a:ext>
-            </a:extLst>
-          </p:cNvPr>
+          <p:cNvPr id="4" name="Retângulo 3"/>
           <p:cNvSpPr/>
           <p:nvPr/>
         </p:nvSpPr>
@@ -3812,21 +5134,16 @@
               </a:rPr>
               <a:t>COMO FUNCIONA?</a:t>
             </a:r>
+            <a:endParaRPr lang="pt-BR" sz="3200" dirty="0">
+              <a:latin typeface="+mj-lt"/>
+            </a:endParaRPr>
           </a:p>
         </p:txBody>
       </p:sp>
       <p:cxnSp>
         <p:nvCxnSpPr>
-          <p:cNvPr id="3" name="Conector reto 2">
-            <a:extLst>
-              <a:ext uri="{FF2B5EF4-FFF2-40B4-BE49-F238E27FC236}">
-                <a16:creationId xmlns:a16="http://schemas.microsoft.com/office/drawing/2014/main" id="{CBAB1BCA-5169-49CB-ACA7-0566E151E61A}"/>
-              </a:ext>
-            </a:extLst>
-          </p:cNvPr>
-          <p:cNvCxnSpPr>
-            <a:cxnSpLocks/>
-          </p:cNvCxnSpPr>
+          <p:cNvPr id="3" name="Conector Reto 2"/>
+          <p:cNvCxnSpPr/>
           <p:nvPr/>
         </p:nvCxnSpPr>
         <p:spPr>
@@ -3860,13 +5177,7 @@
       </p:cxnSp>
       <p:sp>
         <p:nvSpPr>
-          <p:cNvPr id="6" name="CaixaDeTexto 5">
-            <a:extLst>
-              <a:ext uri="{FF2B5EF4-FFF2-40B4-BE49-F238E27FC236}">
-                <a16:creationId xmlns:a16="http://schemas.microsoft.com/office/drawing/2014/main" id="{C61FE3A0-7837-483E-90F0-50FB9490D616}"/>
-              </a:ext>
-            </a:extLst>
-          </p:cNvPr>
+          <p:cNvPr id="6" name="CaixaDeTexto 5"/>
           <p:cNvSpPr txBox="1"/>
           <p:nvPr/>
         </p:nvSpPr>
@@ -3890,21 +5201,14 @@
               <a:rPr lang="pt-BR" sz="2400" dirty="0"/>
               <a:t>CLIENTE</a:t>
             </a:r>
+            <a:endParaRPr lang="pt-BR" sz="2400" dirty="0"/>
           </a:p>
         </p:txBody>
       </p:sp>
       <p:cxnSp>
         <p:nvCxnSpPr>
-          <p:cNvPr id="12" name="Conector reto 11">
-            <a:extLst>
-              <a:ext uri="{FF2B5EF4-FFF2-40B4-BE49-F238E27FC236}">
-                <a16:creationId xmlns:a16="http://schemas.microsoft.com/office/drawing/2014/main" id="{D6249C06-FC2E-4CA5-B800-38E8A497BC7F}"/>
-              </a:ext>
-            </a:extLst>
-          </p:cNvPr>
-          <p:cNvCxnSpPr>
-            <a:cxnSpLocks/>
-          </p:cNvCxnSpPr>
+          <p:cNvPr id="12" name="Conector Reto 11"/>
+          <p:cNvCxnSpPr/>
           <p:nvPr/>
         </p:nvCxnSpPr>
         <p:spPr>
@@ -3938,13 +5242,7 @@
       </p:cxnSp>
       <p:sp>
         <p:nvSpPr>
-          <p:cNvPr id="13" name="CaixaDeTexto 12">
-            <a:extLst>
-              <a:ext uri="{FF2B5EF4-FFF2-40B4-BE49-F238E27FC236}">
-                <a16:creationId xmlns:a16="http://schemas.microsoft.com/office/drawing/2014/main" id="{514D0816-6650-4F84-89EC-4D6B1CD7162B}"/>
-              </a:ext>
-            </a:extLst>
-          </p:cNvPr>
+          <p:cNvPr id="13" name="CaixaDeTexto 12"/>
           <p:cNvSpPr txBox="1"/>
           <p:nvPr/>
         </p:nvSpPr>
@@ -3968,18 +5266,13 @@
               <a:rPr lang="pt-BR" sz="2400" dirty="0"/>
               <a:t>EMPRESA</a:t>
             </a:r>
-          </a:p>
-        </p:txBody>
-      </p:sp>
-      <p:sp>
-        <p:nvSpPr>
-          <p:cNvPr id="16" name="CaixaDeTexto 15">
-            <a:extLst>
-              <a:ext uri="{FF2B5EF4-FFF2-40B4-BE49-F238E27FC236}">
-                <a16:creationId xmlns:a16="http://schemas.microsoft.com/office/drawing/2014/main" id="{5ADAB988-AA11-4EEE-9A75-4F049F5682B2}"/>
-              </a:ext>
-            </a:extLst>
-          </p:cNvPr>
+            <a:endParaRPr lang="pt-BR" sz="2400" dirty="0"/>
+          </a:p>
+        </p:txBody>
+      </p:sp>
+      <p:sp>
+        <p:nvSpPr>
+          <p:cNvPr id="16" name="CaixaDeTexto 15"/>
           <p:cNvSpPr txBox="1"/>
           <p:nvPr/>
         </p:nvSpPr>
@@ -4004,18 +5297,82 @@
               <a:rPr lang="pt-BR" sz="2400" dirty="0"/>
               <a:t>Um dispositivo que basta o cliente aproximar a mão do produto...</a:t>
             </a:r>
+            <a:endParaRPr lang="pt-BR" sz="2400" dirty="0"/>
           </a:p>
         </p:txBody>
       </p:sp>
       <p:pic>
         <p:nvPicPr>
-          <p:cNvPr id="17" name="Imagem 16">
+          <p:cNvPr id="17" name="Imagem 16"/>
+          <p:cNvPicPr>
+            <a:picLocks noChangeAspect="1"/>
+          </p:cNvPicPr>
+          <p:nvPr/>
+        </p:nvPicPr>
+        <p:blipFill>
+          <a:blip r:embed="rId1">
             <a:extLst>
-              <a:ext uri="{FF2B5EF4-FFF2-40B4-BE49-F238E27FC236}">
-                <a16:creationId xmlns:a16="http://schemas.microsoft.com/office/drawing/2014/main" id="{123241F6-55E9-4F56-A2C6-77279F67BC7D}"/>
+              <a:ext uri="{28A0092B-C50C-407E-A947-70E740481C1C}">
+                <a14:useLocalDpi xmlns:a14="http://schemas.microsoft.com/office/drawing/2010/main" val="0"/>
               </a:ext>
             </a:extLst>
-          </p:cNvPr>
+          </a:blip>
+          <a:stretch>
+            <a:fillRect/>
+          </a:stretch>
+        </p:blipFill>
+        <p:spPr>
+          <a:xfrm>
+            <a:off x="10717883" y="105229"/>
+            <a:ext cx="1438302" cy="600335"/>
+          </a:xfrm>
+          <a:prstGeom prst="rect">
+            <a:avLst/>
+          </a:prstGeom>
+        </p:spPr>
+      </p:pic>
+      <p:sp>
+        <p:nvSpPr>
+          <p:cNvPr id="18" name="CaixaDeTexto 17"/>
+          <p:cNvSpPr txBox="1"/>
+          <p:nvPr/>
+        </p:nvSpPr>
+        <p:spPr>
+          <a:xfrm>
+            <a:off x="6477783" y="3007142"/>
+            <a:ext cx="5303399" cy="1200329"/>
+          </a:xfrm>
+          <a:prstGeom prst="rect">
+            <a:avLst/>
+          </a:prstGeom>
+          <a:noFill/>
+        </p:spPr>
+        <p:txBody>
+          <a:bodyPr wrap="square" rtlCol="0">
+            <a:spAutoFit/>
+          </a:bodyPr>
+          <a:lstStyle/>
+          <a:p>
+            <a:pPr algn="just"/>
+            <a:r>
+              <a:rPr lang="pt-BR" sz="2400" dirty="0"/>
+              <a:t>No site, a empresa pode </a:t>
+            </a:r>
+            <a:r>
+              <a:rPr lang="pt-BR" sz="2400" dirty="0" err="1"/>
+              <a:t>logar</a:t>
+            </a:r>
+            <a:r>
+              <a:rPr lang="pt-BR" sz="2400" dirty="0"/>
+              <a:t> e ter informações sobre o que acontece com o equipamento em tempo real</a:t>
+            </a:r>
+            <a:endParaRPr lang="pt-BR" sz="2400" dirty="0"/>
+          </a:p>
+        </p:txBody>
+      </p:sp>
+      <p:pic>
+        <p:nvPicPr>
+          <p:cNvPr id="20" name="Imagem 19"/>
           <p:cNvPicPr>
             <a:picLocks noChangeAspect="1"/>
           </p:cNvPicPr>
@@ -4035,8 +5392,8 @@
         </p:blipFill>
         <p:spPr>
           <a:xfrm>
-            <a:off x="10717883" y="105229"/>
-            <a:ext cx="1438302" cy="600335"/>
+            <a:off x="505343" y="4867099"/>
+            <a:ext cx="1323439" cy="1323439"/>
           </a:xfrm>
           <a:prstGeom prst="rect">
             <a:avLst/>
@@ -4045,57 +5402,36 @@
       </p:pic>
       <p:sp>
         <p:nvSpPr>
-          <p:cNvPr id="18" name="CaixaDeTexto 17">
-            <a:extLst>
-              <a:ext uri="{FF2B5EF4-FFF2-40B4-BE49-F238E27FC236}">
-                <a16:creationId xmlns:a16="http://schemas.microsoft.com/office/drawing/2014/main" id="{1F874423-631D-4345-91E3-6254BCD19B28}"/>
-              </a:ext>
-            </a:extLst>
-          </p:cNvPr>
-          <p:cNvSpPr txBox="1"/>
-          <p:nvPr/>
-        </p:nvSpPr>
-        <p:spPr>
-          <a:xfrm>
-            <a:off x="6477783" y="3007142"/>
-            <a:ext cx="5303399" cy="1200329"/>
-          </a:xfrm>
-          <a:prstGeom prst="rect">
-            <a:avLst/>
-          </a:prstGeom>
-          <a:noFill/>
-        </p:spPr>
-        <p:txBody>
-          <a:bodyPr wrap="square" rtlCol="0">
+          <p:cNvPr id="21" name="Retângulo 20"/>
+          <p:cNvSpPr/>
+          <p:nvPr/>
+        </p:nvSpPr>
+        <p:spPr>
+          <a:xfrm>
+            <a:off x="1970634" y="4867099"/>
+            <a:ext cx="3585209" cy="1569660"/>
+          </a:xfrm>
+          <a:prstGeom prst="rect">
+            <a:avLst/>
+          </a:prstGeom>
+        </p:spPr>
+        <p:txBody>
+          <a:bodyPr wrap="square">
             <a:spAutoFit/>
           </a:bodyPr>
           <a:lstStyle/>
           <a:p>
-            <a:pPr algn="just"/>
             <a:r>
               <a:rPr lang="pt-BR" sz="2400" dirty="0"/>
-              <a:t>No site, a empresa pode </a:t>
-            </a:r>
-            <a:r>
-              <a:rPr lang="pt-BR" sz="2400" dirty="0" err="1"/>
-              <a:t>logar</a:t>
-            </a:r>
-            <a:r>
-              <a:rPr lang="pt-BR" sz="2400" dirty="0"/>
-              <a:t> e ter informações sobre o que acontece com o equipamento em tempo real</a:t>
-            </a:r>
+              <a:t>...um alto-falante, diz para o cliente o nome do produto, preço e outras informações.</a:t>
+            </a:r>
+            <a:endParaRPr lang="pt-BR" sz="2400" dirty="0"/>
           </a:p>
         </p:txBody>
       </p:sp>
       <p:pic>
         <p:nvPicPr>
-          <p:cNvPr id="20" name="Imagem 19">
-            <a:extLst>
-              <a:ext uri="{FF2B5EF4-FFF2-40B4-BE49-F238E27FC236}">
-                <a16:creationId xmlns:a16="http://schemas.microsoft.com/office/drawing/2014/main" id="{0AD78217-DFDB-4FCE-98EC-421A6C024069}"/>
-              </a:ext>
-            </a:extLst>
-          </p:cNvPr>
+          <p:cNvPr id="23" name="Imagem 22"/>
           <p:cNvPicPr>
             <a:picLocks noChangeAspect="1"/>
           </p:cNvPicPr>
@@ -4115,57 +5451,17 @@
         </p:blipFill>
         <p:spPr>
           <a:xfrm>
-            <a:off x="505343" y="4867099"/>
-            <a:ext cx="1323439" cy="1323439"/>
+            <a:off x="4088356" y="2997331"/>
+            <a:ext cx="1467487" cy="1467487"/>
           </a:xfrm>
           <a:prstGeom prst="rect">
             <a:avLst/>
           </a:prstGeom>
         </p:spPr>
       </p:pic>
-      <p:sp>
-        <p:nvSpPr>
-          <p:cNvPr id="21" name="Retângulo 20">
-            <a:extLst>
-              <a:ext uri="{FF2B5EF4-FFF2-40B4-BE49-F238E27FC236}">
-                <a16:creationId xmlns:a16="http://schemas.microsoft.com/office/drawing/2014/main" id="{09DA38EE-22D2-46D1-A977-7E8BD5FBB744}"/>
-              </a:ext>
-            </a:extLst>
-          </p:cNvPr>
-          <p:cNvSpPr/>
-          <p:nvPr/>
-        </p:nvSpPr>
-        <p:spPr>
-          <a:xfrm>
-            <a:off x="1970634" y="4867099"/>
-            <a:ext cx="3585209" cy="1569660"/>
-          </a:xfrm>
-          <a:prstGeom prst="rect">
-            <a:avLst/>
-          </a:prstGeom>
-        </p:spPr>
-        <p:txBody>
-          <a:bodyPr wrap="square">
-            <a:spAutoFit/>
-          </a:bodyPr>
-          <a:lstStyle/>
-          <a:p>
-            <a:r>
-              <a:rPr lang="pt-BR" sz="2400" dirty="0"/>
-              <a:t>...um alto-falante, diz para o cliente o nome do produto, preço e outras informações.</a:t>
-            </a:r>
-          </a:p>
-        </p:txBody>
-      </p:sp>
       <p:pic>
         <p:nvPicPr>
-          <p:cNvPr id="23" name="Imagem 22">
-            <a:extLst>
-              <a:ext uri="{FF2B5EF4-FFF2-40B4-BE49-F238E27FC236}">
-                <a16:creationId xmlns:a16="http://schemas.microsoft.com/office/drawing/2014/main" id="{2975D10E-6086-4D82-A40D-7B7ACCE0061B}"/>
-              </a:ext>
-            </a:extLst>
-          </p:cNvPr>
+          <p:cNvPr id="5" name="Imagem 4"/>
           <p:cNvPicPr>
             <a:picLocks noChangeAspect="1"/>
           </p:cNvPicPr>
@@ -4185,42 +5481,6 @@
         </p:blipFill>
         <p:spPr>
           <a:xfrm>
-            <a:off x="4088356" y="2997331"/>
-            <a:ext cx="1467487" cy="1467487"/>
-          </a:xfrm>
-          <a:prstGeom prst="rect">
-            <a:avLst/>
-          </a:prstGeom>
-        </p:spPr>
-      </p:pic>
-      <p:pic>
-        <p:nvPicPr>
-          <p:cNvPr id="5" name="Imagem 4">
-            <a:extLst>
-              <a:ext uri="{FF2B5EF4-FFF2-40B4-BE49-F238E27FC236}">
-                <a16:creationId xmlns:a16="http://schemas.microsoft.com/office/drawing/2014/main" id="{50172B94-ED0F-4CF7-AD70-A9315298A027}"/>
-              </a:ext>
-            </a:extLst>
-          </p:cNvPr>
-          <p:cNvPicPr>
-            <a:picLocks noChangeAspect="1"/>
-          </p:cNvPicPr>
-          <p:nvPr/>
-        </p:nvPicPr>
-        <p:blipFill>
-          <a:blip r:embed="rId5">
-            <a:extLst>
-              <a:ext uri="{28A0092B-C50C-407E-A947-70E740481C1C}">
-                <a14:useLocalDpi xmlns:a14="http://schemas.microsoft.com/office/drawing/2010/main" val="0"/>
-              </a:ext>
-            </a:extLst>
-          </a:blip>
-          <a:stretch>
-            <a:fillRect/>
-          </a:stretch>
-        </p:blipFill>
-        <p:spPr>
-          <a:xfrm>
             <a:off x="6477783" y="4576070"/>
             <a:ext cx="1659654" cy="1659654"/>
           </a:xfrm>
@@ -4231,13 +5491,7 @@
       </p:pic>
       <p:sp>
         <p:nvSpPr>
-          <p:cNvPr id="15" name="CaixaDeTexto 14">
-            <a:extLst>
-              <a:ext uri="{FF2B5EF4-FFF2-40B4-BE49-F238E27FC236}">
-                <a16:creationId xmlns:a16="http://schemas.microsoft.com/office/drawing/2014/main" id="{AD86E14B-C4BA-4006-83BE-09D40E9395E7}"/>
-              </a:ext>
-            </a:extLst>
-          </p:cNvPr>
+          <p:cNvPr id="15" name="CaixaDeTexto 14"/>
           <p:cNvSpPr txBox="1"/>
           <p:nvPr/>
         </p:nvSpPr>
@@ -4262,15 +5516,11 @@
               <a:rPr lang="pt-BR" sz="2400" dirty="0"/>
               <a:t>Além de métricas sobre os produtos mais acessados e possíveis problemas nos sensores.</a:t>
             </a:r>
+            <a:endParaRPr lang="pt-BR" sz="2400" dirty="0"/>
           </a:p>
         </p:txBody>
       </p:sp>
     </p:spTree>
-    <p:extLst>
-      <p:ext uri="{BB962C8B-B14F-4D97-AF65-F5344CB8AC3E}">
-        <p14:creationId xmlns:p14="http://schemas.microsoft.com/office/powerpoint/2010/main" val="1017996197"/>
-      </p:ext>
-    </p:extLst>
   </p:cSld>
   <p:clrMapOvr>
     <a:masterClrMapping/>
@@ -4300,13 +5550,7 @@
       </p:grpSpPr>
       <p:sp>
         <p:nvSpPr>
-          <p:cNvPr id="4" name="Retângulo 3">
-            <a:extLst>
-              <a:ext uri="{FF2B5EF4-FFF2-40B4-BE49-F238E27FC236}">
-                <a16:creationId xmlns:a16="http://schemas.microsoft.com/office/drawing/2014/main" id="{58F402AC-9927-4CF4-B94E-8C8CFD456321}"/>
-              </a:ext>
-            </a:extLst>
-          </p:cNvPr>
+          <p:cNvPr id="4" name="Retângulo 3"/>
           <p:cNvSpPr/>
           <p:nvPr/>
         </p:nvSpPr>
@@ -4354,18 +5598,45 @@
               </a:rPr>
               <a:t>DIAGRAMA</a:t>
             </a:r>
+            <a:endParaRPr lang="pt-BR" sz="3200" dirty="0">
+              <a:latin typeface="+mj-lt"/>
+            </a:endParaRPr>
           </a:p>
         </p:txBody>
       </p:sp>
       <p:pic>
         <p:nvPicPr>
-          <p:cNvPr id="3" name="Imagem 2">
+          <p:cNvPr id="3" name="Imagem 2"/>
+          <p:cNvPicPr>
+            <a:picLocks noChangeAspect="1"/>
+          </p:cNvPicPr>
+          <p:nvPr/>
+        </p:nvPicPr>
+        <p:blipFill>
+          <a:blip r:embed="rId1">
             <a:extLst>
-              <a:ext uri="{FF2B5EF4-FFF2-40B4-BE49-F238E27FC236}">
-                <a16:creationId xmlns:a16="http://schemas.microsoft.com/office/drawing/2014/main" id="{502B1DC4-A23F-4180-BBF0-691BE21D2B76}"/>
+              <a:ext uri="{28A0092B-C50C-407E-A947-70E740481C1C}">
+                <a14:useLocalDpi xmlns:a14="http://schemas.microsoft.com/office/drawing/2010/main" val="0"/>
               </a:ext>
             </a:extLst>
-          </p:cNvPr>
+          </a:blip>
+          <a:stretch>
+            <a:fillRect/>
+          </a:stretch>
+        </p:blipFill>
+        <p:spPr>
+          <a:xfrm>
+            <a:off x="10717883" y="105229"/>
+            <a:ext cx="1438302" cy="600335"/>
+          </a:xfrm>
+          <a:prstGeom prst="rect">
+            <a:avLst/>
+          </a:prstGeom>
+        </p:spPr>
+      </p:pic>
+      <p:pic>
+        <p:nvPicPr>
+          <p:cNvPr id="5" name="Imagem 4"/>
           <p:cNvPicPr>
             <a:picLocks noChangeAspect="1"/>
           </p:cNvPicPr>
@@ -4385,8 +5656,8 @@
         </p:blipFill>
         <p:spPr>
           <a:xfrm>
-            <a:off x="10717883" y="105229"/>
-            <a:ext cx="1438302" cy="600335"/>
+            <a:off x="408580" y="2659677"/>
+            <a:ext cx="1060871" cy="1060871"/>
           </a:xfrm>
           <a:prstGeom prst="rect">
             <a:avLst/>
@@ -4395,13 +5666,7 @@
       </p:pic>
       <p:pic>
         <p:nvPicPr>
-          <p:cNvPr id="5" name="Imagem 4">
-            <a:extLst>
-              <a:ext uri="{FF2B5EF4-FFF2-40B4-BE49-F238E27FC236}">
-                <a16:creationId xmlns:a16="http://schemas.microsoft.com/office/drawing/2014/main" id="{A1C806F2-A510-4AB6-9466-91EF726B7C3B}"/>
-              </a:ext>
-            </a:extLst>
-          </p:cNvPr>
+          <p:cNvPr id="7" name="Imagem 6"/>
           <p:cNvPicPr>
             <a:picLocks noChangeAspect="1"/>
           </p:cNvPicPr>
@@ -4421,8 +5686,8 @@
         </p:blipFill>
         <p:spPr>
           <a:xfrm>
-            <a:off x="408580" y="2659677"/>
-            <a:ext cx="1060871" cy="1060871"/>
+            <a:off x="1464785" y="2050774"/>
+            <a:ext cx="1845812" cy="1845812"/>
           </a:xfrm>
           <a:prstGeom prst="rect">
             <a:avLst/>
@@ -4431,13 +5696,7 @@
       </p:pic>
       <p:pic>
         <p:nvPicPr>
-          <p:cNvPr id="7" name="Imagem 6">
-            <a:extLst>
-              <a:ext uri="{FF2B5EF4-FFF2-40B4-BE49-F238E27FC236}">
-                <a16:creationId xmlns:a16="http://schemas.microsoft.com/office/drawing/2014/main" id="{BB135219-FA7F-41A2-AF60-341BAB2F4851}"/>
-              </a:ext>
-            </a:extLst>
-          </p:cNvPr>
+          <p:cNvPr id="22" name="Imagem 21"/>
           <p:cNvPicPr>
             <a:picLocks noChangeAspect="1"/>
           </p:cNvPicPr>
@@ -4445,42 +5704,6 @@
         </p:nvPicPr>
         <p:blipFill>
           <a:blip r:embed="rId4">
-            <a:extLst>
-              <a:ext uri="{28A0092B-C50C-407E-A947-70E740481C1C}">
-                <a14:useLocalDpi xmlns:a14="http://schemas.microsoft.com/office/drawing/2010/main" val="0"/>
-              </a:ext>
-            </a:extLst>
-          </a:blip>
-          <a:stretch>
-            <a:fillRect/>
-          </a:stretch>
-        </p:blipFill>
-        <p:spPr>
-          <a:xfrm>
-            <a:off x="1464785" y="2050774"/>
-            <a:ext cx="1845812" cy="1845812"/>
-          </a:xfrm>
-          <a:prstGeom prst="rect">
-            <a:avLst/>
-          </a:prstGeom>
-        </p:spPr>
-      </p:pic>
-      <p:pic>
-        <p:nvPicPr>
-          <p:cNvPr id="22" name="Imagem 21">
-            <a:extLst>
-              <a:ext uri="{FF2B5EF4-FFF2-40B4-BE49-F238E27FC236}">
-                <a16:creationId xmlns:a16="http://schemas.microsoft.com/office/drawing/2014/main" id="{D18DE0A8-BA87-4974-A4EC-7173347FEAE9}"/>
-              </a:ext>
-            </a:extLst>
-          </p:cNvPr>
-          <p:cNvPicPr>
-            <a:picLocks noChangeAspect="1"/>
-          </p:cNvPicPr>
-          <p:nvPr/>
-        </p:nvPicPr>
-        <p:blipFill>
-          <a:blip r:embed="rId5">
             <a:duotone>
               <a:prstClr val="black"/>
               <a:schemeClr val="tx1">
@@ -4491,7 +5714,7 @@
             <a:extLst>
               <a:ext uri="{BEBA8EAE-BF5A-486C-A8C5-ECC9F3942E4B}">
                 <a14:imgProps xmlns:a14="http://schemas.microsoft.com/office/drawing/2010/main">
-                  <a14:imgLayer r:embed="rId6">
+                  <a14:imgLayer r:embed="rId5">
                     <a14:imgEffect>
                       <a14:brightnessContrast bright="40000" contrast="40000"/>
                     </a14:imgEffect>
@@ -4519,13 +5742,37 @@
       </p:pic>
       <p:pic>
         <p:nvPicPr>
-          <p:cNvPr id="24" name="Imagem 23">
+          <p:cNvPr id="24" name="Imagem 23"/>
+          <p:cNvPicPr>
+            <a:picLocks noChangeAspect="1"/>
+          </p:cNvPicPr>
+          <p:nvPr/>
+        </p:nvPicPr>
+        <p:blipFill>
+          <a:blip r:embed="rId6">
             <a:extLst>
-              <a:ext uri="{FF2B5EF4-FFF2-40B4-BE49-F238E27FC236}">
-                <a16:creationId xmlns:a16="http://schemas.microsoft.com/office/drawing/2014/main" id="{950D3291-8F24-467E-BFFF-725762C44168}"/>
+              <a:ext uri="{28A0092B-C50C-407E-A947-70E740481C1C}">
+                <a14:useLocalDpi xmlns:a14="http://schemas.microsoft.com/office/drawing/2010/main" val="0"/>
               </a:ext>
             </a:extLst>
-          </p:cNvPr>
+          </a:blip>
+          <a:stretch>
+            <a:fillRect/>
+          </a:stretch>
+        </p:blipFill>
+        <p:spPr>
+          <a:xfrm rot="16200000">
+            <a:off x="5218847" y="2973680"/>
+            <a:ext cx="680734" cy="680734"/>
+          </a:xfrm>
+          <a:prstGeom prst="rect">
+            <a:avLst/>
+          </a:prstGeom>
+        </p:spPr>
+      </p:pic>
+      <p:pic>
+        <p:nvPicPr>
+          <p:cNvPr id="26" name="Imagem 25"/>
           <p:cNvPicPr>
             <a:picLocks noChangeAspect="1"/>
           </p:cNvPicPr>
@@ -4544,9 +5791,9 @@
           </a:stretch>
         </p:blipFill>
         <p:spPr>
-          <a:xfrm rot="16200000">
-            <a:off x="5218847" y="2973680"/>
-            <a:ext cx="680734" cy="680734"/>
+          <a:xfrm flipV="1">
+            <a:off x="4918793" y="2691205"/>
+            <a:ext cx="600108" cy="600108"/>
           </a:xfrm>
           <a:prstGeom prst="rect">
             <a:avLst/>
@@ -4555,56 +5802,14 @@
       </p:pic>
       <p:pic>
         <p:nvPicPr>
-          <p:cNvPr id="26" name="Imagem 25">
-            <a:extLst>
-              <a:ext uri="{FF2B5EF4-FFF2-40B4-BE49-F238E27FC236}">
-                <a16:creationId xmlns:a16="http://schemas.microsoft.com/office/drawing/2014/main" id="{95C37DEB-E906-4CCC-AF4F-7C5ED593956E}"/>
-              </a:ext>
-            </a:extLst>
-          </p:cNvPr>
+          <p:cNvPr id="27" name="Imagem 26"/>
           <p:cNvPicPr>
             <a:picLocks noChangeAspect="1"/>
           </p:cNvPicPr>
           <p:nvPr/>
         </p:nvPicPr>
         <p:blipFill>
-          <a:blip r:embed="rId8">
-            <a:extLst>
-              <a:ext uri="{28A0092B-C50C-407E-A947-70E740481C1C}">
-                <a14:useLocalDpi xmlns:a14="http://schemas.microsoft.com/office/drawing/2010/main" val="0"/>
-              </a:ext>
-            </a:extLst>
-          </a:blip>
-          <a:stretch>
-            <a:fillRect/>
-          </a:stretch>
-        </p:blipFill>
-        <p:spPr>
-          <a:xfrm flipV="1">
-            <a:off x="4918793" y="2691205"/>
-            <a:ext cx="600108" cy="600108"/>
-          </a:xfrm>
-          <a:prstGeom prst="rect">
-            <a:avLst/>
-          </a:prstGeom>
-        </p:spPr>
-      </p:pic>
-      <p:pic>
-        <p:nvPicPr>
-          <p:cNvPr id="27" name="Imagem 26">
-            <a:extLst>
-              <a:ext uri="{FF2B5EF4-FFF2-40B4-BE49-F238E27FC236}">
-                <a16:creationId xmlns:a16="http://schemas.microsoft.com/office/drawing/2014/main" id="{641743AC-238E-4A1B-911E-1071CEA5049B}"/>
-              </a:ext>
-            </a:extLst>
-          </p:cNvPr>
-          <p:cNvPicPr>
-            <a:picLocks noChangeAspect="1"/>
-          </p:cNvPicPr>
-          <p:nvPr/>
-        </p:nvPicPr>
-        <p:blipFill>
-          <a:blip r:embed="rId5">
+          <a:blip r:embed="rId4">
             <a:duotone>
               <a:prstClr val="black"/>
               <a:schemeClr val="tx1">
@@ -4615,7 +5820,7 @@
             <a:extLst>
               <a:ext uri="{BEBA8EAE-BF5A-486C-A8C5-ECC9F3942E4B}">
                 <a14:imgProps xmlns:a14="http://schemas.microsoft.com/office/drawing/2010/main">
-                  <a14:imgLayer r:embed="rId6">
+                  <a14:imgLayer r:embed="rId5">
                     <a14:imgEffect>
                       <a14:brightnessContrast bright="40000" contrast="40000"/>
                     </a14:imgEffect>
@@ -4643,20 +5848,14 @@
       </p:pic>
       <p:pic>
         <p:nvPicPr>
-          <p:cNvPr id="31" name="Imagem 30">
-            <a:extLst>
-              <a:ext uri="{FF2B5EF4-FFF2-40B4-BE49-F238E27FC236}">
-                <a16:creationId xmlns:a16="http://schemas.microsoft.com/office/drawing/2014/main" id="{70BC4C6B-619F-4EA5-BE67-B2DF54C60B31}"/>
-              </a:ext>
-            </a:extLst>
-          </p:cNvPr>
+          <p:cNvPr id="31" name="Imagem 30"/>
           <p:cNvPicPr>
             <a:picLocks noChangeAspect="1"/>
           </p:cNvPicPr>
           <p:nvPr/>
         </p:nvPicPr>
         <p:blipFill>
-          <a:blip r:embed="rId9">
+          <a:blip r:embed="rId8">
             <a:extLst>
               <a:ext uri="{28A0092B-C50C-407E-A947-70E740481C1C}">
                 <a14:useLocalDpi xmlns:a14="http://schemas.microsoft.com/office/drawing/2010/main" val="0"/>
@@ -4679,20 +5878,14 @@
       </p:pic>
       <p:pic>
         <p:nvPicPr>
-          <p:cNvPr id="32" name="Imagem 31">
-            <a:extLst>
-              <a:ext uri="{FF2B5EF4-FFF2-40B4-BE49-F238E27FC236}">
-                <a16:creationId xmlns:a16="http://schemas.microsoft.com/office/drawing/2014/main" id="{E7EBC687-9681-4973-8ABF-8D1EFCF8394C}"/>
-              </a:ext>
-            </a:extLst>
-          </p:cNvPr>
+          <p:cNvPr id="32" name="Imagem 31"/>
           <p:cNvPicPr>
             <a:picLocks noChangeAspect="1"/>
           </p:cNvPicPr>
           <p:nvPr/>
         </p:nvPicPr>
         <p:blipFill>
-          <a:blip r:embed="rId5">
+          <a:blip r:embed="rId4">
             <a:duotone>
               <a:prstClr val="black"/>
               <a:schemeClr val="tx1">
@@ -4703,7 +5896,7 @@
             <a:extLst>
               <a:ext uri="{BEBA8EAE-BF5A-486C-A8C5-ECC9F3942E4B}">
                 <a14:imgProps xmlns:a14="http://schemas.microsoft.com/office/drawing/2010/main">
-                  <a14:imgLayer r:embed="rId6">
+                  <a14:imgLayer r:embed="rId5">
                     <a14:imgEffect>
                       <a14:brightnessContrast bright="40000" contrast="40000"/>
                     </a14:imgEffect>
@@ -4731,20 +5924,14 @@
       </p:pic>
       <p:pic>
         <p:nvPicPr>
-          <p:cNvPr id="34" name="Imagem 33">
-            <a:extLst>
-              <a:ext uri="{FF2B5EF4-FFF2-40B4-BE49-F238E27FC236}">
-                <a16:creationId xmlns:a16="http://schemas.microsoft.com/office/drawing/2014/main" id="{6CB0F6EF-1C64-41FA-A79E-C59AE21A124D}"/>
-              </a:ext>
-            </a:extLst>
-          </p:cNvPr>
+          <p:cNvPr id="34" name="Imagem 33"/>
           <p:cNvPicPr>
             <a:picLocks noChangeAspect="1"/>
           </p:cNvPicPr>
           <p:nvPr/>
         </p:nvPicPr>
         <p:blipFill>
-          <a:blip r:embed="rId10">
+          <a:blip r:embed="rId9">
             <a:extLst>
               <a:ext uri="{28A0092B-C50C-407E-A947-70E740481C1C}">
                 <a14:useLocalDpi xmlns:a14="http://schemas.microsoft.com/office/drawing/2010/main" val="0"/>
@@ -4767,20 +5954,14 @@
       </p:pic>
       <p:pic>
         <p:nvPicPr>
-          <p:cNvPr id="35" name="Imagem 34">
-            <a:extLst>
-              <a:ext uri="{FF2B5EF4-FFF2-40B4-BE49-F238E27FC236}">
-                <a16:creationId xmlns:a16="http://schemas.microsoft.com/office/drawing/2014/main" id="{3742C714-2CF3-4F71-AAA8-F165287008A0}"/>
-              </a:ext>
-            </a:extLst>
-          </p:cNvPr>
+          <p:cNvPr id="35" name="Imagem 34"/>
           <p:cNvPicPr>
             <a:picLocks noChangeAspect="1"/>
           </p:cNvPicPr>
           <p:nvPr/>
         </p:nvPicPr>
         <p:blipFill>
-          <a:blip r:embed="rId5">
+          <a:blip r:embed="rId4">
             <a:duotone>
               <a:prstClr val="black"/>
               <a:schemeClr val="tx1">
@@ -4791,7 +5972,7 @@
             <a:extLst>
               <a:ext uri="{BEBA8EAE-BF5A-486C-A8C5-ECC9F3942E4B}">
                 <a14:imgProps xmlns:a14="http://schemas.microsoft.com/office/drawing/2010/main">
-                  <a14:imgLayer r:embed="rId6">
+                  <a14:imgLayer r:embed="rId5">
                     <a14:imgEffect>
                       <a14:brightnessContrast bright="40000" contrast="40000"/>
                     </a14:imgEffect>
@@ -4819,20 +6000,14 @@
       </p:pic>
       <p:pic>
         <p:nvPicPr>
-          <p:cNvPr id="37" name="Imagem 36">
-            <a:extLst>
-              <a:ext uri="{FF2B5EF4-FFF2-40B4-BE49-F238E27FC236}">
-                <a16:creationId xmlns:a16="http://schemas.microsoft.com/office/drawing/2014/main" id="{33572E43-9652-4FF6-B671-9620185937EA}"/>
-              </a:ext>
-            </a:extLst>
-          </p:cNvPr>
+          <p:cNvPr id="37" name="Imagem 36"/>
           <p:cNvPicPr>
             <a:picLocks noChangeAspect="1"/>
           </p:cNvPicPr>
           <p:nvPr/>
         </p:nvPicPr>
         <p:blipFill>
-          <a:blip r:embed="rId11">
+          <a:blip r:embed="rId10">
             <a:extLst>
               <a:ext uri="{28A0092B-C50C-407E-A947-70E740481C1C}">
                 <a14:useLocalDpi xmlns:a14="http://schemas.microsoft.com/office/drawing/2010/main" val="0"/>
@@ -4855,20 +6030,14 @@
       </p:pic>
       <p:pic>
         <p:nvPicPr>
-          <p:cNvPr id="38" name="Imagem 37">
-            <a:extLst>
-              <a:ext uri="{FF2B5EF4-FFF2-40B4-BE49-F238E27FC236}">
-                <a16:creationId xmlns:a16="http://schemas.microsoft.com/office/drawing/2014/main" id="{29D5F516-48B2-40C7-8430-7C8C35944CDC}"/>
-              </a:ext>
-            </a:extLst>
-          </p:cNvPr>
+          <p:cNvPr id="38" name="Imagem 37"/>
           <p:cNvPicPr>
             <a:picLocks noChangeAspect="1"/>
           </p:cNvPicPr>
           <p:nvPr/>
         </p:nvPicPr>
         <p:blipFill>
-          <a:blip r:embed="rId5">
+          <a:blip r:embed="rId4">
             <a:duotone>
               <a:prstClr val="black"/>
               <a:schemeClr val="tx1">
@@ -4879,7 +6048,7 @@
             <a:extLst>
               <a:ext uri="{BEBA8EAE-BF5A-486C-A8C5-ECC9F3942E4B}">
                 <a14:imgProps xmlns:a14="http://schemas.microsoft.com/office/drawing/2010/main">
-                  <a14:imgLayer r:embed="rId6">
+                  <a14:imgLayer r:embed="rId5">
                     <a14:imgEffect>
                       <a14:brightnessContrast bright="40000" contrast="40000"/>
                     </a14:imgEffect>
@@ -4907,20 +6076,14 @@
       </p:pic>
       <p:pic>
         <p:nvPicPr>
-          <p:cNvPr id="40" name="Imagem 39">
-            <a:extLst>
-              <a:ext uri="{FF2B5EF4-FFF2-40B4-BE49-F238E27FC236}">
-                <a16:creationId xmlns:a16="http://schemas.microsoft.com/office/drawing/2014/main" id="{E4A1ECFF-6146-45FB-8FBE-E3B47CF65EA4}"/>
-              </a:ext>
-            </a:extLst>
-          </p:cNvPr>
+          <p:cNvPr id="40" name="Imagem 39"/>
           <p:cNvPicPr>
             <a:picLocks noChangeAspect="1"/>
           </p:cNvPicPr>
           <p:nvPr/>
         </p:nvPicPr>
         <p:blipFill>
-          <a:blip r:embed="rId12">
+          <a:blip r:embed="rId11">
             <a:extLst>
               <a:ext uri="{28A0092B-C50C-407E-A947-70E740481C1C}">
                 <a14:useLocalDpi xmlns:a14="http://schemas.microsoft.com/office/drawing/2010/main" val="0"/>
@@ -4943,20 +6106,14 @@
       </p:pic>
       <p:pic>
         <p:nvPicPr>
-          <p:cNvPr id="41" name="Imagem 40">
-            <a:extLst>
-              <a:ext uri="{FF2B5EF4-FFF2-40B4-BE49-F238E27FC236}">
-                <a16:creationId xmlns:a16="http://schemas.microsoft.com/office/drawing/2014/main" id="{B282A644-0AAD-4366-B9D4-C374DF02587A}"/>
-              </a:ext>
-            </a:extLst>
-          </p:cNvPr>
+          <p:cNvPr id="41" name="Imagem 40"/>
           <p:cNvPicPr>
             <a:picLocks noChangeAspect="1"/>
           </p:cNvPicPr>
           <p:nvPr/>
         </p:nvPicPr>
         <p:blipFill>
-          <a:blip r:embed="rId5">
+          <a:blip r:embed="rId4">
             <a:duotone>
               <a:prstClr val="black"/>
               <a:schemeClr val="tx1">
@@ -4967,7 +6124,7 @@
             <a:extLst>
               <a:ext uri="{BEBA8EAE-BF5A-486C-A8C5-ECC9F3942E4B}">
                 <a14:imgProps xmlns:a14="http://schemas.microsoft.com/office/drawing/2010/main">
-                  <a14:imgLayer r:embed="rId6">
+                  <a14:imgLayer r:embed="rId5">
                     <a14:imgEffect>
                       <a14:brightnessContrast bright="40000" contrast="40000"/>
                     </a14:imgEffect>
@@ -4994,11 +6151,6 @@
         </p:spPr>
       </p:pic>
     </p:spTree>
-    <p:extLst>
-      <p:ext uri="{BB962C8B-B14F-4D97-AF65-F5344CB8AC3E}">
-        <p14:creationId xmlns:p14="http://schemas.microsoft.com/office/powerpoint/2010/main" val="2859240099"/>
-      </p:ext>
-    </p:extLst>
   </p:cSld>
   <p:clrMapOvr>
     <a:masterClrMapping/>
@@ -5028,13 +6180,7 @@
       </p:grpSpPr>
       <p:sp>
         <p:nvSpPr>
-          <p:cNvPr id="4" name="Retângulo 3">
-            <a:extLst>
-              <a:ext uri="{FF2B5EF4-FFF2-40B4-BE49-F238E27FC236}">
-                <a16:creationId xmlns:a16="http://schemas.microsoft.com/office/drawing/2014/main" id="{58F402AC-9927-4CF4-B94E-8C8CFD456321}"/>
-              </a:ext>
-            </a:extLst>
-          </p:cNvPr>
+          <p:cNvPr id="4" name="Retângulo 3"/>
           <p:cNvSpPr/>
           <p:nvPr/>
         </p:nvSpPr>
@@ -5082,18 +6228,45 @@
               </a:rPr>
               <a:t>EQUIPE</a:t>
             </a:r>
+            <a:endParaRPr lang="pt-BR" sz="3200" dirty="0">
+              <a:latin typeface="+mj-lt"/>
+            </a:endParaRPr>
           </a:p>
         </p:txBody>
       </p:sp>
       <p:pic>
         <p:nvPicPr>
-          <p:cNvPr id="3" name="Imagem 2">
+          <p:cNvPr id="3" name="Imagem 2"/>
+          <p:cNvPicPr>
+            <a:picLocks noChangeAspect="1"/>
+          </p:cNvPicPr>
+          <p:nvPr/>
+        </p:nvPicPr>
+        <p:blipFill>
+          <a:blip r:embed="rId1">
             <a:extLst>
-              <a:ext uri="{FF2B5EF4-FFF2-40B4-BE49-F238E27FC236}">
-                <a16:creationId xmlns:a16="http://schemas.microsoft.com/office/drawing/2014/main" id="{96936607-A56F-4B04-A607-98FEAB28239E}"/>
+              <a:ext uri="{28A0092B-C50C-407E-A947-70E740481C1C}">
+                <a14:useLocalDpi xmlns:a14="http://schemas.microsoft.com/office/drawing/2010/main" val="0"/>
               </a:ext>
             </a:extLst>
-          </p:cNvPr>
+          </a:blip>
+          <a:stretch>
+            <a:fillRect/>
+          </a:stretch>
+        </p:blipFill>
+        <p:spPr>
+          <a:xfrm>
+            <a:off x="10717883" y="105229"/>
+            <a:ext cx="1438302" cy="600335"/>
+          </a:xfrm>
+          <a:prstGeom prst="rect">
+            <a:avLst/>
+          </a:prstGeom>
+        </p:spPr>
+      </p:pic>
+      <p:pic>
+        <p:nvPicPr>
+          <p:cNvPr id="5" name="Imagem 4"/>
           <p:cNvPicPr>
             <a:picLocks noChangeAspect="1"/>
           </p:cNvPicPr>
@@ -5113,8 +6286,8 @@
         </p:blipFill>
         <p:spPr>
           <a:xfrm>
-            <a:off x="10717883" y="105229"/>
-            <a:ext cx="1438302" cy="600335"/>
+            <a:off x="10151834" y="2469523"/>
+            <a:ext cx="1285200" cy="1713600"/>
           </a:xfrm>
           <a:prstGeom prst="rect">
             <a:avLst/>
@@ -5123,13 +6296,7 @@
       </p:pic>
       <p:pic>
         <p:nvPicPr>
-          <p:cNvPr id="5" name="Imagem 4">
-            <a:extLst>
-              <a:ext uri="{FF2B5EF4-FFF2-40B4-BE49-F238E27FC236}">
-                <a16:creationId xmlns:a16="http://schemas.microsoft.com/office/drawing/2014/main" id="{21225219-750D-4C80-9229-3F75E92F8C8E}"/>
-              </a:ext>
-            </a:extLst>
-          </p:cNvPr>
+          <p:cNvPr id="7" name="Imagem 6"/>
           <p:cNvPicPr>
             <a:picLocks noChangeAspect="1"/>
           </p:cNvPicPr>
@@ -5149,7 +6316,7 @@
         </p:blipFill>
         <p:spPr>
           <a:xfrm>
-            <a:off x="10151834" y="2469523"/>
+            <a:off x="967670" y="4807224"/>
             <a:ext cx="1285200" cy="1713600"/>
           </a:xfrm>
           <a:prstGeom prst="rect">
@@ -5159,13 +6326,7 @@
       </p:pic>
       <p:pic>
         <p:nvPicPr>
-          <p:cNvPr id="7" name="Imagem 6">
-            <a:extLst>
-              <a:ext uri="{FF2B5EF4-FFF2-40B4-BE49-F238E27FC236}">
-                <a16:creationId xmlns:a16="http://schemas.microsoft.com/office/drawing/2014/main" id="{2B79AEF0-6607-41A4-9674-669C50ADA4F1}"/>
-              </a:ext>
-            </a:extLst>
-          </p:cNvPr>
+          <p:cNvPr id="9" name="Imagem 8"/>
           <p:cNvPicPr>
             <a:picLocks noChangeAspect="1"/>
           </p:cNvPicPr>
@@ -5185,8 +6346,8 @@
         </p:blipFill>
         <p:spPr>
           <a:xfrm>
-            <a:off x="967670" y="4807224"/>
-            <a:ext cx="1285200" cy="1713600"/>
+            <a:off x="10208891" y="4807224"/>
+            <a:ext cx="1258425" cy="1713600"/>
           </a:xfrm>
           <a:prstGeom prst="rect">
             <a:avLst/>
@@ -5195,13 +6356,7 @@
       </p:pic>
       <p:pic>
         <p:nvPicPr>
-          <p:cNvPr id="9" name="Imagem 8">
-            <a:extLst>
-              <a:ext uri="{FF2B5EF4-FFF2-40B4-BE49-F238E27FC236}">
-                <a16:creationId xmlns:a16="http://schemas.microsoft.com/office/drawing/2014/main" id="{CF023839-CBBA-4FA5-A29B-3BBB9B1D680D}"/>
-              </a:ext>
-            </a:extLst>
-          </p:cNvPr>
+          <p:cNvPr id="11" name="Imagem 10"/>
           <p:cNvPicPr>
             <a:picLocks noChangeAspect="1"/>
           </p:cNvPicPr>
@@ -5221,42 +6376,6 @@
         </p:blipFill>
         <p:spPr>
           <a:xfrm>
-            <a:off x="10208891" y="4807224"/>
-            <a:ext cx="1258425" cy="1713600"/>
-          </a:xfrm>
-          <a:prstGeom prst="rect">
-            <a:avLst/>
-          </a:prstGeom>
-        </p:spPr>
-      </p:pic>
-      <p:pic>
-        <p:nvPicPr>
-          <p:cNvPr id="11" name="Imagem 10">
-            <a:extLst>
-              <a:ext uri="{FF2B5EF4-FFF2-40B4-BE49-F238E27FC236}">
-                <a16:creationId xmlns:a16="http://schemas.microsoft.com/office/drawing/2014/main" id="{9B3B6F73-D96B-495A-AE0C-9E3584ABCAB3}"/>
-              </a:ext>
-            </a:extLst>
-          </p:cNvPr>
-          <p:cNvPicPr>
-            <a:picLocks noChangeAspect="1"/>
-          </p:cNvPicPr>
-          <p:nvPr/>
-        </p:nvPicPr>
-        <p:blipFill>
-          <a:blip r:embed="rId6">
-            <a:extLst>
-              <a:ext uri="{28A0092B-C50C-407E-A947-70E740481C1C}">
-                <a14:useLocalDpi xmlns:a14="http://schemas.microsoft.com/office/drawing/2010/main" val="0"/>
-              </a:ext>
-            </a:extLst>
-          </a:blip>
-          <a:stretch>
-            <a:fillRect/>
-          </a:stretch>
-        </p:blipFill>
-        <p:spPr>
-          <a:xfrm>
             <a:off x="966580" y="2469523"/>
             <a:ext cx="1286290" cy="1715054"/>
           </a:xfrm>
@@ -5267,13 +6386,7 @@
       </p:pic>
       <p:sp>
         <p:nvSpPr>
-          <p:cNvPr id="12" name="CaixaDeTexto 11">
-            <a:extLst>
-              <a:ext uri="{FF2B5EF4-FFF2-40B4-BE49-F238E27FC236}">
-                <a16:creationId xmlns:a16="http://schemas.microsoft.com/office/drawing/2014/main" id="{D1F61DE7-5B0D-4D13-89B8-D03FFAF046E5}"/>
-              </a:ext>
-            </a:extLst>
-          </p:cNvPr>
+          <p:cNvPr id="12" name="CaixaDeTexto 11"/>
           <p:cNvSpPr txBox="1"/>
           <p:nvPr/>
         </p:nvSpPr>
@@ -5297,24 +6410,20 @@
               <a:rPr lang="pt-BR" sz="2400" dirty="0"/>
               <a:t>João Lucas Vieira</a:t>
             </a:r>
+            <a:endParaRPr lang="pt-BR" sz="2400" dirty="0"/>
           </a:p>
           <a:p>
             <a:r>
               <a:rPr lang="pt-BR" sz="2400" dirty="0"/>
               <a:t>DEV</a:t>
             </a:r>
-          </a:p>
-        </p:txBody>
-      </p:sp>
-      <p:sp>
-        <p:nvSpPr>
-          <p:cNvPr id="13" name="CaixaDeTexto 12">
-            <a:extLst>
-              <a:ext uri="{FF2B5EF4-FFF2-40B4-BE49-F238E27FC236}">
-                <a16:creationId xmlns:a16="http://schemas.microsoft.com/office/drawing/2014/main" id="{2344AD03-C240-4AE5-AE5B-5A09496D653C}"/>
-              </a:ext>
-            </a:extLst>
-          </p:cNvPr>
+            <a:endParaRPr lang="pt-BR" sz="2400" dirty="0"/>
+          </a:p>
+        </p:txBody>
+      </p:sp>
+      <p:sp>
+        <p:nvSpPr>
+          <p:cNvPr id="13" name="CaixaDeTexto 12"/>
           <p:cNvSpPr txBox="1"/>
           <p:nvPr/>
         </p:nvSpPr>
@@ -5338,24 +6447,20 @@
               <a:rPr lang="pt-BR" sz="2400" dirty="0"/>
               <a:t>Manuel Almeida </a:t>
             </a:r>
+            <a:endParaRPr lang="pt-BR" sz="2400" dirty="0"/>
           </a:p>
           <a:p>
             <a:r>
               <a:rPr lang="pt-BR" sz="2400" dirty="0"/>
               <a:t>Scrum Master</a:t>
             </a:r>
-          </a:p>
-        </p:txBody>
-      </p:sp>
-      <p:sp>
-        <p:nvSpPr>
-          <p:cNvPr id="14" name="CaixaDeTexto 13">
-            <a:extLst>
-              <a:ext uri="{FF2B5EF4-FFF2-40B4-BE49-F238E27FC236}">
-                <a16:creationId xmlns:a16="http://schemas.microsoft.com/office/drawing/2014/main" id="{C3B2E467-38C1-4FA7-A531-D9BFA8A10092}"/>
-              </a:ext>
-            </a:extLst>
-          </p:cNvPr>
+            <a:endParaRPr lang="pt-BR" sz="2400" dirty="0"/>
+          </a:p>
+        </p:txBody>
+      </p:sp>
+      <p:sp>
+        <p:nvSpPr>
+          <p:cNvPr id="14" name="CaixaDeTexto 13"/>
           <p:cNvSpPr txBox="1"/>
           <p:nvPr/>
         </p:nvSpPr>
@@ -5380,6 +6485,7 @@
               <a:rPr lang="pt-BR" sz="2400" dirty="0"/>
               <a:t>Arthur Alvares</a:t>
             </a:r>
+            <a:endParaRPr lang="pt-BR" sz="2400" dirty="0"/>
           </a:p>
           <a:p>
             <a:pPr algn="r"/>
@@ -5399,18 +6505,13 @@
               <a:rPr lang="pt-BR" sz="2400" dirty="0"/>
               <a:t> </a:t>
             </a:r>
-          </a:p>
-        </p:txBody>
-      </p:sp>
-      <p:sp>
-        <p:nvSpPr>
-          <p:cNvPr id="15" name="CaixaDeTexto 14">
-            <a:extLst>
-              <a:ext uri="{FF2B5EF4-FFF2-40B4-BE49-F238E27FC236}">
-                <a16:creationId xmlns:a16="http://schemas.microsoft.com/office/drawing/2014/main" id="{38DCB667-33DB-49AD-B1D7-72336B8DC13B}"/>
-              </a:ext>
-            </a:extLst>
-          </p:cNvPr>
+            <a:endParaRPr lang="pt-BR" sz="2400" dirty="0"/>
+          </a:p>
+        </p:txBody>
+      </p:sp>
+      <p:sp>
+        <p:nvSpPr>
+          <p:cNvPr id="15" name="CaixaDeTexto 14"/>
           <p:cNvSpPr txBox="1"/>
           <p:nvPr/>
         </p:nvSpPr>
@@ -5435,6 +6536,7 @@
               <a:rPr lang="pt-BR" sz="2400" dirty="0"/>
               <a:t>Pedro Medeiros</a:t>
             </a:r>
+            <a:endParaRPr lang="pt-BR" sz="2400" dirty="0"/>
           </a:p>
           <a:p>
             <a:pPr algn="r"/>
@@ -5442,15 +6544,11 @@
               <a:rPr lang="pt-BR" sz="2400" dirty="0"/>
               <a:t>DEV</a:t>
             </a:r>
+            <a:endParaRPr lang="pt-BR" sz="2400" dirty="0"/>
           </a:p>
         </p:txBody>
       </p:sp>
     </p:spTree>
-    <p:extLst>
-      <p:ext uri="{BB962C8B-B14F-4D97-AF65-F5344CB8AC3E}">
-        <p14:creationId xmlns:p14="http://schemas.microsoft.com/office/powerpoint/2010/main" val="2539323276"/>
-      </p:ext>
-    </p:extLst>
   </p:cSld>
   <p:clrMapOvr>
     <a:masterClrMapping/>
@@ -5480,19 +6578,13 @@
       </p:grpSpPr>
       <p:sp>
         <p:nvSpPr>
-          <p:cNvPr id="4" name="Retângulo 3">
-            <a:extLst>
-              <a:ext uri="{FF2B5EF4-FFF2-40B4-BE49-F238E27FC236}">
-                <a16:creationId xmlns:a16="http://schemas.microsoft.com/office/drawing/2014/main" id="{58F402AC-9927-4CF4-B94E-8C8CFD456321}"/>
-              </a:ext>
-            </a:extLst>
-          </p:cNvPr>
+          <p:cNvPr id="9" name="Retângulo 8"/>
           <p:cNvSpPr/>
           <p:nvPr/>
         </p:nvSpPr>
         <p:spPr>
           <a:xfrm>
-            <a:off x="3310597" y="546194"/>
+            <a:off x="3310597" y="520877"/>
             <a:ext cx="5570806" cy="1322363"/>
           </a:xfrm>
           <a:prstGeom prst="rect">
@@ -5529,30 +6621,30 @@
           <a:p>
             <a:pPr algn="ctr"/>
             <a:r>
-              <a:rPr lang="pt-BR" sz="3200" dirty="0">
+              <a:rPr lang="en-US" altLang="pt-BR" sz="3200" dirty="0">
                 <a:latin typeface="+mj-lt"/>
               </a:rPr>
-              <a:t>MISSÃO</a:t>
-            </a:r>
+              <a:t>DEMONSTRAÇÃO</a:t>
+            </a:r>
+            <a:endParaRPr lang="en-US" altLang="pt-BR" sz="3200" dirty="0">
+              <a:latin typeface="+mj-lt"/>
+            </a:endParaRPr>
           </a:p>
         </p:txBody>
       </p:sp>
       <p:pic>
         <p:nvPicPr>
-          <p:cNvPr id="3" name="Imagem 2">
-            <a:extLst>
-              <a:ext uri="{FF2B5EF4-FFF2-40B4-BE49-F238E27FC236}">
-                <a16:creationId xmlns:a16="http://schemas.microsoft.com/office/drawing/2014/main" id="{4FB06BA0-1B3D-46CF-A7C1-868083A0151F}"/>
-              </a:ext>
-            </a:extLst>
-          </p:cNvPr>
+          <p:cNvPr id="6" name="Espaço Reservado para Conteúdo 5"/>
           <p:cNvPicPr>
             <a:picLocks noChangeAspect="1"/>
           </p:cNvPicPr>
-          <p:nvPr/>
+          <p:nvPr>
+            <p:ph idx="1"/>
+          </p:nvPr>
         </p:nvPicPr>
         <p:blipFill>
-          <a:blip r:embed="rId2">
+          <a:blip r:embed="rId1">
+            <a:lum bright="-54000" contrast="-66000"/>
             <a:extLst>
               <a:ext uri="{28A0092B-C50C-407E-A947-70E740481C1C}">
                 <a14:useLocalDpi xmlns:a14="http://schemas.microsoft.com/office/drawing/2010/main" val="0"/>
@@ -5565,8 +6657,8 @@
         </p:blipFill>
         <p:spPr>
           <a:xfrm>
-            <a:off x="10717883" y="105229"/>
-            <a:ext cx="1438302" cy="600335"/>
+            <a:off x="883920" y="1842770"/>
+            <a:ext cx="10425430" cy="4351655"/>
           </a:xfrm>
           <a:prstGeom prst="rect">
             <a:avLst/>
@@ -5574,15 +6666,127 @@
         </p:spPr>
       </p:pic>
     </p:spTree>
-    <p:extLst>
-      <p:ext uri="{BB962C8B-B14F-4D97-AF65-F5344CB8AC3E}">
-        <p14:creationId xmlns:p14="http://schemas.microsoft.com/office/powerpoint/2010/main" val="946359929"/>
-      </p:ext>
-    </p:extLst>
   </p:cSld>
   <p:clrMapOvr>
     <a:masterClrMapping/>
   </p:clrMapOvr>
+  <p:transition spd="slow">
+    <p:push dir="u"/>
+  </p:transition>
+</p:sld>
+</file>
+
+<file path=ppt/slides/slide9.xml><?xml version="1.0" encoding="utf-8"?>
+<p:sld xmlns:a="http://schemas.openxmlformats.org/drawingml/2006/main" xmlns:r="http://schemas.openxmlformats.org/officeDocument/2006/relationships" xmlns:p="http://schemas.openxmlformats.org/presentationml/2006/main">
+  <p:cSld>
+    <p:spTree>
+      <p:nvGrpSpPr>
+        <p:cNvPr id="1" name=""/>
+        <p:cNvGrpSpPr/>
+        <p:nvPr/>
+      </p:nvGrpSpPr>
+      <p:grpSpPr>
+        <a:xfrm>
+          <a:off x="0" y="0"/>
+          <a:ext cx="0" cy="0"/>
+          <a:chOff x="0" y="0"/>
+          <a:chExt cx="0" cy="0"/>
+        </a:xfrm>
+      </p:grpSpPr>
+      <p:sp>
+        <p:nvSpPr>
+          <p:cNvPr id="9" name="Retângulo 8"/>
+          <p:cNvSpPr/>
+          <p:nvPr/>
+        </p:nvSpPr>
+        <p:spPr>
+          <a:xfrm>
+            <a:off x="3310597" y="520877"/>
+            <a:ext cx="5570806" cy="1322363"/>
+          </a:xfrm>
+          <a:prstGeom prst="rect">
+            <a:avLst/>
+          </a:prstGeom>
+          <a:solidFill>
+            <a:schemeClr val="bg1"/>
+          </a:solidFill>
+          <a:ln>
+            <a:solidFill>
+              <a:srgbClr val="E50D3B"/>
+            </a:solidFill>
+          </a:ln>
+        </p:spPr>
+        <p:style>
+          <a:lnRef idx="2">
+            <a:schemeClr val="accent1">
+              <a:shade val="50000"/>
+            </a:schemeClr>
+          </a:lnRef>
+          <a:fillRef idx="1">
+            <a:schemeClr val="accent1"/>
+          </a:fillRef>
+          <a:effectRef idx="0">
+            <a:schemeClr val="accent1"/>
+          </a:effectRef>
+          <a:fontRef idx="minor">
+            <a:schemeClr val="lt1"/>
+          </a:fontRef>
+        </p:style>
+        <p:txBody>
+          <a:bodyPr rtlCol="0" anchor="ctr"/>
+          <a:lstStyle/>
+          <a:p>
+            <a:pPr algn="ctr"/>
+            <a:r>
+              <a:rPr lang="en-US" altLang="pt-BR" sz="3200" dirty="0">
+                <a:latin typeface="+mj-lt"/>
+              </a:rPr>
+              <a:t>MANUAL DE INSTALAÇÃO</a:t>
+            </a:r>
+            <a:endParaRPr lang="en-US" altLang="pt-BR" sz="3200" dirty="0">
+              <a:latin typeface="+mj-lt"/>
+            </a:endParaRPr>
+          </a:p>
+        </p:txBody>
+      </p:sp>
+      <p:pic>
+        <p:nvPicPr>
+          <p:cNvPr id="3" name="Imagem 2"/>
+          <p:cNvPicPr>
+            <a:picLocks noChangeAspect="1"/>
+          </p:cNvPicPr>
+          <p:nvPr/>
+        </p:nvPicPr>
+        <p:blipFill>
+          <a:blip r:embed="rId1">
+            <a:extLst>
+              <a:ext uri="{28A0092B-C50C-407E-A947-70E740481C1C}">
+                <a14:useLocalDpi xmlns:a14="http://schemas.microsoft.com/office/drawing/2010/main" val="0"/>
+              </a:ext>
+            </a:extLst>
+          </a:blip>
+          <a:stretch>
+            <a:fillRect/>
+          </a:stretch>
+        </p:blipFill>
+        <p:spPr>
+          <a:xfrm>
+            <a:off x="10717883" y="105229"/>
+            <a:ext cx="1438302" cy="600335"/>
+          </a:xfrm>
+          <a:prstGeom prst="rect">
+            <a:avLst/>
+          </a:prstGeom>
+        </p:spPr>
+      </p:pic>
+    </p:spTree>
+  </p:cSld>
+  <p:clrMapOvr>
+    <a:masterClrMapping/>
+  </p:clrMapOvr>
+  <p:transition spd="slow">
+    <p:push dir="u"/>
+  </p:transition>
 </p:sld>
 </file>
 
@@ -5629,7 +6833,7 @@
     </a:clrScheme>
     <a:fontScheme name="Tema do Office">
       <a:majorFont>
-        <a:latin typeface="Calibri Light" panose="020F0302020204030204"/>
+        <a:latin typeface="Calibri Light"/>
         <a:ea typeface=""/>
         <a:cs typeface=""/>
         <a:font script="Jpan" typeface="游ゴシック Light"/>
@@ -5664,7 +6868,7 @@
         <a:font script="Geor" typeface="Sylfaen"/>
       </a:majorFont>
       <a:minorFont>
-        <a:latin typeface="Calibri" panose="020F0502020204030204"/>
+        <a:latin typeface="Calibri"/>
         <a:ea typeface=""/>
         <a:cs typeface=""/>
         <a:font script="Jpan" typeface="游ゴシック"/>
@@ -5837,11 +7041,9 @@
       </a:bgFillStyleLst>
     </a:fmtScheme>
   </a:themeElements>
-  <a:objectDefaults/>
-  <a:extraClrSchemeLst/>
   <a:extLst>
     <a:ext uri="{05A4C25C-085E-4340-85A3-A5531E510DB2}">
-      <thm15:themeFamily xmlns:thm15="http://schemas.microsoft.com/office/thememl/2012/main" name="Office Theme" id="{62F939B6-93AF-4DB8-9C6B-D6C7DFDC589F}" vid="{3E4F19A7-A959-40BB-972C-4880BAF8EB09}"/>
+      <thm15:themeFamily xmlns:thm15="http://schemas.microsoft.com/office/thememl/2012/main" name="Office Theme" id="{62F939B6-93AF-4DB8-9C6B-D6C7DFDC589F}" vid="{4A3C46E8-61CC-4603-A589-7422A47A8E4A}"/>
     </a:ext>
   </a:extLst>
 </a:theme>

</xml_diff>

<commit_message>
alterações na apresentação e documentação final
</commit_message>
<xml_diff>
--- a/Apresentação-blindmarket.pptx
+++ b/Apresentação-blindmarket.pptx
@@ -19,14 +19,15 @@
     <p:sldId id="278" r:id="rId13"/>
     <p:sldId id="279" r:id="rId14"/>
     <p:sldId id="277" r:id="rId15"/>
-    <p:sldId id="264" r:id="rId16"/>
-    <p:sldId id="265" r:id="rId17"/>
-    <p:sldId id="266" r:id="rId18"/>
+    <p:sldId id="265" r:id="rId16"/>
+    <p:sldId id="266" r:id="rId17"/>
+    <p:sldId id="280" r:id="rId18"/>
     <p:sldId id="267" r:id="rId19"/>
-    <p:sldId id="268" r:id="rId20"/>
-    <p:sldId id="269" r:id="rId21"/>
-    <p:sldId id="270" r:id="rId22"/>
-    <p:sldId id="271" r:id="rId23"/>
+    <p:sldId id="264" r:id="rId20"/>
+    <p:sldId id="268" r:id="rId21"/>
+    <p:sldId id="269" r:id="rId22"/>
+    <p:sldId id="270" r:id="rId23"/>
+    <p:sldId id="271" r:id="rId24"/>
   </p:sldIdLst>
   <p:sldSz cx="12192000" cy="6858000"/>
   <p:notesSz cx="6858000" cy="9144000"/>
@@ -264,7 +265,7 @@
           <a:p>
             <a:fld id="{1FF31CB7-1021-4988-AE75-57CA8D34CD8E}" type="datetimeFigureOut">
               <a:rPr lang="pt-BR" smtClean="0"/>
-              <a:t>04/12/2019</a:t>
+              <a:t>05/12/2019</a:t>
             </a:fld>
             <a:endParaRPr lang="pt-BR"/>
           </a:p>
@@ -429,7 +430,7 @@
           <a:p>
             <a:fld id="{1FF31CB7-1021-4988-AE75-57CA8D34CD8E}" type="datetimeFigureOut">
               <a:rPr lang="pt-BR" smtClean="0"/>
-              <a:t>04/12/2019</a:t>
+              <a:t>05/12/2019</a:t>
             </a:fld>
             <a:endParaRPr lang="pt-BR"/>
           </a:p>
@@ -604,7 +605,7 @@
           <a:p>
             <a:fld id="{1FF31CB7-1021-4988-AE75-57CA8D34CD8E}" type="datetimeFigureOut">
               <a:rPr lang="pt-BR" smtClean="0"/>
-              <a:t>04/12/2019</a:t>
+              <a:t>05/12/2019</a:t>
             </a:fld>
             <a:endParaRPr lang="pt-BR"/>
           </a:p>
@@ -807,7 +808,7 @@
           <a:p>
             <a:fld id="{F99CF0CE-E8E4-4440-B759-5CFAF1499F60}" type="datetimeFigureOut">
               <a:rPr lang="pt-BR" smtClean="0"/>
-              <a:t>04/12/2019</a:t>
+              <a:t>05/12/2019</a:t>
             </a:fld>
             <a:endParaRPr lang="pt-BR"/>
           </a:p>
@@ -1005,7 +1006,7 @@
           <a:p>
             <a:fld id="{F99CF0CE-E8E4-4440-B759-5CFAF1499F60}" type="datetimeFigureOut">
               <a:rPr lang="pt-BR" smtClean="0"/>
-              <a:t>04/12/2019</a:t>
+              <a:t>05/12/2019</a:t>
             </a:fld>
             <a:endParaRPr lang="pt-BR"/>
           </a:p>
@@ -1280,7 +1281,7 @@
           <a:p>
             <a:fld id="{F99CF0CE-E8E4-4440-B759-5CFAF1499F60}" type="datetimeFigureOut">
               <a:rPr lang="pt-BR" smtClean="0"/>
-              <a:t>04/12/2019</a:t>
+              <a:t>05/12/2019</a:t>
             </a:fld>
             <a:endParaRPr lang="pt-BR"/>
           </a:p>
@@ -1545,7 +1546,7 @@
           <a:p>
             <a:fld id="{F99CF0CE-E8E4-4440-B759-5CFAF1499F60}" type="datetimeFigureOut">
               <a:rPr lang="pt-BR" smtClean="0"/>
-              <a:t>04/12/2019</a:t>
+              <a:t>05/12/2019</a:t>
             </a:fld>
             <a:endParaRPr lang="pt-BR"/>
           </a:p>
@@ -1957,7 +1958,7 @@
           <a:p>
             <a:fld id="{F99CF0CE-E8E4-4440-B759-5CFAF1499F60}" type="datetimeFigureOut">
               <a:rPr lang="pt-BR" smtClean="0"/>
-              <a:t>04/12/2019</a:t>
+              <a:t>05/12/2019</a:t>
             </a:fld>
             <a:endParaRPr lang="pt-BR"/>
           </a:p>
@@ -2098,7 +2099,7 @@
           <a:p>
             <a:fld id="{F99CF0CE-E8E4-4440-B759-5CFAF1499F60}" type="datetimeFigureOut">
               <a:rPr lang="pt-BR" smtClean="0"/>
-              <a:t>04/12/2019</a:t>
+              <a:t>05/12/2019</a:t>
             </a:fld>
             <a:endParaRPr lang="pt-BR"/>
           </a:p>
@@ -2211,7 +2212,7 @@
           <a:p>
             <a:fld id="{F99CF0CE-E8E4-4440-B759-5CFAF1499F60}" type="datetimeFigureOut">
               <a:rPr lang="pt-BR" smtClean="0"/>
-              <a:t>04/12/2019</a:t>
+              <a:t>05/12/2019</a:t>
             </a:fld>
             <a:endParaRPr lang="pt-BR"/>
           </a:p>
@@ -2522,7 +2523,7 @@
           <a:p>
             <a:fld id="{F99CF0CE-E8E4-4440-B759-5CFAF1499F60}" type="datetimeFigureOut">
               <a:rPr lang="pt-BR" smtClean="0"/>
-              <a:t>04/12/2019</a:t>
+              <a:t>05/12/2019</a:t>
             </a:fld>
             <a:endParaRPr lang="pt-BR"/>
           </a:p>
@@ -2704,7 +2705,7 @@
           <a:p>
             <a:fld id="{1FF31CB7-1021-4988-AE75-57CA8D34CD8E}" type="datetimeFigureOut">
               <a:rPr lang="pt-BR" smtClean="0"/>
-              <a:t>04/12/2019</a:t>
+              <a:t>05/12/2019</a:t>
             </a:fld>
             <a:endParaRPr lang="pt-BR"/>
           </a:p>
@@ -2975,7 +2976,7 @@
           <a:p>
             <a:fld id="{F99CF0CE-E8E4-4440-B759-5CFAF1499F60}" type="datetimeFigureOut">
               <a:rPr lang="pt-BR" smtClean="0"/>
-              <a:t>04/12/2019</a:t>
+              <a:t>05/12/2019</a:t>
             </a:fld>
             <a:endParaRPr lang="pt-BR"/>
           </a:p>
@@ -3173,7 +3174,7 @@
           <a:p>
             <a:fld id="{F99CF0CE-E8E4-4440-B759-5CFAF1499F60}" type="datetimeFigureOut">
               <a:rPr lang="pt-BR" smtClean="0"/>
-              <a:t>04/12/2019</a:t>
+              <a:t>05/12/2019</a:t>
             </a:fld>
             <a:endParaRPr lang="pt-BR"/>
           </a:p>
@@ -3381,7 +3382,7 @@
           <a:p>
             <a:fld id="{F99CF0CE-E8E4-4440-B759-5CFAF1499F60}" type="datetimeFigureOut">
               <a:rPr lang="pt-BR" smtClean="0"/>
-              <a:t>04/12/2019</a:t>
+              <a:t>05/12/2019</a:t>
             </a:fld>
             <a:endParaRPr lang="pt-BR"/>
           </a:p>
@@ -3639,7 +3640,7 @@
           <a:p>
             <a:fld id="{1FF31CB7-1021-4988-AE75-57CA8D34CD8E}" type="datetimeFigureOut">
               <a:rPr lang="pt-BR" smtClean="0"/>
-              <a:t>04/12/2019</a:t>
+              <a:t>05/12/2019</a:t>
             </a:fld>
             <a:endParaRPr lang="pt-BR"/>
           </a:p>
@@ -3866,7 +3867,7 @@
           <a:p>
             <a:fld id="{1FF31CB7-1021-4988-AE75-57CA8D34CD8E}" type="datetimeFigureOut">
               <a:rPr lang="pt-BR" smtClean="0"/>
-              <a:t>04/12/2019</a:t>
+              <a:t>05/12/2019</a:t>
             </a:fld>
             <a:endParaRPr lang="pt-BR"/>
           </a:p>
@@ -4228,7 +4229,7 @@
           <a:p>
             <a:fld id="{1FF31CB7-1021-4988-AE75-57CA8D34CD8E}" type="datetimeFigureOut">
               <a:rPr lang="pt-BR" smtClean="0"/>
-              <a:t>04/12/2019</a:t>
+              <a:t>05/12/2019</a:t>
             </a:fld>
             <a:endParaRPr lang="pt-BR"/>
           </a:p>
@@ -4341,7 +4342,7 @@
           <a:p>
             <a:fld id="{1FF31CB7-1021-4988-AE75-57CA8D34CD8E}" type="datetimeFigureOut">
               <a:rPr lang="pt-BR" smtClean="0"/>
-              <a:t>04/12/2019</a:t>
+              <a:t>05/12/2019</a:t>
             </a:fld>
             <a:endParaRPr lang="pt-BR"/>
           </a:p>
@@ -4431,7 +4432,7 @@
           <a:p>
             <a:fld id="{1FF31CB7-1021-4988-AE75-57CA8D34CD8E}" type="datetimeFigureOut">
               <a:rPr lang="pt-BR" smtClean="0"/>
-              <a:t>04/12/2019</a:t>
+              <a:t>05/12/2019</a:t>
             </a:fld>
             <a:endParaRPr lang="pt-BR"/>
           </a:p>
@@ -4703,7 +4704,7 @@
           <a:p>
             <a:fld id="{1FF31CB7-1021-4988-AE75-57CA8D34CD8E}" type="datetimeFigureOut">
               <a:rPr lang="pt-BR" smtClean="0"/>
-              <a:t>04/12/2019</a:t>
+              <a:t>05/12/2019</a:t>
             </a:fld>
             <a:endParaRPr lang="pt-BR"/>
           </a:p>
@@ -4955,7 +4956,7 @@
           <a:p>
             <a:fld id="{1FF31CB7-1021-4988-AE75-57CA8D34CD8E}" type="datetimeFigureOut">
               <a:rPr lang="pt-BR" smtClean="0"/>
-              <a:t>04/12/2019</a:t>
+              <a:t>05/12/2019</a:t>
             </a:fld>
             <a:endParaRPr lang="pt-BR"/>
           </a:p>
@@ -5163,7 +5164,7 @@
           <a:p>
             <a:fld id="{1FF31CB7-1021-4988-AE75-57CA8D34CD8E}" type="datetimeFigureOut">
               <a:rPr lang="pt-BR" smtClean="0"/>
-              <a:t>04/12/2019</a:t>
+              <a:t>05/12/2019</a:t>
             </a:fld>
             <a:endParaRPr lang="pt-BR"/>
           </a:p>
@@ -5714,7 +5715,7 @@
           <a:p>
             <a:fld id="{F99CF0CE-E8E4-4440-B759-5CFAF1499F60}" type="datetimeFigureOut">
               <a:rPr lang="pt-BR" smtClean="0"/>
-              <a:t>04/12/2019</a:t>
+              <a:t>05/12/2019</a:t>
             </a:fld>
             <a:endParaRPr lang="pt-BR"/>
           </a:p>
@@ -11160,13 +11161,6 @@
   <p:clrMapOvr>
     <a:masterClrMapping/>
   </p:clrMapOvr>
-  <p:timing>
-    <p:tnLst>
-      <p:par>
-        <p:cTn id="1" dur="indefinite" restart="never" nodeType="tmRoot"/>
-      </p:par>
-    </p:tnLst>
-  </p:timing>
 </p:sld>
 </file>
 
@@ -12925,13 +12919,6 @@
   <p:clrMapOvr>
     <a:masterClrMapping/>
   </p:clrMapOvr>
-  <p:timing>
-    <p:tnLst>
-      <p:par>
-        <p:cTn id="1" dur="indefinite" restart="never" nodeType="tmRoot"/>
-      </p:par>
-    </p:tnLst>
-  </p:timing>
 </p:sld>
 </file>
 
@@ -13017,7 +13004,7 @@
               <a:defRPr/>
             </a:pPr>
             <a:r>
-              <a:rPr kumimoji="0" lang="pt-BR" sz="3200" b="0" i="0" u="none" strike="noStrike" kern="1200" cap="none" spc="0" normalizeH="0" baseline="0" noProof="0" dirty="0" smtClean="0">
+              <a:rPr kumimoji="0" lang="pt-BR" sz="3200" b="0" i="0" u="none" strike="noStrike" kern="1200" cap="none" spc="0" normalizeH="0" baseline="0" noProof="0" dirty="0">
                 <a:ln>
                   <a:noFill/>
                 </a:ln>
@@ -13033,20 +13020,6 @@
               </a:rPr>
               <a:t>Outras tecnologias</a:t>
             </a:r>
-            <a:endParaRPr kumimoji="0" lang="pt-BR" sz="3200" b="0" i="0" u="none" strike="noStrike" kern="1200" cap="none" spc="0" normalizeH="0" baseline="0" noProof="0" dirty="0">
-              <a:ln>
-                <a:noFill/>
-              </a:ln>
-              <a:solidFill>
-                <a:prstClr val="white"/>
-              </a:solidFill>
-              <a:effectLst/>
-              <a:uLnTx/>
-              <a:uFillTx/>
-              <a:latin typeface="Calibri Light" panose="020F0302020204030204"/>
-              <a:ea typeface="+mn-ea"/>
-              <a:cs typeface="+mn-cs"/>
-            </a:endParaRPr>
           </a:p>
         </p:txBody>
       </p:sp>
@@ -13251,13 +13224,6 @@
   <p:clrMapOvr>
     <a:masterClrMapping/>
   </p:clrMapOvr>
-  <p:timing>
-    <p:tnLst>
-      <p:par>
-        <p:cTn id="1" dur="indefinite" restart="never" nodeType="tmRoot"/>
-      </p:par>
-    </p:tnLst>
-  </p:timing>
 </p:sld>
 </file>
 
@@ -13413,13 +13379,6 @@
   <p:clrMapOvr>
     <a:masterClrMapping/>
   </p:clrMapOvr>
-  <p:timing>
-    <p:tnLst>
-      <p:par>
-        <p:cTn id="1" dur="indefinite" restart="never" nodeType="tmRoot"/>
-      </p:par>
-    </p:tnLst>
-  </p:timing>
 </p:sld>
 </file>
 
@@ -13488,127 +13447,6 @@
               <a:rPr lang="en-US" altLang="pt-BR" sz="3200" dirty="0">
                 <a:latin typeface="+mj-lt"/>
               </a:rPr>
-              <a:t>DEMONSTRAÇÃO</a:t>
-            </a:r>
-          </a:p>
-        </p:txBody>
-      </p:sp>
-      <p:pic>
-        <p:nvPicPr>
-          <p:cNvPr id="6" name="Espaço Reservado para Conteúdo 5"/>
-          <p:cNvPicPr>
-            <a:picLocks noGrp="1" noChangeAspect="1"/>
-          </p:cNvPicPr>
-          <p:nvPr>
-            <p:ph idx="1"/>
-          </p:nvPr>
-        </p:nvPicPr>
-        <p:blipFill>
-          <a:blip r:embed="rId2" cstate="print">
-            <a:lum bright="-54000" contrast="-66000"/>
-            <a:extLst>
-              <a:ext uri="{28A0092B-C50C-407E-A947-70E740481C1C}">
-                <a14:useLocalDpi xmlns:a14="http://schemas.microsoft.com/office/drawing/2010/main" val="0"/>
-              </a:ext>
-            </a:extLst>
-          </a:blip>
-          <a:stretch>
-            <a:fillRect/>
-          </a:stretch>
-        </p:blipFill>
-        <p:spPr>
-          <a:xfrm>
-            <a:off x="883920" y="1842770"/>
-            <a:ext cx="10425430" cy="4351655"/>
-          </a:xfrm>
-          <a:prstGeom prst="rect">
-            <a:avLst/>
-          </a:prstGeom>
-        </p:spPr>
-      </p:pic>
-    </p:spTree>
-  </p:cSld>
-  <p:clrMapOvr>
-    <a:masterClrMapping/>
-  </p:clrMapOvr>
-  <p:transition spd="slow">
-    <p:push dir="u"/>
-  </p:transition>
-  <p:timing>
-    <p:tnLst>
-      <p:par>
-        <p:cTn id="1" dur="indefinite" restart="never" nodeType="tmRoot"/>
-      </p:par>
-    </p:tnLst>
-  </p:timing>
-</p:sld>
-</file>
-
-<file path=ppt/slides/slide15.xml><?xml version="1.0" encoding="utf-8"?>
-<p:sld xmlns:a="http://schemas.openxmlformats.org/drawingml/2006/main" xmlns:r="http://schemas.openxmlformats.org/officeDocument/2006/relationships" xmlns:p="http://schemas.openxmlformats.org/presentationml/2006/main">
-  <p:cSld>
-    <p:spTree>
-      <p:nvGrpSpPr>
-        <p:cNvPr id="1" name=""/>
-        <p:cNvGrpSpPr/>
-        <p:nvPr/>
-      </p:nvGrpSpPr>
-      <p:grpSpPr>
-        <a:xfrm>
-          <a:off x="0" y="0"/>
-          <a:ext cx="0" cy="0"/>
-          <a:chOff x="0" y="0"/>
-          <a:chExt cx="0" cy="0"/>
-        </a:xfrm>
-      </p:grpSpPr>
-      <p:sp>
-        <p:nvSpPr>
-          <p:cNvPr id="9" name="Retângulo 8"/>
-          <p:cNvSpPr/>
-          <p:nvPr/>
-        </p:nvSpPr>
-        <p:spPr>
-          <a:xfrm>
-            <a:off x="3310597" y="520877"/>
-            <a:ext cx="5570806" cy="1322363"/>
-          </a:xfrm>
-          <a:prstGeom prst="rect">
-            <a:avLst/>
-          </a:prstGeom>
-          <a:solidFill>
-            <a:schemeClr val="bg1"/>
-          </a:solidFill>
-          <a:ln>
-            <a:solidFill>
-              <a:srgbClr val="E50D3B"/>
-            </a:solidFill>
-          </a:ln>
-        </p:spPr>
-        <p:style>
-          <a:lnRef idx="2">
-            <a:schemeClr val="accent1">
-              <a:shade val="50000"/>
-            </a:schemeClr>
-          </a:lnRef>
-          <a:fillRef idx="1">
-            <a:schemeClr val="accent1"/>
-          </a:fillRef>
-          <a:effectRef idx="0">
-            <a:schemeClr val="accent1"/>
-          </a:effectRef>
-          <a:fontRef idx="minor">
-            <a:schemeClr val="lt1"/>
-          </a:fontRef>
-        </p:style>
-        <p:txBody>
-          <a:bodyPr rtlCol="0" anchor="ctr"/>
-          <a:lstStyle/>
-          <a:p>
-            <a:pPr algn="ctr"/>
-            <a:r>
-              <a:rPr lang="en-US" altLang="pt-BR" sz="3200" dirty="0">
-                <a:latin typeface="+mj-lt"/>
-              </a:rPr>
               <a:t>MANUAL DE INSTALAÇÃO</a:t>
             </a:r>
           </a:p>
@@ -13644,6 +13482,146 @@
           </a:prstGeom>
         </p:spPr>
       </p:pic>
+      <p:pic>
+        <p:nvPicPr>
+          <p:cNvPr id="2" name="Imagem 1">
+            <a:extLst>
+              <a:ext uri="{FF2B5EF4-FFF2-40B4-BE49-F238E27FC236}">
+                <a16:creationId xmlns:a16="http://schemas.microsoft.com/office/drawing/2014/main" id="{68D9C47A-5632-4A53-8C2B-14A54A7CC988}"/>
+              </a:ext>
+            </a:extLst>
+          </p:cNvPr>
+          <p:cNvPicPr>
+            <a:picLocks noChangeAspect="1"/>
+          </p:cNvPicPr>
+          <p:nvPr/>
+        </p:nvPicPr>
+        <p:blipFill>
+          <a:blip r:embed="rId3"/>
+          <a:stretch>
+            <a:fillRect/>
+          </a:stretch>
+        </p:blipFill>
+        <p:spPr>
+          <a:xfrm>
+            <a:off x="930555" y="1948407"/>
+            <a:ext cx="2962688" cy="4229690"/>
+          </a:xfrm>
+          <a:prstGeom prst="rect">
+            <a:avLst/>
+          </a:prstGeom>
+          <a:ln>
+            <a:solidFill>
+              <a:schemeClr val="bg1"/>
+            </a:solidFill>
+          </a:ln>
+        </p:spPr>
+      </p:pic>
+      <p:pic>
+        <p:nvPicPr>
+          <p:cNvPr id="4" name="Imagem 3">
+            <a:extLst>
+              <a:ext uri="{FF2B5EF4-FFF2-40B4-BE49-F238E27FC236}">
+                <a16:creationId xmlns:a16="http://schemas.microsoft.com/office/drawing/2014/main" id="{F3ABA128-95B3-464B-B26E-314D6EC43B8F}"/>
+              </a:ext>
+            </a:extLst>
+          </p:cNvPr>
+          <p:cNvPicPr>
+            <a:picLocks noChangeAspect="1"/>
+          </p:cNvPicPr>
+          <p:nvPr/>
+        </p:nvPicPr>
+        <p:blipFill>
+          <a:blip r:embed="rId4"/>
+          <a:stretch>
+            <a:fillRect/>
+          </a:stretch>
+        </p:blipFill>
+        <p:spPr>
+          <a:xfrm>
+            <a:off x="3615399" y="2082153"/>
+            <a:ext cx="2953162" cy="4201111"/>
+          </a:xfrm>
+          <a:prstGeom prst="rect">
+            <a:avLst/>
+          </a:prstGeom>
+          <a:ln>
+            <a:solidFill>
+              <a:schemeClr val="bg1"/>
+            </a:solidFill>
+          </a:ln>
+        </p:spPr>
+      </p:pic>
+      <p:pic>
+        <p:nvPicPr>
+          <p:cNvPr id="5" name="Imagem 4">
+            <a:extLst>
+              <a:ext uri="{FF2B5EF4-FFF2-40B4-BE49-F238E27FC236}">
+                <a16:creationId xmlns:a16="http://schemas.microsoft.com/office/drawing/2014/main" id="{92DD4625-FAC4-4AB0-B0F5-589904B1CC22}"/>
+              </a:ext>
+            </a:extLst>
+          </p:cNvPr>
+          <p:cNvPicPr>
+            <a:picLocks noChangeAspect="1"/>
+          </p:cNvPicPr>
+          <p:nvPr/>
+        </p:nvPicPr>
+        <p:blipFill>
+          <a:blip r:embed="rId5"/>
+          <a:stretch>
+            <a:fillRect/>
+          </a:stretch>
+        </p:blipFill>
+        <p:spPr>
+          <a:xfrm>
+            <a:off x="6051693" y="2246128"/>
+            <a:ext cx="2962688" cy="4210638"/>
+          </a:xfrm>
+          <a:prstGeom prst="rect">
+            <a:avLst/>
+          </a:prstGeom>
+          <a:ln>
+            <a:solidFill>
+              <a:schemeClr val="bg1"/>
+            </a:solidFill>
+          </a:ln>
+        </p:spPr>
+      </p:pic>
+      <p:pic>
+        <p:nvPicPr>
+          <p:cNvPr id="6" name="Imagem 5">
+            <a:extLst>
+              <a:ext uri="{FF2B5EF4-FFF2-40B4-BE49-F238E27FC236}">
+                <a16:creationId xmlns:a16="http://schemas.microsoft.com/office/drawing/2014/main" id="{E273F8E1-379F-41A5-A355-C5C5EB79B832}"/>
+              </a:ext>
+            </a:extLst>
+          </p:cNvPr>
+          <p:cNvPicPr>
+            <a:picLocks noChangeAspect="1"/>
+          </p:cNvPicPr>
+          <p:nvPr/>
+        </p:nvPicPr>
+        <p:blipFill>
+          <a:blip r:embed="rId6"/>
+          <a:stretch>
+            <a:fillRect/>
+          </a:stretch>
+        </p:blipFill>
+        <p:spPr>
+          <a:xfrm>
+            <a:off x="8435009" y="2376561"/>
+            <a:ext cx="2981741" cy="4201111"/>
+          </a:xfrm>
+          <a:prstGeom prst="rect">
+            <a:avLst/>
+          </a:prstGeom>
+          <a:ln>
+            <a:solidFill>
+              <a:schemeClr val="bg1"/>
+            </a:solidFill>
+          </a:ln>
+        </p:spPr>
+      </p:pic>
     </p:spTree>
   </p:cSld>
   <p:clrMapOvr>
@@ -13652,17 +13630,10 @@
   <p:transition spd="slow">
     <p:push dir="u"/>
   </p:transition>
-  <p:timing>
-    <p:tnLst>
-      <p:par>
-        <p:cTn id="1" dur="indefinite" restart="never" nodeType="tmRoot"/>
-      </p:par>
-    </p:tnLst>
-  </p:timing>
 </p:sld>
 </file>
 
-<file path=ppt/slides/slide16.xml><?xml version="1.0" encoding="utf-8"?>
+<file path=ppt/slides/slide15.xml><?xml version="1.0" encoding="utf-8"?>
 <p:sld xmlns:a="http://schemas.openxmlformats.org/drawingml/2006/main" xmlns:r="http://schemas.openxmlformats.org/officeDocument/2006/relationships" xmlns:p="http://schemas.openxmlformats.org/presentationml/2006/main">
   <p:cSld>
     <p:spTree>
@@ -13794,13 +13765,277 @@
   <p:transition spd="slow">
     <p:push dir="u"/>
   </p:transition>
-  <p:timing>
-    <p:tnLst>
-      <p:par>
-        <p:cTn id="1" dur="indefinite" restart="never" nodeType="tmRoot"/>
-      </p:par>
-    </p:tnLst>
-  </p:timing>
+</p:sld>
+</file>
+
+<file path=ppt/slides/slide16.xml><?xml version="1.0" encoding="utf-8"?>
+<p:sld xmlns:a="http://schemas.openxmlformats.org/drawingml/2006/main" xmlns:r="http://schemas.openxmlformats.org/officeDocument/2006/relationships" xmlns:p="http://schemas.openxmlformats.org/presentationml/2006/main">
+  <p:cSld>
+    <p:spTree>
+      <p:nvGrpSpPr>
+        <p:cNvPr id="1" name=""/>
+        <p:cNvGrpSpPr/>
+        <p:nvPr/>
+      </p:nvGrpSpPr>
+      <p:grpSpPr>
+        <a:xfrm>
+          <a:off x="0" y="0"/>
+          <a:ext cx="0" cy="0"/>
+          <a:chOff x="0" y="0"/>
+          <a:chExt cx="0" cy="0"/>
+        </a:xfrm>
+      </p:grpSpPr>
+      <p:sp>
+        <p:nvSpPr>
+          <p:cNvPr id="4" name="Retângulo 3">
+            <a:extLst>
+              <a:ext uri="{FF2B5EF4-FFF2-40B4-BE49-F238E27FC236}">
+                <a16:creationId xmlns:a16="http://schemas.microsoft.com/office/drawing/2014/main" id="{82D5A6DA-C4F7-45DC-8782-06FA5B5AD9F3}"/>
+              </a:ext>
+            </a:extLst>
+          </p:cNvPr>
+          <p:cNvSpPr/>
+          <p:nvPr/>
+        </p:nvSpPr>
+        <p:spPr>
+          <a:xfrm>
+            <a:off x="3310597" y="168452"/>
+            <a:ext cx="5570806" cy="1322363"/>
+          </a:xfrm>
+          <a:prstGeom prst="rect">
+            <a:avLst/>
+          </a:prstGeom>
+          <a:solidFill>
+            <a:schemeClr val="bg1"/>
+          </a:solidFill>
+          <a:ln>
+            <a:solidFill>
+              <a:srgbClr val="E50D3B"/>
+            </a:solidFill>
+          </a:ln>
+        </p:spPr>
+        <p:style>
+          <a:lnRef idx="2">
+            <a:schemeClr val="accent1">
+              <a:shade val="50000"/>
+            </a:schemeClr>
+          </a:lnRef>
+          <a:fillRef idx="1">
+            <a:schemeClr val="accent1"/>
+          </a:fillRef>
+          <a:effectRef idx="0">
+            <a:schemeClr val="accent1"/>
+          </a:effectRef>
+          <a:fontRef idx="minor">
+            <a:schemeClr val="lt1"/>
+          </a:fontRef>
+        </p:style>
+        <p:txBody>
+          <a:bodyPr rtlCol="0" anchor="ctr"/>
+          <a:lstStyle/>
+          <a:p>
+            <a:pPr algn="ctr"/>
+            <a:r>
+              <a:rPr lang="en-US" altLang="pt-BR" sz="3200" dirty="0">
+                <a:latin typeface="+mj-lt"/>
+              </a:rPr>
+              <a:t>Features do </a:t>
+            </a:r>
+            <a:r>
+              <a:rPr lang="en-US" altLang="pt-BR" sz="3200" dirty="0" err="1">
+                <a:latin typeface="+mj-lt"/>
+              </a:rPr>
+              <a:t>Produto</a:t>
+            </a:r>
+            <a:endParaRPr lang="en-US" altLang="pt-BR" sz="3200" dirty="0">
+              <a:latin typeface="+mj-lt"/>
+            </a:endParaRPr>
+          </a:p>
+        </p:txBody>
+      </p:sp>
+      <p:sp>
+        <p:nvSpPr>
+          <p:cNvPr id="5" name="Caixa de Texto 4">
+            <a:extLst>
+              <a:ext uri="{FF2B5EF4-FFF2-40B4-BE49-F238E27FC236}">
+                <a16:creationId xmlns:a16="http://schemas.microsoft.com/office/drawing/2014/main" id="{F910F5E5-38B0-4DF4-918D-0B0EA6B60D06}"/>
+              </a:ext>
+            </a:extLst>
+          </p:cNvPr>
+          <p:cNvSpPr txBox="1"/>
+          <p:nvPr/>
+        </p:nvSpPr>
+        <p:spPr>
+          <a:xfrm>
+            <a:off x="548115" y="2230120"/>
+            <a:ext cx="6271260" cy="1569660"/>
+          </a:xfrm>
+          <a:prstGeom prst="rect">
+            <a:avLst/>
+          </a:prstGeom>
+          <a:noFill/>
+        </p:spPr>
+        <p:txBody>
+          <a:bodyPr wrap="square" rtlCol="0">
+            <a:spAutoFit/>
+          </a:bodyPr>
+          <a:lstStyle/>
+          <a:p>
+            <a:pPr algn="ctr"/>
+            <a:r>
+              <a:rPr lang="en-US" altLang="pt-BR" sz="2400" dirty="0">
+                <a:latin typeface="Arial" panose="020B0604020202020204" pitchFamily="34" charset="0"/>
+                <a:cs typeface="Arial" panose="020B0604020202020204" pitchFamily="34" charset="0"/>
+              </a:rPr>
+              <a:t>Ferramenta de </a:t>
+            </a:r>
+            <a:r>
+              <a:rPr lang="en-US" altLang="pt-BR" sz="2400" dirty="0" err="1">
+                <a:latin typeface="Arial" panose="020B0604020202020204" pitchFamily="34" charset="0"/>
+                <a:cs typeface="Arial" panose="020B0604020202020204" pitchFamily="34" charset="0"/>
+              </a:rPr>
+              <a:t>busca</a:t>
+            </a:r>
+            <a:r>
+              <a:rPr lang="en-US" altLang="pt-BR" sz="2400" dirty="0">
+                <a:latin typeface="Arial" panose="020B0604020202020204" pitchFamily="34" charset="0"/>
+                <a:cs typeface="Arial" panose="020B0604020202020204" pitchFamily="34" charset="0"/>
+              </a:rPr>
+              <a:t> de </a:t>
+            </a:r>
+            <a:r>
+              <a:rPr lang="en-US" altLang="pt-BR" sz="2400" dirty="0" err="1">
+                <a:latin typeface="Arial" panose="020B0604020202020204" pitchFamily="34" charset="0"/>
+                <a:cs typeface="Arial" panose="020B0604020202020204" pitchFamily="34" charset="0"/>
+              </a:rPr>
+              <a:t>estabelecimentos</a:t>
+            </a:r>
+            <a:r>
+              <a:rPr lang="en-US" altLang="pt-BR" sz="2400" dirty="0">
+                <a:latin typeface="Arial" panose="020B0604020202020204" pitchFamily="34" charset="0"/>
+                <a:cs typeface="Arial" panose="020B0604020202020204" pitchFamily="34" charset="0"/>
+              </a:rPr>
+              <a:t> no site. O </a:t>
+            </a:r>
+            <a:r>
+              <a:rPr lang="en-US" altLang="pt-BR" sz="2400" dirty="0" err="1">
+                <a:latin typeface="Arial" panose="020B0604020202020204" pitchFamily="34" charset="0"/>
+                <a:cs typeface="Arial" panose="020B0604020202020204" pitchFamily="34" charset="0"/>
+              </a:rPr>
+              <a:t>cliente</a:t>
+            </a:r>
+            <a:r>
+              <a:rPr lang="en-US" altLang="pt-BR" sz="2400" dirty="0">
+                <a:latin typeface="Arial" panose="020B0604020202020204" pitchFamily="34" charset="0"/>
+                <a:cs typeface="Arial" panose="020B0604020202020204" pitchFamily="34" charset="0"/>
+              </a:rPr>
+              <a:t> </a:t>
+            </a:r>
+            <a:r>
+              <a:rPr lang="en-US" altLang="pt-BR" sz="2400" dirty="0" err="1">
+                <a:latin typeface="Arial" panose="020B0604020202020204" pitchFamily="34" charset="0"/>
+                <a:cs typeface="Arial" panose="020B0604020202020204" pitchFamily="34" charset="0"/>
+              </a:rPr>
+              <a:t>poderá</a:t>
+            </a:r>
+            <a:r>
+              <a:rPr lang="en-US" altLang="pt-BR" sz="2400" dirty="0">
+                <a:latin typeface="Arial" panose="020B0604020202020204" pitchFamily="34" charset="0"/>
+                <a:cs typeface="Arial" panose="020B0604020202020204" pitchFamily="34" charset="0"/>
+              </a:rPr>
+              <a:t> achar o Mercado </a:t>
+            </a:r>
+            <a:r>
+              <a:rPr lang="en-US" altLang="pt-BR" sz="2400" dirty="0" err="1">
+                <a:latin typeface="Arial" panose="020B0604020202020204" pitchFamily="34" charset="0"/>
+                <a:cs typeface="Arial" panose="020B0604020202020204" pitchFamily="34" charset="0"/>
+              </a:rPr>
+              <a:t>mais</a:t>
+            </a:r>
+            <a:r>
+              <a:rPr lang="en-US" altLang="pt-BR" sz="2400" dirty="0">
+                <a:latin typeface="Arial" panose="020B0604020202020204" pitchFamily="34" charset="0"/>
+                <a:cs typeface="Arial" panose="020B0604020202020204" pitchFamily="34" charset="0"/>
+              </a:rPr>
+              <a:t> </a:t>
+            </a:r>
+            <a:r>
+              <a:rPr lang="en-US" altLang="pt-BR" sz="2400" dirty="0" err="1">
+                <a:latin typeface="Arial" panose="020B0604020202020204" pitchFamily="34" charset="0"/>
+                <a:cs typeface="Arial" panose="020B0604020202020204" pitchFamily="34" charset="0"/>
+              </a:rPr>
+              <a:t>próximo</a:t>
+            </a:r>
+            <a:r>
+              <a:rPr lang="en-US" altLang="pt-BR" sz="2400" dirty="0">
+                <a:latin typeface="Arial" panose="020B0604020202020204" pitchFamily="34" charset="0"/>
+                <a:cs typeface="Arial" panose="020B0604020202020204" pitchFamily="34" charset="0"/>
+              </a:rPr>
+              <a:t> de </a:t>
+            </a:r>
+            <a:r>
+              <a:rPr lang="en-US" altLang="pt-BR" sz="2400" dirty="0" err="1">
+                <a:latin typeface="Arial" panose="020B0604020202020204" pitchFamily="34" charset="0"/>
+                <a:cs typeface="Arial" panose="020B0604020202020204" pitchFamily="34" charset="0"/>
+              </a:rPr>
+              <a:t>sua</a:t>
+            </a:r>
+            <a:r>
+              <a:rPr lang="en-US" altLang="pt-BR" sz="2400" dirty="0">
+                <a:latin typeface="Arial" panose="020B0604020202020204" pitchFamily="34" charset="0"/>
+                <a:cs typeface="Arial" panose="020B0604020202020204" pitchFamily="34" charset="0"/>
+              </a:rPr>
+              <a:t> casa via API de Google Maps.</a:t>
+            </a:r>
+          </a:p>
+        </p:txBody>
+      </p:sp>
+      <p:pic>
+        <p:nvPicPr>
+          <p:cNvPr id="7" name="Imagem 6">
+            <a:extLst>
+              <a:ext uri="{FF2B5EF4-FFF2-40B4-BE49-F238E27FC236}">
+                <a16:creationId xmlns:a16="http://schemas.microsoft.com/office/drawing/2014/main" id="{32608B0F-98C8-4E5C-BA49-FAB22B2CCEA3}"/>
+              </a:ext>
+            </a:extLst>
+          </p:cNvPr>
+          <p:cNvPicPr>
+            <a:picLocks noChangeAspect="1"/>
+          </p:cNvPicPr>
+          <p:nvPr/>
+        </p:nvPicPr>
+        <p:blipFill>
+          <a:blip r:embed="rId2" cstate="print">
+            <a:extLst>
+              <a:ext uri="{28A0092B-C50C-407E-A947-70E740481C1C}">
+                <a14:useLocalDpi xmlns:a14="http://schemas.microsoft.com/office/drawing/2010/main" val="0"/>
+              </a:ext>
+            </a:extLst>
+          </a:blip>
+          <a:stretch>
+            <a:fillRect/>
+          </a:stretch>
+        </p:blipFill>
+        <p:spPr>
+          <a:xfrm>
+            <a:off x="2714456" y="3985309"/>
+            <a:ext cx="1938577" cy="1938577"/>
+          </a:xfrm>
+          <a:prstGeom prst="rect">
+            <a:avLst/>
+          </a:prstGeom>
+        </p:spPr>
+      </p:pic>
+    </p:spTree>
+    <p:extLst>
+      <p:ext uri="{BB962C8B-B14F-4D97-AF65-F5344CB8AC3E}">
+        <p14:creationId xmlns:p14="http://schemas.microsoft.com/office/powerpoint/2010/main" val="1809249490"/>
+      </p:ext>
+    </p:extLst>
+  </p:cSld>
+  <p:clrMapOvr>
+    <a:masterClrMapping/>
+  </p:clrMapOvr>
 </p:sld>
 </file>
 
@@ -14113,17 +14348,124 @@
   <p:transition spd="slow">
     <p:push dir="u"/>
   </p:transition>
-  <p:timing>
-    <p:tnLst>
-      <p:par>
-        <p:cTn id="1" dur="indefinite" restart="never" nodeType="tmRoot"/>
-      </p:par>
-    </p:tnLst>
-  </p:timing>
 </p:sld>
 </file>
 
 <file path=ppt/slides/slide18.xml><?xml version="1.0" encoding="utf-8"?>
+<p:sld xmlns:a="http://schemas.openxmlformats.org/drawingml/2006/main" xmlns:r="http://schemas.openxmlformats.org/officeDocument/2006/relationships" xmlns:p="http://schemas.openxmlformats.org/presentationml/2006/main">
+  <p:cSld>
+    <p:spTree>
+      <p:nvGrpSpPr>
+        <p:cNvPr id="1" name=""/>
+        <p:cNvGrpSpPr/>
+        <p:nvPr/>
+      </p:nvGrpSpPr>
+      <p:grpSpPr>
+        <a:xfrm>
+          <a:off x="0" y="0"/>
+          <a:ext cx="0" cy="0"/>
+          <a:chOff x="0" y="0"/>
+          <a:chExt cx="0" cy="0"/>
+        </a:xfrm>
+      </p:grpSpPr>
+      <p:sp>
+        <p:nvSpPr>
+          <p:cNvPr id="9" name="Retângulo 8"/>
+          <p:cNvSpPr/>
+          <p:nvPr/>
+        </p:nvSpPr>
+        <p:spPr>
+          <a:xfrm>
+            <a:off x="3310597" y="520877"/>
+            <a:ext cx="5570806" cy="1322363"/>
+          </a:xfrm>
+          <a:prstGeom prst="rect">
+            <a:avLst/>
+          </a:prstGeom>
+          <a:solidFill>
+            <a:schemeClr val="bg1"/>
+          </a:solidFill>
+          <a:ln>
+            <a:solidFill>
+              <a:srgbClr val="E50D3B"/>
+            </a:solidFill>
+          </a:ln>
+        </p:spPr>
+        <p:style>
+          <a:lnRef idx="2">
+            <a:schemeClr val="accent1">
+              <a:shade val="50000"/>
+            </a:schemeClr>
+          </a:lnRef>
+          <a:fillRef idx="1">
+            <a:schemeClr val="accent1"/>
+          </a:fillRef>
+          <a:effectRef idx="0">
+            <a:schemeClr val="accent1"/>
+          </a:effectRef>
+          <a:fontRef idx="minor">
+            <a:schemeClr val="lt1"/>
+          </a:fontRef>
+        </p:style>
+        <p:txBody>
+          <a:bodyPr rtlCol="0" anchor="ctr"/>
+          <a:lstStyle/>
+          <a:p>
+            <a:pPr algn="ctr"/>
+            <a:r>
+              <a:rPr lang="en-US" altLang="pt-BR" sz="3200" dirty="0">
+                <a:latin typeface="+mj-lt"/>
+              </a:rPr>
+              <a:t>DEMONSTRAÇÃO</a:t>
+            </a:r>
+          </a:p>
+        </p:txBody>
+      </p:sp>
+      <p:pic>
+        <p:nvPicPr>
+          <p:cNvPr id="6" name="Espaço Reservado para Conteúdo 5"/>
+          <p:cNvPicPr>
+            <a:picLocks noGrp="1" noChangeAspect="1"/>
+          </p:cNvPicPr>
+          <p:nvPr>
+            <p:ph idx="1"/>
+          </p:nvPr>
+        </p:nvPicPr>
+        <p:blipFill>
+          <a:blip r:embed="rId2" cstate="print">
+            <a:lum bright="-54000" contrast="-66000"/>
+            <a:extLst>
+              <a:ext uri="{28A0092B-C50C-407E-A947-70E740481C1C}">
+                <a14:useLocalDpi xmlns:a14="http://schemas.microsoft.com/office/drawing/2010/main" val="0"/>
+              </a:ext>
+            </a:extLst>
+          </a:blip>
+          <a:stretch>
+            <a:fillRect/>
+          </a:stretch>
+        </p:blipFill>
+        <p:spPr>
+          <a:xfrm>
+            <a:off x="883920" y="1842770"/>
+            <a:ext cx="10425430" cy="4351655"/>
+          </a:xfrm>
+          <a:prstGeom prst="rect">
+            <a:avLst/>
+          </a:prstGeom>
+        </p:spPr>
+      </p:pic>
+    </p:spTree>
+  </p:cSld>
+  <p:clrMapOvr>
+    <a:masterClrMapping/>
+  </p:clrMapOvr>
+  <p:transition spd="slow">
+    <p:push dir="u"/>
+  </p:transition>
+</p:sld>
+</file>
+
+<file path=ppt/slides/slide19.xml><?xml version="1.0" encoding="utf-8"?>
 <p:sld xmlns:a="http://schemas.openxmlformats.org/drawingml/2006/main" xmlns:r="http://schemas.openxmlformats.org/officeDocument/2006/relationships" xmlns:p="http://schemas.openxmlformats.org/presentationml/2006/main">
   <p:cSld>
     <p:spTree>
@@ -14327,353 +14669,6 @@
   <p:transition spd="slow">
     <p:push dir="u"/>
   </p:transition>
-  <p:timing>
-    <p:tnLst>
-      <p:par>
-        <p:cTn id="1" dur="indefinite" restart="never" nodeType="tmRoot"/>
-      </p:par>
-    </p:tnLst>
-  </p:timing>
-</p:sld>
-</file>
-
-<file path=ppt/slides/slide19.xml><?xml version="1.0" encoding="utf-8"?>
-<p:sld xmlns:a="http://schemas.openxmlformats.org/drawingml/2006/main" xmlns:r="http://schemas.openxmlformats.org/officeDocument/2006/relationships" xmlns:p="http://schemas.openxmlformats.org/presentationml/2006/main">
-  <p:cSld>
-    <p:spTree>
-      <p:nvGrpSpPr>
-        <p:cNvPr id="1" name=""/>
-        <p:cNvGrpSpPr/>
-        <p:nvPr/>
-      </p:nvGrpSpPr>
-      <p:grpSpPr>
-        <a:xfrm>
-          <a:off x="0" y="0"/>
-          <a:ext cx="0" cy="0"/>
-          <a:chOff x="0" y="0"/>
-          <a:chExt cx="0" cy="0"/>
-        </a:xfrm>
-      </p:grpSpPr>
-      <p:sp>
-        <p:nvSpPr>
-          <p:cNvPr id="9" name="Retângulo 8"/>
-          <p:cNvSpPr/>
-          <p:nvPr/>
-        </p:nvSpPr>
-        <p:spPr>
-          <a:xfrm>
-            <a:off x="3310890" y="168275"/>
-            <a:ext cx="5570855" cy="1132840"/>
-          </a:xfrm>
-          <a:prstGeom prst="rect">
-            <a:avLst/>
-          </a:prstGeom>
-          <a:solidFill>
-            <a:schemeClr val="bg1"/>
-          </a:solidFill>
-          <a:ln>
-            <a:solidFill>
-              <a:srgbClr val="E50D3B"/>
-            </a:solidFill>
-          </a:ln>
-        </p:spPr>
-        <p:style>
-          <a:lnRef idx="2">
-            <a:schemeClr val="accent1">
-              <a:shade val="50000"/>
-            </a:schemeClr>
-          </a:lnRef>
-          <a:fillRef idx="1">
-            <a:schemeClr val="accent1"/>
-          </a:fillRef>
-          <a:effectRef idx="0">
-            <a:schemeClr val="accent1"/>
-          </a:effectRef>
-          <a:fontRef idx="minor">
-            <a:schemeClr val="lt1"/>
-          </a:fontRef>
-        </p:style>
-        <p:txBody>
-          <a:bodyPr rtlCol="0" anchor="ctr"/>
-          <a:lstStyle/>
-          <a:p>
-            <a:pPr algn="ctr"/>
-            <a:r>
-              <a:rPr lang="en-US" altLang="pt-BR" sz="3200" dirty="0">
-                <a:latin typeface="+mj-lt"/>
-              </a:rPr>
-              <a:t>PROCESSO DE APRENDIZAGEM</a:t>
-            </a:r>
-          </a:p>
-        </p:txBody>
-      </p:sp>
-      <p:pic>
-        <p:nvPicPr>
-          <p:cNvPr id="3" name="Imagem 2"/>
-          <p:cNvPicPr>
-            <a:picLocks noChangeAspect="1"/>
-          </p:cNvPicPr>
-          <p:nvPr/>
-        </p:nvPicPr>
-        <p:blipFill>
-          <a:blip r:embed="rId2" cstate="print">
-            <a:extLst>
-              <a:ext uri="{28A0092B-C50C-407E-A947-70E740481C1C}">
-                <a14:useLocalDpi xmlns:a14="http://schemas.microsoft.com/office/drawing/2010/main" val="0"/>
-              </a:ext>
-            </a:extLst>
-          </a:blip>
-          <a:stretch>
-            <a:fillRect/>
-          </a:stretch>
-        </p:blipFill>
-        <p:spPr>
-          <a:xfrm>
-            <a:off x="10717883" y="105229"/>
-            <a:ext cx="1438302" cy="600335"/>
-          </a:xfrm>
-          <a:prstGeom prst="rect">
-            <a:avLst/>
-          </a:prstGeom>
-        </p:spPr>
-      </p:pic>
-      <p:sp>
-        <p:nvSpPr>
-          <p:cNvPr id="11" name="Caixa de Texto 10"/>
-          <p:cNvSpPr txBox="1"/>
-          <p:nvPr/>
-        </p:nvSpPr>
-        <p:spPr>
-          <a:xfrm>
-            <a:off x="363220" y="1301115"/>
-            <a:ext cx="11096625" cy="5815965"/>
-          </a:xfrm>
-          <a:prstGeom prst="rect">
-            <a:avLst/>
-          </a:prstGeom>
-          <a:noFill/>
-        </p:spPr>
-        <p:txBody>
-          <a:bodyPr wrap="square" rtlCol="0">
-            <a:spAutoFit/>
-          </a:bodyPr>
-          <a:lstStyle/>
-          <a:p>
-            <a:pPr algn="l"/>
-            <a:r>
-              <a:rPr lang="en-US" altLang="pt-BR" sz="2000">
-                <a:solidFill>
-                  <a:schemeClr val="accent5"/>
-                </a:solidFill>
-                <a:latin typeface="Arial" panose="020B0604020202020204" pitchFamily="34" charset="0"/>
-                <a:cs typeface="Arial" panose="020B0604020202020204" pitchFamily="34" charset="0"/>
-                <a:sym typeface="+mn-ea"/>
-              </a:rPr>
-              <a:t>Arthur</a:t>
-            </a:r>
-          </a:p>
-          <a:p>
-            <a:pPr algn="l"/>
-            <a:r>
-              <a:rPr lang="en-US" altLang="pt-BR" sz="1400">
-                <a:solidFill>
-                  <a:schemeClr val="accent5"/>
-                </a:solidFill>
-                <a:latin typeface="Arial" panose="020B0604020202020204" pitchFamily="34" charset="0"/>
-                <a:cs typeface="Arial" panose="020B0604020202020204" pitchFamily="34" charset="0"/>
-              </a:rPr>
-              <a:t>Product Owner</a:t>
-            </a:r>
-            <a:endParaRPr lang="en-US" altLang="pt-BR" sz="1400">
-              <a:latin typeface="Arial" panose="020B0604020202020204" pitchFamily="34" charset="0"/>
-              <a:cs typeface="Arial" panose="020B0604020202020204" pitchFamily="34" charset="0"/>
-            </a:endParaRPr>
-          </a:p>
-          <a:p>
-            <a:pPr algn="l"/>
-            <a:r>
-              <a:rPr lang="en-US" altLang="pt-BR">
-                <a:latin typeface="Arial" panose="020B0604020202020204" pitchFamily="34" charset="0"/>
-                <a:cs typeface="Arial" panose="020B0604020202020204" pitchFamily="34" charset="0"/>
-              </a:rPr>
-              <a:t>“Aprendi muito tecnicamente durante todo o processo do projeto. Mas o que mais aprendi foi a ter uma melhor liderança, impulsionar todos juntos para frente rumo ao Objetivo.”</a:t>
-            </a:r>
-          </a:p>
-          <a:p>
-            <a:pPr algn="l"/>
-            <a:r>
-              <a:rPr lang="en-US" altLang="pt-BR" sz="2000">
-                <a:solidFill>
-                  <a:schemeClr val="accent5">
-                    <a:lumMod val="40000"/>
-                    <a:lumOff val="60000"/>
-                  </a:schemeClr>
-                </a:solidFill>
-                <a:latin typeface="Arial" panose="020B0604020202020204" pitchFamily="34" charset="0"/>
-                <a:cs typeface="Arial" panose="020B0604020202020204" pitchFamily="34" charset="0"/>
-                <a:sym typeface="+mn-ea"/>
-              </a:rPr>
-              <a:t>João</a:t>
-            </a:r>
-          </a:p>
-          <a:p>
-            <a:pPr algn="l"/>
-            <a:r>
-              <a:rPr lang="en-US" altLang="pt-BR" sz="1400">
-                <a:solidFill>
-                  <a:schemeClr val="accent5">
-                    <a:lumMod val="40000"/>
-                    <a:lumOff val="60000"/>
-                  </a:schemeClr>
-                </a:solidFill>
-                <a:latin typeface="Arial" panose="020B0604020202020204" pitchFamily="34" charset="0"/>
-                <a:cs typeface="Arial" panose="020B0604020202020204" pitchFamily="34" charset="0"/>
-              </a:rPr>
-              <a:t>DEV</a:t>
-            </a:r>
-            <a:endParaRPr lang="en-US" altLang="pt-BR">
-              <a:latin typeface="Arial" panose="020B0604020202020204" pitchFamily="34" charset="0"/>
-              <a:cs typeface="Arial" panose="020B0604020202020204" pitchFamily="34" charset="0"/>
-            </a:endParaRPr>
-          </a:p>
-          <a:p>
-            <a:pPr algn="l"/>
-            <a:r>
-              <a:rPr lang="en-US" altLang="pt-BR">
-                <a:latin typeface="Arial" panose="020B0604020202020204" pitchFamily="34" charset="0"/>
-                <a:cs typeface="Arial" panose="020B0604020202020204" pitchFamily="34" charset="0"/>
-                <a:sym typeface="+mn-ea"/>
-              </a:rPr>
-              <a:t>“Foi um aprendizado muito interessante, a mudança de grupo foi desafiadora, trabalhar com pessoas novas das quais o contato não era grande, pórem que me auziliaram e muito em minhas atividades tecnicas no projeto, fico muito feliz onde chegamos apesar de todas as barreiras”</a:t>
-            </a:r>
-            <a:endParaRPr lang="en-US" altLang="pt-BR">
-              <a:latin typeface="Arial" panose="020B0604020202020204" pitchFamily="34" charset="0"/>
-              <a:cs typeface="Arial" panose="020B0604020202020204" pitchFamily="34" charset="0"/>
-            </a:endParaRPr>
-          </a:p>
-          <a:p>
-            <a:pPr algn="l"/>
-            <a:r>
-              <a:rPr lang="en-US" altLang="pt-BR" sz="2000">
-                <a:solidFill>
-                  <a:srgbClr val="7030A0"/>
-                </a:solidFill>
-                <a:latin typeface="Arial" panose="020B0604020202020204" pitchFamily="34" charset="0"/>
-                <a:cs typeface="Arial" panose="020B0604020202020204" pitchFamily="34" charset="0"/>
-                <a:sym typeface="+mn-ea"/>
-              </a:rPr>
-              <a:t>Manoel</a:t>
-            </a:r>
-          </a:p>
-          <a:p>
-            <a:pPr algn="l"/>
-            <a:r>
-              <a:rPr lang="en-US" altLang="pt-BR" sz="1400">
-                <a:solidFill>
-                  <a:srgbClr val="7030A0"/>
-                </a:solidFill>
-                <a:latin typeface="Arial" panose="020B0604020202020204" pitchFamily="34" charset="0"/>
-                <a:cs typeface="Arial" panose="020B0604020202020204" pitchFamily="34" charset="0"/>
-                <a:sym typeface="+mn-ea"/>
-              </a:rPr>
-              <a:t>Scrum Master</a:t>
-            </a:r>
-            <a:endParaRPr lang="en-US" altLang="pt-BR" sz="2000">
-              <a:latin typeface="Arial" panose="020B0604020202020204" pitchFamily="34" charset="0"/>
-              <a:cs typeface="Arial" panose="020B0604020202020204" pitchFamily="34" charset="0"/>
-            </a:endParaRPr>
-          </a:p>
-          <a:p>
-            <a:pPr algn="l"/>
-            <a:r>
-              <a:rPr lang="en-US" altLang="pt-BR">
-                <a:latin typeface="Arial" panose="020B0604020202020204" pitchFamily="34" charset="0"/>
-                <a:cs typeface="Arial" panose="020B0604020202020204" pitchFamily="34" charset="0"/>
-                <a:sym typeface="+mn-ea"/>
-              </a:rPr>
-              <a:t>“Foi uma experiência muito marcante, aprender a me relacionar com pessoas novas e lidar com tecnologias que eu não conhecia foi muito desafiador, mas no final fiquei bem satisfeito com o resultado do projeto e com o que descobri ser capaz de desenvolver”</a:t>
-            </a:r>
-          </a:p>
-          <a:p>
-            <a:pPr algn="l"/>
-            <a:r>
-              <a:rPr lang="en-US" altLang="pt-BR" sz="2000">
-                <a:solidFill>
-                  <a:schemeClr val="accent3"/>
-                </a:solidFill>
-                <a:latin typeface="Arial" panose="020B0604020202020204" pitchFamily="34" charset="0"/>
-                <a:cs typeface="Arial" panose="020B0604020202020204" pitchFamily="34" charset="0"/>
-                <a:sym typeface="+mn-ea"/>
-              </a:rPr>
-              <a:t>Pedro</a:t>
-            </a:r>
-            <a:endParaRPr lang="en-US" altLang="pt-BR">
-              <a:solidFill>
-                <a:schemeClr val="accent3"/>
-              </a:solidFill>
-              <a:latin typeface="Arial" panose="020B0604020202020204" pitchFamily="34" charset="0"/>
-              <a:cs typeface="Arial" panose="020B0604020202020204" pitchFamily="34" charset="0"/>
-              <a:sym typeface="+mn-ea"/>
-            </a:endParaRPr>
-          </a:p>
-          <a:p>
-            <a:pPr algn="l"/>
-            <a:r>
-              <a:rPr lang="en-US" altLang="pt-BR" sz="1400">
-                <a:solidFill>
-                  <a:schemeClr val="accent3"/>
-                </a:solidFill>
-                <a:latin typeface="Arial" panose="020B0604020202020204" pitchFamily="34" charset="0"/>
-                <a:cs typeface="Arial" panose="020B0604020202020204" pitchFamily="34" charset="0"/>
-                <a:sym typeface="+mn-ea"/>
-              </a:rPr>
-              <a:t>DEV</a:t>
-            </a:r>
-            <a:endParaRPr lang="en-US" altLang="pt-BR">
-              <a:latin typeface="Arial" panose="020B0604020202020204" pitchFamily="34" charset="0"/>
-              <a:cs typeface="Arial" panose="020B0604020202020204" pitchFamily="34" charset="0"/>
-              <a:sym typeface="+mn-ea"/>
-            </a:endParaRPr>
-          </a:p>
-          <a:p>
-            <a:pPr algn="l"/>
-            <a:r>
-              <a:rPr lang="en-US" altLang="pt-BR">
-                <a:latin typeface="Arial" panose="020B0604020202020204" pitchFamily="34" charset="0"/>
-                <a:cs typeface="Arial" panose="020B0604020202020204" pitchFamily="34" charset="0"/>
-                <a:sym typeface="+mn-ea"/>
-              </a:rPr>
-              <a:t>“Agradeço pela oportunidade de aprender durante todo esse processo. Tenho muito ao que aprender ainda, mas esse tempo foi um desafio,pois lidar com quem você não conhece, e ainda mais, trabalhar com elas é difícil, mas aqui chegamos. Esse projeto me fez enxergar que sou capaz ainda mais de desenvolver meu aprendizado. Fico feliz por ter dado tudo certo””</a:t>
-            </a:r>
-            <a:endParaRPr lang="en-US" altLang="pt-BR" sz="2000">
-              <a:latin typeface="Arial" panose="020B0604020202020204" pitchFamily="34" charset="0"/>
-              <a:cs typeface="Arial" panose="020B0604020202020204" pitchFamily="34" charset="0"/>
-            </a:endParaRPr>
-          </a:p>
-          <a:p>
-            <a:pPr algn="l"/>
-            <a:endParaRPr lang="en-US" altLang="pt-BR" sz="2000">
-              <a:latin typeface="Arial" panose="020B0604020202020204" pitchFamily="34" charset="0"/>
-              <a:cs typeface="Arial" panose="020B0604020202020204" pitchFamily="34" charset="0"/>
-            </a:endParaRPr>
-          </a:p>
-        </p:txBody>
-      </p:sp>
-    </p:spTree>
-  </p:cSld>
-  <p:clrMapOvr>
-    <a:masterClrMapping/>
-  </p:clrMapOvr>
-  <p:transition spd="slow">
-    <p:push dir="u"/>
-  </p:transition>
-  <p:timing>
-    <p:tnLst>
-      <p:par>
-        <p:cTn id="1" dur="indefinite" restart="never" nodeType="tmRoot"/>
-      </p:par>
-    </p:tnLst>
-  </p:timing>
 </p:sld>
 </file>
 
@@ -14755,13 +14750,6 @@
   <p:transition spd="slow">
     <p:push dir="u"/>
   </p:transition>
-  <p:timing>
-    <p:tnLst>
-      <p:par>
-        <p:cTn id="1" dur="indefinite" restart="never" nodeType="tmRoot"/>
-      </p:par>
-    </p:tnLst>
-  </p:timing>
 </p:sld>
 </file>
 
@@ -14790,8 +14778,8 @@
         </p:nvSpPr>
         <p:spPr>
           <a:xfrm>
-            <a:off x="3310597" y="168452"/>
-            <a:ext cx="5570806" cy="1322363"/>
+            <a:off x="3310890" y="168275"/>
+            <a:ext cx="5570855" cy="1132840"/>
           </a:xfrm>
           <a:prstGeom prst="rect">
             <a:avLst/>
@@ -14830,7 +14818,7 @@
               <a:rPr lang="en-US" altLang="pt-BR" sz="3200" dirty="0">
                 <a:latin typeface="+mj-lt"/>
               </a:rPr>
-              <a:t>FUTURO</a:t>
+              <a:t>PROCESSO DE APRENDIZAGEM</a:t>
             </a:r>
           </a:p>
         </p:txBody>
@@ -14867,14 +14855,14 @@
       </p:pic>
       <p:sp>
         <p:nvSpPr>
-          <p:cNvPr id="5" name="Caixa de Texto 4"/>
+          <p:cNvPr id="11" name="Caixa de Texto 10"/>
           <p:cNvSpPr txBox="1"/>
           <p:nvPr/>
         </p:nvSpPr>
         <p:spPr>
           <a:xfrm>
-            <a:off x="4324985" y="2242820"/>
-            <a:ext cx="6271260" cy="1198880"/>
+            <a:off x="363220" y="1301115"/>
+            <a:ext cx="11096625" cy="5815965"/>
           </a:xfrm>
           <a:prstGeom prst="rect">
             <a:avLst/>
@@ -14887,80 +14875,206 @@
           </a:bodyPr>
           <a:lstStyle/>
           <a:p>
-            <a:pPr algn="ctr"/>
+            <a:pPr algn="l"/>
             <a:r>
-              <a:rPr lang="en-US" altLang="pt-BR" sz="2400">
-                <a:latin typeface="Arial" panose="020B0604020202020204" pitchFamily="34" charset="0"/>
-                <a:cs typeface="Arial" panose="020B0604020202020204" pitchFamily="34" charset="0"/>
-              </a:rPr>
-              <a:t>Sensores pelos corredores, indicando o que cada corredor contém. Utilização parecida com a “placa de corredor”</a:t>
-            </a:r>
-          </a:p>
-        </p:txBody>
-      </p:sp>
-      <p:sp>
-        <p:nvSpPr>
-          <p:cNvPr id="11" name="Caixa de Texto 10"/>
-          <p:cNvSpPr txBox="1"/>
-          <p:nvPr/>
-        </p:nvSpPr>
-        <p:spPr>
-          <a:xfrm>
-            <a:off x="1595120" y="4366260"/>
-            <a:ext cx="9001125" cy="460375"/>
-          </a:xfrm>
-          <a:prstGeom prst="rect">
-            <a:avLst/>
-          </a:prstGeom>
-          <a:noFill/>
-        </p:spPr>
-        <p:txBody>
-          <a:bodyPr wrap="square" rtlCol="0">
-            <a:spAutoFit/>
-          </a:bodyPr>
-          <a:lstStyle/>
-          <a:p>
-            <a:pPr algn="ctr"/>
-            <a:r>
-              <a:rPr lang="en-US" altLang="pt-BR" sz="2400">
+              <a:rPr lang="en-US" altLang="pt-BR" sz="2000">
+                <a:solidFill>
+                  <a:schemeClr val="accent5"/>
+                </a:solidFill>
                 <a:latin typeface="Arial" panose="020B0604020202020204" pitchFamily="34" charset="0"/>
                 <a:cs typeface="Arial" panose="020B0604020202020204" pitchFamily="34" charset="0"/>
                 <a:sym typeface="+mn-ea"/>
               </a:rPr>
-              <a:t>Facilitando a localização e dispensando a ajuda de funcionários</a:t>
+              <a:t>Arthur</a:t>
             </a:r>
-            <a:endParaRPr lang="en-US" altLang="pt-BR" sz="2400">
+          </a:p>
+          <a:p>
+            <a:pPr algn="l"/>
+            <a:r>
+              <a:rPr lang="en-US" altLang="pt-BR" sz="1400">
+                <a:solidFill>
+                  <a:schemeClr val="accent5"/>
+                </a:solidFill>
+                <a:latin typeface="Arial" panose="020B0604020202020204" pitchFamily="34" charset="0"/>
+                <a:cs typeface="Arial" panose="020B0604020202020204" pitchFamily="34" charset="0"/>
+              </a:rPr>
+              <a:t>Product Owner</a:t>
+            </a:r>
+            <a:endParaRPr lang="en-US" altLang="pt-BR" sz="1400">
               <a:latin typeface="Arial" panose="020B0604020202020204" pitchFamily="34" charset="0"/>
               <a:cs typeface="Arial" panose="020B0604020202020204" pitchFamily="34" charset="0"/>
             </a:endParaRPr>
           </a:p>
+          <a:p>
+            <a:pPr algn="l"/>
+            <a:r>
+              <a:rPr lang="en-US" altLang="pt-BR">
+                <a:latin typeface="Arial" panose="020B0604020202020204" pitchFamily="34" charset="0"/>
+                <a:cs typeface="Arial" panose="020B0604020202020204" pitchFamily="34" charset="0"/>
+              </a:rPr>
+              <a:t>“Aprendi muito tecnicamente durante todo o processo do projeto. Mas o que mais aprendi foi a ter uma melhor liderança, impulsionar todos juntos para frente rumo ao Objetivo.”</a:t>
+            </a:r>
+          </a:p>
+          <a:p>
+            <a:pPr algn="l"/>
+            <a:r>
+              <a:rPr lang="en-US" altLang="pt-BR" sz="2000">
+                <a:solidFill>
+                  <a:schemeClr val="accent5">
+                    <a:lumMod val="40000"/>
+                    <a:lumOff val="60000"/>
+                  </a:schemeClr>
+                </a:solidFill>
+                <a:latin typeface="Arial" panose="020B0604020202020204" pitchFamily="34" charset="0"/>
+                <a:cs typeface="Arial" panose="020B0604020202020204" pitchFamily="34" charset="0"/>
+                <a:sym typeface="+mn-ea"/>
+              </a:rPr>
+              <a:t>João</a:t>
+            </a:r>
+          </a:p>
+          <a:p>
+            <a:pPr algn="l"/>
+            <a:r>
+              <a:rPr lang="en-US" altLang="pt-BR" sz="1400">
+                <a:solidFill>
+                  <a:schemeClr val="accent5">
+                    <a:lumMod val="40000"/>
+                    <a:lumOff val="60000"/>
+                  </a:schemeClr>
+                </a:solidFill>
+                <a:latin typeface="Arial" panose="020B0604020202020204" pitchFamily="34" charset="0"/>
+                <a:cs typeface="Arial" panose="020B0604020202020204" pitchFamily="34" charset="0"/>
+              </a:rPr>
+              <a:t>DEV</a:t>
+            </a:r>
+            <a:endParaRPr lang="en-US" altLang="pt-BR">
+              <a:latin typeface="Arial" panose="020B0604020202020204" pitchFamily="34" charset="0"/>
+              <a:cs typeface="Arial" panose="020B0604020202020204" pitchFamily="34" charset="0"/>
+            </a:endParaRPr>
+          </a:p>
+          <a:p>
+            <a:pPr algn="l"/>
+            <a:r>
+              <a:rPr lang="en-US" altLang="pt-BR">
+                <a:latin typeface="Arial" panose="020B0604020202020204" pitchFamily="34" charset="0"/>
+                <a:cs typeface="Arial" panose="020B0604020202020204" pitchFamily="34" charset="0"/>
+                <a:sym typeface="+mn-ea"/>
+              </a:rPr>
+              <a:t>“Foi um aprendizado muito interessante, a mudança de grupo foi desafiadora, trabalhar com pessoas novas das quais o contato não era grande, pórem que me auziliaram e muito em minhas atividades tecnicas no projeto, fico muito feliz onde chegamos apesar de todas as barreiras”</a:t>
+            </a:r>
+            <a:endParaRPr lang="en-US" altLang="pt-BR">
+              <a:latin typeface="Arial" panose="020B0604020202020204" pitchFamily="34" charset="0"/>
+              <a:cs typeface="Arial" panose="020B0604020202020204" pitchFamily="34" charset="0"/>
+            </a:endParaRPr>
+          </a:p>
+          <a:p>
+            <a:pPr algn="l"/>
+            <a:r>
+              <a:rPr lang="en-US" altLang="pt-BR" sz="2000">
+                <a:solidFill>
+                  <a:srgbClr val="7030A0"/>
+                </a:solidFill>
+                <a:latin typeface="Arial" panose="020B0604020202020204" pitchFamily="34" charset="0"/>
+                <a:cs typeface="Arial" panose="020B0604020202020204" pitchFamily="34" charset="0"/>
+                <a:sym typeface="+mn-ea"/>
+              </a:rPr>
+              <a:t>Manoel</a:t>
+            </a:r>
+          </a:p>
+          <a:p>
+            <a:pPr algn="l"/>
+            <a:r>
+              <a:rPr lang="en-US" altLang="pt-BR" sz="1400">
+                <a:solidFill>
+                  <a:srgbClr val="7030A0"/>
+                </a:solidFill>
+                <a:latin typeface="Arial" panose="020B0604020202020204" pitchFamily="34" charset="0"/>
+                <a:cs typeface="Arial" panose="020B0604020202020204" pitchFamily="34" charset="0"/>
+                <a:sym typeface="+mn-ea"/>
+              </a:rPr>
+              <a:t>Scrum Master</a:t>
+            </a:r>
+            <a:endParaRPr lang="en-US" altLang="pt-BR" sz="2000">
+              <a:latin typeface="Arial" panose="020B0604020202020204" pitchFamily="34" charset="0"/>
+              <a:cs typeface="Arial" panose="020B0604020202020204" pitchFamily="34" charset="0"/>
+            </a:endParaRPr>
+          </a:p>
+          <a:p>
+            <a:pPr algn="l"/>
+            <a:r>
+              <a:rPr lang="en-US" altLang="pt-BR">
+                <a:latin typeface="Arial" panose="020B0604020202020204" pitchFamily="34" charset="0"/>
+                <a:cs typeface="Arial" panose="020B0604020202020204" pitchFamily="34" charset="0"/>
+                <a:sym typeface="+mn-ea"/>
+              </a:rPr>
+              <a:t>“Foi uma experiência muito marcante, aprender a me relacionar com pessoas novas e lidar com tecnologias que eu não conhecia foi muito desafiador, mas no final fiquei bem satisfeito com o resultado do projeto e com o que descobri ser capaz de desenvolver”</a:t>
+            </a:r>
+          </a:p>
+          <a:p>
+            <a:pPr algn="l"/>
+            <a:r>
+              <a:rPr lang="en-US" altLang="pt-BR" sz="2000">
+                <a:solidFill>
+                  <a:schemeClr val="accent3"/>
+                </a:solidFill>
+                <a:latin typeface="Arial" panose="020B0604020202020204" pitchFamily="34" charset="0"/>
+                <a:cs typeface="Arial" panose="020B0604020202020204" pitchFamily="34" charset="0"/>
+                <a:sym typeface="+mn-ea"/>
+              </a:rPr>
+              <a:t>Pedro</a:t>
+            </a:r>
+            <a:endParaRPr lang="en-US" altLang="pt-BR">
+              <a:solidFill>
+                <a:schemeClr val="accent3"/>
+              </a:solidFill>
+              <a:latin typeface="Arial" panose="020B0604020202020204" pitchFamily="34" charset="0"/>
+              <a:cs typeface="Arial" panose="020B0604020202020204" pitchFamily="34" charset="0"/>
+              <a:sym typeface="+mn-ea"/>
+            </a:endParaRPr>
+          </a:p>
+          <a:p>
+            <a:pPr algn="l"/>
+            <a:r>
+              <a:rPr lang="en-US" altLang="pt-BR" sz="1400">
+                <a:solidFill>
+                  <a:schemeClr val="accent3"/>
+                </a:solidFill>
+                <a:latin typeface="Arial" panose="020B0604020202020204" pitchFamily="34" charset="0"/>
+                <a:cs typeface="Arial" panose="020B0604020202020204" pitchFamily="34" charset="0"/>
+                <a:sym typeface="+mn-ea"/>
+              </a:rPr>
+              <a:t>DEV</a:t>
+            </a:r>
+            <a:endParaRPr lang="en-US" altLang="pt-BR">
+              <a:latin typeface="Arial" panose="020B0604020202020204" pitchFamily="34" charset="0"/>
+              <a:cs typeface="Arial" panose="020B0604020202020204" pitchFamily="34" charset="0"/>
+              <a:sym typeface="+mn-ea"/>
+            </a:endParaRPr>
+          </a:p>
+          <a:p>
+            <a:pPr algn="l"/>
+            <a:r>
+              <a:rPr lang="en-US" altLang="pt-BR">
+                <a:latin typeface="Arial" panose="020B0604020202020204" pitchFamily="34" charset="0"/>
+                <a:cs typeface="Arial" panose="020B0604020202020204" pitchFamily="34" charset="0"/>
+                <a:sym typeface="+mn-ea"/>
+              </a:rPr>
+              <a:t>“Agradeço pela oportunidade de aprender durante todo esse processo. Tenho muito ao que aprender ainda, mas esse tempo foi um desafio,pois lidar com quem você não conhece, e ainda mais, trabalhar com elas é difícil, mas aqui chegamos. Esse projeto me fez enxergar que sou capaz ainda mais de desenvolver meu aprendizado. Fico feliz por ter dado tudo certo””</a:t>
+            </a:r>
+            <a:endParaRPr lang="en-US" altLang="pt-BR" sz="2000">
+              <a:latin typeface="Arial" panose="020B0604020202020204" pitchFamily="34" charset="0"/>
+              <a:cs typeface="Arial" panose="020B0604020202020204" pitchFamily="34" charset="0"/>
+            </a:endParaRPr>
+          </a:p>
+          <a:p>
+            <a:pPr algn="l"/>
+            <a:endParaRPr lang="en-US" altLang="pt-BR" sz="2000">
+              <a:latin typeface="Arial" panose="020B0604020202020204" pitchFamily="34" charset="0"/>
+              <a:cs typeface="Arial" panose="020B0604020202020204" pitchFamily="34" charset="0"/>
+            </a:endParaRPr>
+          </a:p>
         </p:txBody>
       </p:sp>
-      <p:pic>
-        <p:nvPicPr>
-          <p:cNvPr id="2" name="Imagem 1" descr="like"/>
-          <p:cNvPicPr>
-            <a:picLocks noChangeAspect="1"/>
-          </p:cNvPicPr>
-          <p:nvPr/>
-        </p:nvPicPr>
-        <p:blipFill>
-          <a:blip r:embed="rId3"/>
-          <a:stretch>
-            <a:fillRect/>
-          </a:stretch>
-        </p:blipFill>
-        <p:spPr>
-          <a:xfrm>
-            <a:off x="1263650" y="1490345"/>
-            <a:ext cx="2438400" cy="2438400"/>
-          </a:xfrm>
-          <a:prstGeom prst="rect">
-            <a:avLst/>
-          </a:prstGeom>
-          <a:noFill/>
-        </p:spPr>
-      </p:pic>
     </p:spTree>
   </p:cSld>
   <p:clrMapOvr>
@@ -14969,13 +15083,6 @@
   <p:transition spd="slow">
     <p:push dir="u"/>
   </p:transition>
-  <p:timing>
-    <p:tnLst>
-      <p:par>
-        <p:cTn id="1" dur="indefinite" restart="never" nodeType="tmRoot"/>
-      </p:par>
-    </p:tnLst>
-  </p:timing>
 </p:sld>
 </file>
 
@@ -15044,6 +15151,360 @@
               <a:rPr lang="en-US" altLang="pt-BR" sz="3200" dirty="0">
                 <a:latin typeface="+mj-lt"/>
               </a:rPr>
+              <a:t>FUTURO</a:t>
+            </a:r>
+          </a:p>
+        </p:txBody>
+      </p:sp>
+      <p:pic>
+        <p:nvPicPr>
+          <p:cNvPr id="3" name="Imagem 2"/>
+          <p:cNvPicPr>
+            <a:picLocks noChangeAspect="1"/>
+          </p:cNvPicPr>
+          <p:nvPr/>
+        </p:nvPicPr>
+        <p:blipFill>
+          <a:blip r:embed="rId2" cstate="print">
+            <a:extLst>
+              <a:ext uri="{28A0092B-C50C-407E-A947-70E740481C1C}">
+                <a14:useLocalDpi xmlns:a14="http://schemas.microsoft.com/office/drawing/2010/main" val="0"/>
+              </a:ext>
+            </a:extLst>
+          </a:blip>
+          <a:stretch>
+            <a:fillRect/>
+          </a:stretch>
+        </p:blipFill>
+        <p:spPr>
+          <a:xfrm>
+            <a:off x="10717883" y="105229"/>
+            <a:ext cx="1438302" cy="600335"/>
+          </a:xfrm>
+          <a:prstGeom prst="rect">
+            <a:avLst/>
+          </a:prstGeom>
+        </p:spPr>
+      </p:pic>
+      <p:sp>
+        <p:nvSpPr>
+          <p:cNvPr id="5" name="Caixa de Texto 4"/>
+          <p:cNvSpPr txBox="1"/>
+          <p:nvPr/>
+        </p:nvSpPr>
+        <p:spPr>
+          <a:xfrm>
+            <a:off x="4324985" y="2242820"/>
+            <a:ext cx="6271260" cy="1198880"/>
+          </a:xfrm>
+          <a:prstGeom prst="rect">
+            <a:avLst/>
+          </a:prstGeom>
+          <a:noFill/>
+        </p:spPr>
+        <p:txBody>
+          <a:bodyPr wrap="square" rtlCol="0">
+            <a:spAutoFit/>
+          </a:bodyPr>
+          <a:lstStyle/>
+          <a:p>
+            <a:pPr algn="ctr"/>
+            <a:r>
+              <a:rPr lang="en-US" altLang="pt-BR" sz="2400" dirty="0" err="1">
+                <a:latin typeface="Arial" panose="020B0604020202020204" pitchFamily="34" charset="0"/>
+                <a:cs typeface="Arial" panose="020B0604020202020204" pitchFamily="34" charset="0"/>
+              </a:rPr>
+              <a:t>Sensores</a:t>
+            </a:r>
+            <a:r>
+              <a:rPr lang="en-US" altLang="pt-BR" sz="2400" dirty="0">
+                <a:latin typeface="Arial" panose="020B0604020202020204" pitchFamily="34" charset="0"/>
+                <a:cs typeface="Arial" panose="020B0604020202020204" pitchFamily="34" charset="0"/>
+              </a:rPr>
+              <a:t> </a:t>
+            </a:r>
+            <a:r>
+              <a:rPr lang="en-US" altLang="pt-BR" sz="2400" dirty="0" err="1">
+                <a:latin typeface="Arial" panose="020B0604020202020204" pitchFamily="34" charset="0"/>
+                <a:cs typeface="Arial" panose="020B0604020202020204" pitchFamily="34" charset="0"/>
+              </a:rPr>
+              <a:t>pelos</a:t>
+            </a:r>
+            <a:r>
+              <a:rPr lang="en-US" altLang="pt-BR" sz="2400" dirty="0">
+                <a:latin typeface="Arial" panose="020B0604020202020204" pitchFamily="34" charset="0"/>
+                <a:cs typeface="Arial" panose="020B0604020202020204" pitchFamily="34" charset="0"/>
+              </a:rPr>
+              <a:t> </a:t>
+            </a:r>
+            <a:r>
+              <a:rPr lang="en-US" altLang="pt-BR" sz="2400" dirty="0" err="1">
+                <a:latin typeface="Arial" panose="020B0604020202020204" pitchFamily="34" charset="0"/>
+                <a:cs typeface="Arial" panose="020B0604020202020204" pitchFamily="34" charset="0"/>
+              </a:rPr>
+              <a:t>corredores</a:t>
+            </a:r>
+            <a:r>
+              <a:rPr lang="en-US" altLang="pt-BR" sz="2400" dirty="0">
+                <a:latin typeface="Arial" panose="020B0604020202020204" pitchFamily="34" charset="0"/>
+                <a:cs typeface="Arial" panose="020B0604020202020204" pitchFamily="34" charset="0"/>
+              </a:rPr>
+              <a:t>, </a:t>
+            </a:r>
+            <a:r>
+              <a:rPr lang="en-US" altLang="pt-BR" sz="2400" dirty="0" err="1">
+                <a:latin typeface="Arial" panose="020B0604020202020204" pitchFamily="34" charset="0"/>
+                <a:cs typeface="Arial" panose="020B0604020202020204" pitchFamily="34" charset="0"/>
+              </a:rPr>
+              <a:t>indicando</a:t>
+            </a:r>
+            <a:r>
+              <a:rPr lang="en-US" altLang="pt-BR" sz="2400" dirty="0">
+                <a:latin typeface="Arial" panose="020B0604020202020204" pitchFamily="34" charset="0"/>
+                <a:cs typeface="Arial" panose="020B0604020202020204" pitchFamily="34" charset="0"/>
+              </a:rPr>
+              <a:t> o que </a:t>
+            </a:r>
+            <a:r>
+              <a:rPr lang="en-US" altLang="pt-BR" sz="2400" dirty="0" err="1">
+                <a:latin typeface="Arial" panose="020B0604020202020204" pitchFamily="34" charset="0"/>
+                <a:cs typeface="Arial" panose="020B0604020202020204" pitchFamily="34" charset="0"/>
+              </a:rPr>
+              <a:t>cada</a:t>
+            </a:r>
+            <a:r>
+              <a:rPr lang="en-US" altLang="pt-BR" sz="2400" dirty="0">
+                <a:latin typeface="Arial" panose="020B0604020202020204" pitchFamily="34" charset="0"/>
+                <a:cs typeface="Arial" panose="020B0604020202020204" pitchFamily="34" charset="0"/>
+              </a:rPr>
+              <a:t> </a:t>
+            </a:r>
+            <a:r>
+              <a:rPr lang="en-US" altLang="pt-BR" sz="2400" dirty="0" err="1">
+                <a:latin typeface="Arial" panose="020B0604020202020204" pitchFamily="34" charset="0"/>
+                <a:cs typeface="Arial" panose="020B0604020202020204" pitchFamily="34" charset="0"/>
+              </a:rPr>
+              <a:t>corredor</a:t>
+            </a:r>
+            <a:r>
+              <a:rPr lang="en-US" altLang="pt-BR" sz="2400" dirty="0">
+                <a:latin typeface="Arial" panose="020B0604020202020204" pitchFamily="34" charset="0"/>
+                <a:cs typeface="Arial" panose="020B0604020202020204" pitchFamily="34" charset="0"/>
+              </a:rPr>
+              <a:t> </a:t>
+            </a:r>
+            <a:r>
+              <a:rPr lang="en-US" altLang="pt-BR" sz="2400" dirty="0" err="1">
+                <a:latin typeface="Arial" panose="020B0604020202020204" pitchFamily="34" charset="0"/>
+                <a:cs typeface="Arial" panose="020B0604020202020204" pitchFamily="34" charset="0"/>
+              </a:rPr>
+              <a:t>contém</a:t>
+            </a:r>
+            <a:r>
+              <a:rPr lang="en-US" altLang="pt-BR" sz="2400" dirty="0">
+                <a:latin typeface="Arial" panose="020B0604020202020204" pitchFamily="34" charset="0"/>
+                <a:cs typeface="Arial" panose="020B0604020202020204" pitchFamily="34" charset="0"/>
+              </a:rPr>
+              <a:t>. </a:t>
+            </a:r>
+            <a:r>
+              <a:rPr lang="en-US" altLang="pt-BR" sz="2400" dirty="0" err="1">
+                <a:latin typeface="Arial" panose="020B0604020202020204" pitchFamily="34" charset="0"/>
+                <a:cs typeface="Arial" panose="020B0604020202020204" pitchFamily="34" charset="0"/>
+              </a:rPr>
+              <a:t>Utilização</a:t>
+            </a:r>
+            <a:r>
+              <a:rPr lang="en-US" altLang="pt-BR" sz="2400" dirty="0">
+                <a:latin typeface="Arial" panose="020B0604020202020204" pitchFamily="34" charset="0"/>
+                <a:cs typeface="Arial" panose="020B0604020202020204" pitchFamily="34" charset="0"/>
+              </a:rPr>
+              <a:t> </a:t>
+            </a:r>
+            <a:r>
+              <a:rPr lang="en-US" altLang="pt-BR" sz="2400" dirty="0" err="1">
+                <a:latin typeface="Arial" panose="020B0604020202020204" pitchFamily="34" charset="0"/>
+                <a:cs typeface="Arial" panose="020B0604020202020204" pitchFamily="34" charset="0"/>
+              </a:rPr>
+              <a:t>parecida</a:t>
+            </a:r>
+            <a:r>
+              <a:rPr lang="en-US" altLang="pt-BR" sz="2400" dirty="0">
+                <a:latin typeface="Arial" panose="020B0604020202020204" pitchFamily="34" charset="0"/>
+                <a:cs typeface="Arial" panose="020B0604020202020204" pitchFamily="34" charset="0"/>
+              </a:rPr>
+              <a:t> com a “</a:t>
+            </a:r>
+            <a:r>
+              <a:rPr lang="en-US" altLang="pt-BR" sz="2400" dirty="0" err="1">
+                <a:latin typeface="Arial" panose="020B0604020202020204" pitchFamily="34" charset="0"/>
+                <a:cs typeface="Arial" panose="020B0604020202020204" pitchFamily="34" charset="0"/>
+              </a:rPr>
+              <a:t>placa</a:t>
+            </a:r>
+            <a:r>
+              <a:rPr lang="en-US" altLang="pt-BR" sz="2400" dirty="0">
+                <a:latin typeface="Arial" panose="020B0604020202020204" pitchFamily="34" charset="0"/>
+                <a:cs typeface="Arial" panose="020B0604020202020204" pitchFamily="34" charset="0"/>
+              </a:rPr>
+              <a:t> de </a:t>
+            </a:r>
+            <a:r>
+              <a:rPr lang="en-US" altLang="pt-BR" sz="2400" dirty="0" err="1">
+                <a:latin typeface="Arial" panose="020B0604020202020204" pitchFamily="34" charset="0"/>
+                <a:cs typeface="Arial" panose="020B0604020202020204" pitchFamily="34" charset="0"/>
+              </a:rPr>
+              <a:t>corredor</a:t>
+            </a:r>
+            <a:r>
+              <a:rPr lang="en-US" altLang="pt-BR" sz="2400" dirty="0">
+                <a:latin typeface="Arial" panose="020B0604020202020204" pitchFamily="34" charset="0"/>
+                <a:cs typeface="Arial" panose="020B0604020202020204" pitchFamily="34" charset="0"/>
+              </a:rPr>
+              <a:t>”</a:t>
+            </a:r>
+          </a:p>
+        </p:txBody>
+      </p:sp>
+      <p:sp>
+        <p:nvSpPr>
+          <p:cNvPr id="11" name="Caixa de Texto 10"/>
+          <p:cNvSpPr txBox="1"/>
+          <p:nvPr/>
+        </p:nvSpPr>
+        <p:spPr>
+          <a:xfrm>
+            <a:off x="1595120" y="4366260"/>
+            <a:ext cx="9001125" cy="460375"/>
+          </a:xfrm>
+          <a:prstGeom prst="rect">
+            <a:avLst/>
+          </a:prstGeom>
+          <a:noFill/>
+        </p:spPr>
+        <p:txBody>
+          <a:bodyPr wrap="square" rtlCol="0">
+            <a:spAutoFit/>
+          </a:bodyPr>
+          <a:lstStyle/>
+          <a:p>
+            <a:pPr algn="ctr"/>
+            <a:r>
+              <a:rPr lang="en-US" altLang="pt-BR" sz="2400">
+                <a:latin typeface="Arial" panose="020B0604020202020204" pitchFamily="34" charset="0"/>
+                <a:cs typeface="Arial" panose="020B0604020202020204" pitchFamily="34" charset="0"/>
+                <a:sym typeface="+mn-ea"/>
+              </a:rPr>
+              <a:t>Facilitando a localização e dispensando a ajuda de funcionários</a:t>
+            </a:r>
+            <a:endParaRPr lang="en-US" altLang="pt-BR" sz="2400">
+              <a:latin typeface="Arial" panose="020B0604020202020204" pitchFamily="34" charset="0"/>
+              <a:cs typeface="Arial" panose="020B0604020202020204" pitchFamily="34" charset="0"/>
+            </a:endParaRPr>
+          </a:p>
+        </p:txBody>
+      </p:sp>
+      <p:pic>
+        <p:nvPicPr>
+          <p:cNvPr id="2" name="Imagem 1" descr="like"/>
+          <p:cNvPicPr>
+            <a:picLocks noChangeAspect="1"/>
+          </p:cNvPicPr>
+          <p:nvPr/>
+        </p:nvPicPr>
+        <p:blipFill>
+          <a:blip r:embed="rId3"/>
+          <a:stretch>
+            <a:fillRect/>
+          </a:stretch>
+        </p:blipFill>
+        <p:spPr>
+          <a:xfrm>
+            <a:off x="1263650" y="1490345"/>
+            <a:ext cx="2438400" cy="2438400"/>
+          </a:xfrm>
+          <a:prstGeom prst="rect">
+            <a:avLst/>
+          </a:prstGeom>
+          <a:noFill/>
+        </p:spPr>
+      </p:pic>
+    </p:spTree>
+  </p:cSld>
+  <p:clrMapOvr>
+    <a:masterClrMapping/>
+  </p:clrMapOvr>
+  <p:transition spd="slow">
+    <p:push dir="u"/>
+  </p:transition>
+</p:sld>
+</file>
+
+<file path=ppt/slides/slide22.xml><?xml version="1.0" encoding="utf-8"?>
+<p:sld xmlns:a="http://schemas.openxmlformats.org/drawingml/2006/main" xmlns:r="http://schemas.openxmlformats.org/officeDocument/2006/relationships" xmlns:p="http://schemas.openxmlformats.org/presentationml/2006/main">
+  <p:cSld>
+    <p:spTree>
+      <p:nvGrpSpPr>
+        <p:cNvPr id="1" name=""/>
+        <p:cNvGrpSpPr/>
+        <p:nvPr/>
+      </p:nvGrpSpPr>
+      <p:grpSpPr>
+        <a:xfrm>
+          <a:off x="0" y="0"/>
+          <a:ext cx="0" cy="0"/>
+          <a:chOff x="0" y="0"/>
+          <a:chExt cx="0" cy="0"/>
+        </a:xfrm>
+      </p:grpSpPr>
+      <p:sp>
+        <p:nvSpPr>
+          <p:cNvPr id="9" name="Retângulo 8"/>
+          <p:cNvSpPr/>
+          <p:nvPr/>
+        </p:nvSpPr>
+        <p:spPr>
+          <a:xfrm>
+            <a:off x="3310597" y="168452"/>
+            <a:ext cx="5570806" cy="1322363"/>
+          </a:xfrm>
+          <a:prstGeom prst="rect">
+            <a:avLst/>
+          </a:prstGeom>
+          <a:solidFill>
+            <a:schemeClr val="bg1"/>
+          </a:solidFill>
+          <a:ln>
+            <a:solidFill>
+              <a:srgbClr val="E50D3B"/>
+            </a:solidFill>
+          </a:ln>
+        </p:spPr>
+        <p:style>
+          <a:lnRef idx="2">
+            <a:schemeClr val="accent1">
+              <a:shade val="50000"/>
+            </a:schemeClr>
+          </a:lnRef>
+          <a:fillRef idx="1">
+            <a:schemeClr val="accent1"/>
+          </a:fillRef>
+          <a:effectRef idx="0">
+            <a:schemeClr val="accent1"/>
+          </a:effectRef>
+          <a:fontRef idx="minor">
+            <a:schemeClr val="lt1"/>
+          </a:fontRef>
+        </p:style>
+        <p:txBody>
+          <a:bodyPr rtlCol="0" anchor="ctr"/>
+          <a:lstStyle/>
+          <a:p>
+            <a:pPr algn="ctr"/>
+            <a:r>
+              <a:rPr lang="en-US" altLang="pt-BR" sz="3200" dirty="0">
+                <a:latin typeface="+mj-lt"/>
+              </a:rPr>
               <a:t>OUTRAS IMPLEMENTAÇÕES</a:t>
             </a:r>
           </a:p>
@@ -15182,13 +15643,6 @@
   <p:transition spd="slow">
     <p:push dir="u"/>
   </p:transition>
-  <p:timing>
-    <p:tnLst>
-      <p:par>
-        <p:cTn id="1" dur="indefinite" restart="never" nodeType="tmRoot"/>
-      </p:par>
-    </p:tnLst>
-  </p:timing>
 </p:sld>
 </file>
 
@@ -15475,13 +15929,6 @@
   <p:clrMapOvr>
     <a:masterClrMapping/>
   </p:clrMapOvr>
-  <p:timing>
-    <p:tnLst>
-      <p:par>
-        <p:cTn id="1" dur="indefinite" restart="never" nodeType="tmRoot"/>
-      </p:par>
-    </p:tnLst>
-  </p:timing>
 </p:sld>
 </file>
 
@@ -15718,13 +16165,6 @@
   <p:transition spd="slow">
     <p:push dir="u"/>
   </p:transition>
-  <p:timing>
-    <p:tnLst>
-      <p:par>
-        <p:cTn id="1" dur="indefinite" restart="never" nodeType="tmRoot"/>
-      </p:par>
-    </p:tnLst>
-  </p:timing>
 </p:sld>
 </file>
 
@@ -16180,13 +16620,6 @@
   <p:transition spd="slow">
     <p:push dir="r"/>
   </p:transition>
-  <p:timing>
-    <p:tnLst>
-      <p:par>
-        <p:cTn id="1" dur="indefinite" restart="never" nodeType="tmRoot"/>
-      </p:par>
-    </p:tnLst>
-  </p:timing>
 </p:sld>
 </file>
 
@@ -22925,13 +23358,6 @@
   <p:clrMapOvr>
     <a:masterClrMapping/>
   </p:clrMapOvr>
-  <p:timing>
-    <p:tnLst>
-      <p:par>
-        <p:cTn id="1" dur="indefinite" restart="never" nodeType="tmRoot"/>
-      </p:par>
-    </p:tnLst>
-  </p:timing>
 </p:sld>
 </file>
 

</xml_diff>